<commit_message>
Typescript book complete read ...
</commit_message>
<xml_diff>
--- a/Slides/Quarter 1/What is Metaverse.pptx
+++ b/Slides/Quarter 1/What is Metaverse.pptx
@@ -328,7 +328,7 @@
           </a:lstStyle>
           <a:p>
             <a:pPr algn="r"/>
-            <a:fld id="{78693FB9-4634-4226-9796-116229B3E31B}" type="slidenum">
+            <a:fld id="{75194B3D-BDA0-45A0-9602-CDB22A56E147}" type="slidenum">
               <a:rPr b="0" lang="en-US" sz="1400" spc="-1" strike="noStrike">
                 <a:latin typeface="Times New Roman"/>
               </a:rPr>
@@ -376,7 +376,7 @@
         <p:spPr>
           <a:xfrm>
             <a:off x="533520" y="764280"/>
-            <a:ext cx="6702840" cy="3769560"/>
+            <a:ext cx="6702480" cy="3769200"/>
           </a:xfrm>
           <a:prstGeom prst="rect">
             <a:avLst/>
@@ -395,7 +395,7 @@
         <p:spPr>
           <a:xfrm>
             <a:off x="777240" y="4777560"/>
-            <a:ext cx="6215760" cy="4524120"/>
+            <a:ext cx="6215400" cy="4523760"/>
           </a:xfrm>
           <a:prstGeom prst="rect">
             <a:avLst/>
@@ -698,7 +698,7 @@
         <p:txBody>
           <a:bodyPr/>
           <a:p>
-            <a:fld id="{E561ECC1-FBC0-4446-8257-7C35B9DDDA40}" type="slidenum">
+            <a:fld id="{2181BF9A-86D2-4770-8509-D75BD4EEAEDC}" type="slidenum">
               <a:t>&lt;#&gt;</a:t>
             </a:fld>
           </a:p>
@@ -775,7 +775,7 @@
         <p:txBody>
           <a:bodyPr/>
           <a:p>
-            <a:fld id="{E5E5B018-2858-4F3D-83F4-44195174FBF6}" type="slidenum">
+            <a:fld id="{6BC08F1A-0CB9-45E3-93A9-544C506D97FA}" type="slidenum">
               <a:t>&lt;#&gt;</a:t>
             </a:fld>
           </a:p>
@@ -852,7 +852,7 @@
         <p:txBody>
           <a:bodyPr/>
           <a:p>
-            <a:fld id="{A572683D-E9CD-47A2-8725-A4041D45383B}" type="slidenum">
+            <a:fld id="{BA5DD25F-1EDC-43EE-BE21-2514286BC7C1}" type="slidenum">
               <a:t>&lt;#&gt;</a:t>
             </a:fld>
           </a:p>
@@ -1031,7 +1031,7 @@
         <p:txBody>
           <a:bodyPr/>
           <a:p>
-            <a:fld id="{454C5986-B03D-4A1F-80CF-3B1F65FA5E3D}" type="slidenum">
+            <a:fld id="{B5CE9BCE-75EF-447E-9604-92E7CC095D98}" type="slidenum">
               <a:t>&lt;#&gt;</a:t>
             </a:fld>
           </a:p>
@@ -1210,7 +1210,7 @@
         <p:txBody>
           <a:bodyPr/>
           <a:p>
-            <a:fld id="{05E314E4-A78A-4188-A0C3-7B9771E67A7E}" type="slidenum">
+            <a:fld id="{AF3B3B2F-E859-4CC7-A344-4D822CB2B7E0}" type="slidenum">
               <a:t>&lt;#&gt;</a:t>
             </a:fld>
           </a:p>
@@ -1389,7 +1389,7 @@
         <p:txBody>
           <a:bodyPr/>
           <a:p>
-            <a:fld id="{18F1634E-B480-46DE-A164-029A3E7AB3C4}" type="slidenum">
+            <a:fld id="{984722DA-49B6-4C64-8FD4-4B4FF46C3761}" type="slidenum">
               <a:t>&lt;#&gt;</a:t>
             </a:fld>
           </a:p>
@@ -1534,7 +1534,7 @@
         <p:txBody>
           <a:bodyPr/>
           <a:p>
-            <a:fld id="{E402BDDB-2E67-4B6C-A0B4-E392FA038816}" type="slidenum">
+            <a:fld id="{D396D588-9133-4A5A-B214-386111AA0D83}" type="slidenum">
               <a:t>&lt;#&gt;</a:t>
             </a:fld>
           </a:p>
@@ -1747,7 +1747,7 @@
         <p:txBody>
           <a:bodyPr/>
           <a:p>
-            <a:fld id="{F151D65D-C5A1-4239-A8DD-D7FBF9090B82}" type="slidenum">
+            <a:fld id="{2B075D09-D2D1-434C-B43E-369C205E9A3B}" type="slidenum">
               <a:t>&lt;#&gt;</a:t>
             </a:fld>
           </a:p>
@@ -2028,7 +2028,7 @@
         <p:txBody>
           <a:bodyPr/>
           <a:p>
-            <a:fld id="{DAD23829-C394-48EF-9193-1546715428C8}" type="slidenum">
+            <a:fld id="{B5017CE3-A59D-4318-8615-40B7A12DDCAC}" type="slidenum">
               <a:t>&lt;#&gt;</a:t>
             </a:fld>
           </a:p>
@@ -2070,7 +2070,7 @@
         <p:txBody>
           <a:bodyPr/>
           <a:p>
-            <a:fld id="{C871E0B5-16A0-4F21-B062-7F135BD93BAE}" type="slidenum">
+            <a:fld id="{4E281F4A-6C6A-4A7A-95FE-EDB899676A13}" type="slidenum">
               <a:t>&lt;#&gt;</a:t>
             </a:fld>
           </a:p>
@@ -2375,7 +2375,7 @@
         <p:txBody>
           <a:bodyPr/>
           <a:p>
-            <a:fld id="{9C4A9820-DBB7-46BF-87DD-156041EC170E}" type="slidenum">
+            <a:fld id="{7A75EB5D-2015-443F-A512-E79E4790AF19}" type="slidenum">
               <a:t>&lt;#&gt;</a:t>
             </a:fld>
           </a:p>
@@ -2486,7 +2486,7 @@
         <p:txBody>
           <a:bodyPr/>
           <a:p>
-            <a:fld id="{139D0CFB-8B69-49DC-A6FD-CB63A01E99A2}" type="slidenum">
+            <a:fld id="{B6EAC136-9218-4443-95C8-BB7DCC4EF253}" type="slidenum">
               <a:t>&lt;#&gt;</a:t>
             </a:fld>
           </a:p>
@@ -2631,7 +2631,7 @@
         <p:txBody>
           <a:bodyPr/>
           <a:p>
-            <a:fld id="{39C5598D-FBFE-45E8-82D5-21BCE8CFBFCF}" type="slidenum">
+            <a:fld id="{1934D60A-5B03-4BAF-9841-DC96FE4A5F63}" type="slidenum">
               <a:t>&lt;#&gt;</a:t>
             </a:fld>
           </a:p>
@@ -2708,7 +2708,7 @@
         <p:txBody>
           <a:bodyPr/>
           <a:p>
-            <a:fld id="{488B42ED-94BF-4574-9C70-4C07D76938D0}" type="slidenum">
+            <a:fld id="{EA25A808-2429-46AD-9DF9-BCB6CB1315DF}" type="slidenum">
               <a:t>&lt;#&gt;</a:t>
             </a:fld>
           </a:p>
@@ -2785,7 +2785,7 @@
         <p:txBody>
           <a:bodyPr/>
           <a:p>
-            <a:fld id="{B6D87C18-6922-46D3-9926-26114649041C}" type="slidenum">
+            <a:fld id="{6C5B06EF-7E5B-4163-9055-F686995D8827}" type="slidenum">
               <a:t>&lt;#&gt;</a:t>
             </a:fld>
           </a:p>
@@ -2964,7 +2964,7 @@
         <p:txBody>
           <a:bodyPr/>
           <a:p>
-            <a:fld id="{EA086E73-9EC2-451E-975D-79419E1FAB99}" type="slidenum">
+            <a:fld id="{180C84F5-653A-475D-B9EC-B57202ADEB78}" type="slidenum">
               <a:t>&lt;#&gt;</a:t>
             </a:fld>
           </a:p>
@@ -3143,7 +3143,7 @@
         <p:txBody>
           <a:bodyPr/>
           <a:p>
-            <a:fld id="{BC830B87-A460-4510-B759-27770C51925C}" type="slidenum">
+            <a:fld id="{2EAB6773-1393-4886-A651-D633A4C3DEFD}" type="slidenum">
               <a:t>&lt;#&gt;</a:t>
             </a:fld>
           </a:p>
@@ -3322,7 +3322,7 @@
         <p:txBody>
           <a:bodyPr/>
           <a:p>
-            <a:fld id="{BA774C8C-E13F-419A-9AF3-08CEC1F151D0}" type="slidenum">
+            <a:fld id="{2350DA8E-D9F3-4410-8776-3AD389C602C1}" type="slidenum">
               <a:t>&lt;#&gt;</a:t>
             </a:fld>
           </a:p>
@@ -3467,7 +3467,7 @@
         <p:txBody>
           <a:bodyPr/>
           <a:p>
-            <a:fld id="{1EBAA9D3-E115-4DD0-A61F-5922818CD05B}" type="slidenum">
+            <a:fld id="{CEB6F1A2-ACC8-4676-8BE7-A32A91CD9467}" type="slidenum">
               <a:t>&lt;#&gt;</a:t>
             </a:fld>
           </a:p>
@@ -3680,7 +3680,7 @@
         <p:txBody>
           <a:bodyPr/>
           <a:p>
-            <a:fld id="{E3A964C6-345F-4D52-BFC4-344BA2D500D2}" type="slidenum">
+            <a:fld id="{8B1B30AD-6F45-4B7A-82A0-DD2275842422}" type="slidenum">
               <a:t>&lt;#&gt;</a:t>
             </a:fld>
           </a:p>
@@ -4222,7 +4222,7 @@
         <p:txBody>
           <a:bodyPr/>
           <a:p>
-            <a:fld id="{0257D0EB-4D0F-4E04-A27F-A03490DB4528}" type="slidenum">
+            <a:fld id="{2D4A8053-319E-4753-9D5A-E281212C7382}" type="slidenum">
               <a:t>&lt;#&gt;</a:t>
             </a:fld>
           </a:p>
@@ -4264,7 +4264,7 @@
         <p:txBody>
           <a:bodyPr/>
           <a:p>
-            <a:fld id="{25F29596-1979-4688-94EF-CCDBBF87532B}" type="slidenum">
+            <a:fld id="{28BAB38D-B784-4343-A1D4-302D7B9984BE}" type="slidenum">
               <a:t>&lt;#&gt;</a:t>
             </a:fld>
           </a:p>
@@ -4376,7 +4376,7 @@
         <p:txBody>
           <a:bodyPr/>
           <a:p>
-            <a:fld id="{09850656-A9B7-4D89-8602-07B7A0E018B4}" type="slidenum">
+            <a:fld id="{A50A01D7-0B21-4588-878B-FAB9AC5D28A4}" type="slidenum">
               <a:t>&lt;#&gt;</a:t>
             </a:fld>
           </a:p>
@@ -4487,7 +4487,7 @@
         <p:txBody>
           <a:bodyPr/>
           <a:p>
-            <a:fld id="{98DF7B45-FB47-4C4D-A9C6-FB5D882C4603}" type="slidenum">
+            <a:fld id="{0E5FD0E5-FEA7-463E-993D-06FF4A9FCB56}" type="slidenum">
               <a:t>&lt;#&gt;</a:t>
             </a:fld>
           </a:p>
@@ -4632,7 +4632,7 @@
         <p:txBody>
           <a:bodyPr/>
           <a:p>
-            <a:fld id="{74C8A65D-9575-4948-A798-538A439BC335}" type="slidenum">
+            <a:fld id="{CAA7F2E2-80CD-4685-A5E1-D9681EB25A0F}" type="slidenum">
               <a:t>&lt;#&gt;</a:t>
             </a:fld>
           </a:p>
@@ -4709,7 +4709,7 @@
         <p:txBody>
           <a:bodyPr/>
           <a:p>
-            <a:fld id="{20113E03-662E-41B5-AAEF-1AEE2F41CB59}" type="slidenum">
+            <a:fld id="{D2A2B4CC-D9B4-4D20-BA4A-AE245122C838}" type="slidenum">
               <a:t>&lt;#&gt;</a:t>
             </a:fld>
           </a:p>
@@ -4786,7 +4786,7 @@
         <p:txBody>
           <a:bodyPr/>
           <a:p>
-            <a:fld id="{0A665F21-5B89-46C0-9BBF-876C64C7AE25}" type="slidenum">
+            <a:fld id="{B466B336-ABCC-45CD-8161-69C7C491513F}" type="slidenum">
               <a:t>&lt;#&gt;</a:t>
             </a:fld>
           </a:p>
@@ -4965,7 +4965,7 @@
         <p:txBody>
           <a:bodyPr/>
           <a:p>
-            <a:fld id="{67A6F57D-18BC-45BF-8B7C-9338968B3AB0}" type="slidenum">
+            <a:fld id="{57292E8E-6E58-47AF-A584-3AF6A54EB39B}" type="slidenum">
               <a:t>&lt;#&gt;</a:t>
             </a:fld>
           </a:p>
@@ -5144,7 +5144,7 @@
         <p:txBody>
           <a:bodyPr/>
           <a:p>
-            <a:fld id="{56C26AA9-2A86-43FF-9FEB-2B768141FCE8}" type="slidenum">
+            <a:fld id="{5A71A8C4-BA25-499D-AB4B-0793E18F5DB4}" type="slidenum">
               <a:t>&lt;#&gt;</a:t>
             </a:fld>
           </a:p>
@@ -5323,7 +5323,7 @@
         <p:txBody>
           <a:bodyPr/>
           <a:p>
-            <a:fld id="{794BC91B-AF93-49CA-BE82-AE31FFA6E279}" type="slidenum">
+            <a:fld id="{036A077B-67B9-4F32-B4DF-3408D1DF94BF}" type="slidenum">
               <a:t>&lt;#&gt;</a:t>
             </a:fld>
           </a:p>
@@ -5365,7 +5365,7 @@
         <p:txBody>
           <a:bodyPr/>
           <a:p>
-            <a:fld id="{47C829DB-6A9D-4FD4-AA2C-2873CBCFC8E6}" type="slidenum">
+            <a:fld id="{C6FC1077-ED73-4ED9-8EFF-D9BDB30377ED}" type="slidenum">
               <a:t>&lt;#&gt;</a:t>
             </a:fld>
           </a:p>
@@ -5510,7 +5510,7 @@
         <p:txBody>
           <a:bodyPr/>
           <a:p>
-            <a:fld id="{E3B0D6EB-CA87-4AC8-9C04-CD7C5D6DF76D}" type="slidenum">
+            <a:fld id="{CDAC869E-03DD-45F5-B9B6-86AA25EED004}" type="slidenum">
               <a:t>&lt;#&gt;</a:t>
             </a:fld>
           </a:p>
@@ -5723,7 +5723,7 @@
         <p:txBody>
           <a:bodyPr/>
           <a:p>
-            <a:fld id="{AC966EEB-AADF-4DCC-8FD9-296060FFD31D}" type="slidenum">
+            <a:fld id="{78D8CDCC-A8A2-4CCB-9050-04EC2DB43716}" type="slidenum">
               <a:t>&lt;#&gt;</a:t>
             </a:fld>
           </a:p>
@@ -6004,7 +6004,7 @@
         <p:txBody>
           <a:bodyPr/>
           <a:p>
-            <a:fld id="{42D19FC6-0416-45EA-8E36-129F3E3CBEB1}" type="slidenum">
+            <a:fld id="{E4403240-4871-4236-8605-C6C097C233C5}" type="slidenum">
               <a:t>&lt;#&gt;</a:t>
             </a:fld>
           </a:p>
@@ -6046,7 +6046,7 @@
         <p:txBody>
           <a:bodyPr/>
           <a:p>
-            <a:fld id="{30B2D1FC-88B4-4256-B19B-6B99A4B13524}" type="slidenum">
+            <a:fld id="{8F7C7A2C-EF1F-4316-8624-F528D77B22E3}" type="slidenum">
               <a:t>&lt;#&gt;</a:t>
             </a:fld>
           </a:p>
@@ -6158,7 +6158,7 @@
         <p:txBody>
           <a:bodyPr/>
           <a:p>
-            <a:fld id="{910878C0-4B14-4B06-8782-6F1D07284F04}" type="slidenum">
+            <a:fld id="{D090F5A6-D0FF-430F-A2E2-7312912AAECD}" type="slidenum">
               <a:t>&lt;#&gt;</a:t>
             </a:fld>
           </a:p>
@@ -6269,7 +6269,7 @@
         <p:txBody>
           <a:bodyPr/>
           <a:p>
-            <a:fld id="{3418B7FB-DE06-4315-9272-B7A4E11556A2}" type="slidenum">
+            <a:fld id="{F0531F46-72B3-4B22-B26A-76DFA6265D65}" type="slidenum">
               <a:t>&lt;#&gt;</a:t>
             </a:fld>
           </a:p>
@@ -6414,7 +6414,7 @@
         <p:txBody>
           <a:bodyPr/>
           <a:p>
-            <a:fld id="{896DFCED-9860-48A5-B397-602167796EB2}" type="slidenum">
+            <a:fld id="{ECD8C85C-5410-4174-89B8-58A0231044CC}" type="slidenum">
               <a:t>&lt;#&gt;</a:t>
             </a:fld>
           </a:p>
@@ -6491,7 +6491,7 @@
         <p:txBody>
           <a:bodyPr/>
           <a:p>
-            <a:fld id="{246E233B-8781-408C-9A18-B87F166DC336}" type="slidenum">
+            <a:fld id="{75DCB94C-ECE7-464E-AF7E-7DC20FC4B2E4}" type="slidenum">
               <a:t>&lt;#&gt;</a:t>
             </a:fld>
           </a:p>
@@ -6568,7 +6568,7 @@
         <p:txBody>
           <a:bodyPr/>
           <a:p>
-            <a:fld id="{604B9C7F-721F-4044-9C28-3DFEA51349AC}" type="slidenum">
+            <a:fld id="{1EA1FA44-DBA7-41FB-A95A-071D6474A051}" type="slidenum">
               <a:t>&lt;#&gt;</a:t>
             </a:fld>
           </a:p>
@@ -6747,7 +6747,7 @@
         <p:txBody>
           <a:bodyPr/>
           <a:p>
-            <a:fld id="{9AB8B617-62E4-4AA0-9A98-614D089B9253}" type="slidenum">
+            <a:fld id="{D010271E-2142-46AE-B682-07E5698E93D6}" type="slidenum">
               <a:t>&lt;#&gt;</a:t>
             </a:fld>
           </a:p>
@@ -6859,7 +6859,7 @@
         <p:txBody>
           <a:bodyPr/>
           <a:p>
-            <a:fld id="{71EDE0D2-A2A9-445A-A3F0-791EE3780CDF}" type="slidenum">
+            <a:fld id="{C46D9CA3-C05C-4247-824E-96C465CD17DF}" type="slidenum">
               <a:t>&lt;#&gt;</a:t>
             </a:fld>
           </a:p>
@@ -7038,7 +7038,7 @@
         <p:txBody>
           <a:bodyPr/>
           <a:p>
-            <a:fld id="{F91CA1E1-AFF7-4752-A0DD-E2112FDBA2ED}" type="slidenum">
+            <a:fld id="{0B9D8D81-377B-48CB-A67C-B4BFBAB243CF}" type="slidenum">
               <a:t>&lt;#&gt;</a:t>
             </a:fld>
           </a:p>
@@ -7217,7 +7217,7 @@
         <p:txBody>
           <a:bodyPr/>
           <a:p>
-            <a:fld id="{D89B448D-4F4B-46AF-B203-049495CAEE5B}" type="slidenum">
+            <a:fld id="{CA4DA0C8-233C-40AF-9C9D-DC712CC4F681}" type="slidenum">
               <a:t>&lt;#&gt;</a:t>
             </a:fld>
           </a:p>
@@ -7362,7 +7362,7 @@
         <p:txBody>
           <a:bodyPr/>
           <a:p>
-            <a:fld id="{C0809C7A-F2ED-4938-ADCA-F2C5483CF4F7}" type="slidenum">
+            <a:fld id="{1BB9FED5-F824-433C-99C1-5516832CDAB5}" type="slidenum">
               <a:t>&lt;#&gt;</a:t>
             </a:fld>
           </a:p>
@@ -7575,7 +7575,7 @@
         <p:txBody>
           <a:bodyPr/>
           <a:p>
-            <a:fld id="{DBCFA5F1-7693-4737-8CD5-11593262719E}" type="slidenum">
+            <a:fld id="{9657DBC7-7F7B-40D4-ADEF-EAFF72A46FA5}" type="slidenum">
               <a:t>&lt;#&gt;</a:t>
             </a:fld>
           </a:p>
@@ -7856,7 +7856,7 @@
         <p:txBody>
           <a:bodyPr/>
           <a:p>
-            <a:fld id="{993C5315-B083-4BAB-9CF4-DA6CD8195FA3}" type="slidenum">
+            <a:fld id="{C225009E-206B-4981-87AD-3745875B6DC4}" type="slidenum">
               <a:t>&lt;#&gt;</a:t>
             </a:fld>
           </a:p>
@@ -7898,7 +7898,7 @@
         <p:txBody>
           <a:bodyPr/>
           <a:p>
-            <a:fld id="{D3C99175-8AE4-48ED-9C7D-0F4EEE8B22E4}" type="slidenum">
+            <a:fld id="{52C74A14-BFB3-4B96-ABC8-2914543118A6}" type="slidenum">
               <a:t>&lt;#&gt;</a:t>
             </a:fld>
           </a:p>
@@ -8010,7 +8010,7 @@
         <p:txBody>
           <a:bodyPr/>
           <a:p>
-            <a:fld id="{E8DCF938-4F8E-4DB9-AFC3-C690C3411F12}" type="slidenum">
+            <a:fld id="{A255F44C-5AFB-484F-A333-261F9239FB93}" type="slidenum">
               <a:t>&lt;#&gt;</a:t>
             </a:fld>
           </a:p>
@@ -8121,7 +8121,7 @@
         <p:txBody>
           <a:bodyPr/>
           <a:p>
-            <a:fld id="{8750C4D8-5589-4E42-8437-542CA9F8F22D}" type="slidenum">
+            <a:fld id="{2A4C9C03-2CF1-4514-941C-F8F4E90DD2CE}" type="slidenum">
               <a:t>&lt;#&gt;</a:t>
             </a:fld>
           </a:p>
@@ -8266,7 +8266,7 @@
         <p:txBody>
           <a:bodyPr/>
           <a:p>
-            <a:fld id="{FF543E05-AC0D-4FBC-AFD0-9092166174D1}" type="slidenum">
+            <a:fld id="{B0AEFA77-593C-4AEB-9FAE-B73A5C8725A5}" type="slidenum">
               <a:t>&lt;#&gt;</a:t>
             </a:fld>
           </a:p>
@@ -8343,7 +8343,7 @@
         <p:txBody>
           <a:bodyPr/>
           <a:p>
-            <a:fld id="{209F245F-E34F-4EED-AF31-34B4ED9FDB9E}" type="slidenum">
+            <a:fld id="{30B594EA-2178-4639-BD87-4738A3E1683A}" type="slidenum">
               <a:t>&lt;#&gt;</a:t>
             </a:fld>
           </a:p>
@@ -8454,7 +8454,7 @@
         <p:txBody>
           <a:bodyPr/>
           <a:p>
-            <a:fld id="{60FE072E-25F9-465C-815E-96E6597E2FF3}" type="slidenum">
+            <a:fld id="{FC77236D-7E9C-4193-AF0F-F16E6DB77985}" type="slidenum">
               <a:t>&lt;#&gt;</a:t>
             </a:fld>
           </a:p>
@@ -8531,7 +8531,7 @@
         <p:txBody>
           <a:bodyPr/>
           <a:p>
-            <a:fld id="{EA54D86B-BC81-438F-9329-BB6ABAFD259B}" type="slidenum">
+            <a:fld id="{6BEC3888-1276-4A90-9A56-B151A84F66AD}" type="slidenum">
               <a:t>&lt;#&gt;</a:t>
             </a:fld>
           </a:p>
@@ -8710,7 +8710,7 @@
         <p:txBody>
           <a:bodyPr/>
           <a:p>
-            <a:fld id="{73E06DC3-427C-442B-92FC-4FF39A6D9399}" type="slidenum">
+            <a:fld id="{34D83581-97B2-4DC9-BDBB-7D9D568A82A6}" type="slidenum">
               <a:t>&lt;#&gt;</a:t>
             </a:fld>
           </a:p>
@@ -8889,7 +8889,7 @@
         <p:txBody>
           <a:bodyPr/>
           <a:p>
-            <a:fld id="{2D570A06-22C4-4120-A98B-C37F63FCB5F3}" type="slidenum">
+            <a:fld id="{1045B0F9-3542-4F3E-B5DF-919C2EF28743}" type="slidenum">
               <a:t>&lt;#&gt;</a:t>
             </a:fld>
           </a:p>
@@ -9068,7 +9068,7 @@
         <p:txBody>
           <a:bodyPr/>
           <a:p>
-            <a:fld id="{135C5E99-F913-4ADC-BCBC-D95CC5354C03}" type="slidenum">
+            <a:fld id="{69D88192-C0B1-4825-9CD4-E235634E2C7D}" type="slidenum">
               <a:t>&lt;#&gt;</a:t>
             </a:fld>
           </a:p>
@@ -9213,7 +9213,7 @@
         <p:txBody>
           <a:bodyPr/>
           <a:p>
-            <a:fld id="{404F21AF-8F6E-4235-9A9E-3AA764D8DF33}" type="slidenum">
+            <a:fld id="{D434BF29-912E-4C36-8AF9-9CDEC16B91A7}" type="slidenum">
               <a:t>&lt;#&gt;</a:t>
             </a:fld>
           </a:p>
@@ -9426,7 +9426,7 @@
         <p:txBody>
           <a:bodyPr/>
           <a:p>
-            <a:fld id="{53B492D4-A290-4A36-AA9F-904F41FEDD4A}" type="slidenum">
+            <a:fld id="{4CA77E80-F85F-46C4-87A1-39BDF912D508}" type="slidenum">
               <a:t>&lt;#&gt;</a:t>
             </a:fld>
           </a:p>
@@ -9707,7 +9707,7 @@
         <p:txBody>
           <a:bodyPr/>
           <a:p>
-            <a:fld id="{62CC3D6B-29C8-48E9-804B-58EDB824D8E2}" type="slidenum">
+            <a:fld id="{E5EBA796-8308-4C98-803B-C097760C37D9}" type="slidenum">
               <a:t>&lt;#&gt;</a:t>
             </a:fld>
           </a:p>
@@ -9749,7 +9749,7 @@
         <p:txBody>
           <a:bodyPr/>
           <a:p>
-            <a:fld id="{605EC667-DEFF-4F8F-B18B-56B1CA02D3BB}" type="slidenum">
+            <a:fld id="{777664E1-26BE-4A93-A5B8-FCFC6E03BB6E}" type="slidenum">
               <a:t>&lt;#&gt;</a:t>
             </a:fld>
           </a:p>
@@ -9861,7 +9861,7 @@
         <p:txBody>
           <a:bodyPr/>
           <a:p>
-            <a:fld id="{5CC9C511-6B6A-475F-B397-4F6A60AA58D4}" type="slidenum">
+            <a:fld id="{86ACC610-44E6-4BE0-B2FD-95BF27A4933B}" type="slidenum">
               <a:t>&lt;#&gt;</a:t>
             </a:fld>
           </a:p>
@@ -9972,7 +9972,7 @@
         <p:txBody>
           <a:bodyPr/>
           <a:p>
-            <a:fld id="{B57051DD-CD2A-4EDA-8B56-9DA570E88317}" type="slidenum">
+            <a:fld id="{3649D87E-1CF5-4C57-ABA6-4A228CB0919F}" type="slidenum">
               <a:t>&lt;#&gt;</a:t>
             </a:fld>
           </a:p>
@@ -10117,7 +10117,7 @@
         <p:txBody>
           <a:bodyPr/>
           <a:p>
-            <a:fld id="{42B78860-13FA-4F78-8057-4FF29C0B82CF}" type="slidenum">
+            <a:fld id="{491172B1-031F-419A-A5AD-C62E380D57F3}" type="slidenum">
               <a:t>&lt;#&gt;</a:t>
             </a:fld>
           </a:p>
@@ -10262,7 +10262,7 @@
         <p:txBody>
           <a:bodyPr/>
           <a:p>
-            <a:fld id="{43AB2E5E-7AA4-4012-937E-2DAB086F0864}" type="slidenum">
+            <a:fld id="{16E3619F-D112-444A-B20B-B5E88B64F3AA}" type="slidenum">
               <a:t>&lt;#&gt;</a:t>
             </a:fld>
           </a:p>
@@ -10339,7 +10339,7 @@
         <p:txBody>
           <a:bodyPr/>
           <a:p>
-            <a:fld id="{A67EF0F2-4C5B-41AF-9E42-6CB3F175E3FA}" type="slidenum">
+            <a:fld id="{1A81A7DA-E6CE-4FD0-BDCB-7E65475DCE49}" type="slidenum">
               <a:t>&lt;#&gt;</a:t>
             </a:fld>
           </a:p>
@@ -10416,7 +10416,7 @@
         <p:txBody>
           <a:bodyPr/>
           <a:p>
-            <a:fld id="{5EBDACD5-8745-4C79-859A-A9CA050B122F}" type="slidenum">
+            <a:fld id="{040EABEB-3539-4585-BF42-5FB6CA22C24A}" type="slidenum">
               <a:t>&lt;#&gt;</a:t>
             </a:fld>
           </a:p>
@@ -10595,7 +10595,7 @@
         <p:txBody>
           <a:bodyPr/>
           <a:p>
-            <a:fld id="{4DE66E93-E688-4825-9FDE-F6B63A65E01C}" type="slidenum">
+            <a:fld id="{B3416FEA-9171-44C9-99B2-1FDFBEA00C25}" type="slidenum">
               <a:t>&lt;#&gt;</a:t>
             </a:fld>
           </a:p>
@@ -10774,7 +10774,7 @@
         <p:txBody>
           <a:bodyPr/>
           <a:p>
-            <a:fld id="{DFAF8582-EF02-4935-97D6-0DE88BFE7952}" type="slidenum">
+            <a:fld id="{DB6D56BC-0397-4433-9F62-0BEC44941FF1}" type="slidenum">
               <a:t>&lt;#&gt;</a:t>
             </a:fld>
           </a:p>
@@ -10953,7 +10953,7 @@
         <p:txBody>
           <a:bodyPr/>
           <a:p>
-            <a:fld id="{234F4E74-AE90-4930-9F48-D3E0FFEE2FCC}" type="slidenum">
+            <a:fld id="{45CB3B6B-2600-4371-A38A-C84A2266E78F}" type="slidenum">
               <a:t>&lt;#&gt;</a:t>
             </a:fld>
           </a:p>
@@ -11098,7 +11098,7 @@
         <p:txBody>
           <a:bodyPr/>
           <a:p>
-            <a:fld id="{AA8CCE7F-B135-4263-A182-5BC97E4C4977}" type="slidenum">
+            <a:fld id="{9E2A1D80-B2DD-4CF5-8BA9-1C269C74C018}" type="slidenum">
               <a:t>&lt;#&gt;</a:t>
             </a:fld>
           </a:p>
@@ -11311,7 +11311,7 @@
         <p:txBody>
           <a:bodyPr/>
           <a:p>
-            <a:fld id="{FBF91B52-0AFA-4FF6-8FC2-478615890E39}" type="slidenum">
+            <a:fld id="{01A886A8-21EA-4350-80CE-6438973A0835}" type="slidenum">
               <a:t>&lt;#&gt;</a:t>
             </a:fld>
           </a:p>
@@ -11592,7 +11592,7 @@
         <p:txBody>
           <a:bodyPr/>
           <a:p>
-            <a:fld id="{97E3B2A8-76A9-4C43-A76E-6D286C46132C}" type="slidenum">
+            <a:fld id="{2425E4F0-B4D9-48FA-9449-466DDA4B436A}" type="slidenum">
               <a:t>&lt;#&gt;</a:t>
             </a:fld>
           </a:p>
@@ -11634,7 +11634,7 @@
         <p:txBody>
           <a:bodyPr/>
           <a:p>
-            <a:fld id="{9EEB448A-CA1B-4D79-9F0F-45439A849829}" type="slidenum">
+            <a:fld id="{AF165869-5B97-4361-BF86-BC637D13715D}" type="slidenum">
               <a:t>&lt;#&gt;</a:t>
             </a:fld>
           </a:p>
@@ -11711,7 +11711,7 @@
         <p:txBody>
           <a:bodyPr/>
           <a:p>
-            <a:fld id="{C9C25741-1DC3-43DD-9AAD-C0B892E62350}" type="slidenum">
+            <a:fld id="{AB3C8924-C9F1-44E5-9DB0-1D7A37440967}" type="slidenum">
               <a:t>&lt;#&gt;</a:t>
             </a:fld>
           </a:p>
@@ -11823,7 +11823,7 @@
         <p:txBody>
           <a:bodyPr/>
           <a:p>
-            <a:fld id="{0664B2A4-FF8C-493A-B96D-CF386AD78B49}" type="slidenum">
+            <a:fld id="{9C31CE48-FBE2-40B6-B246-585C2D446CA9}" type="slidenum">
               <a:t>&lt;#&gt;</a:t>
             </a:fld>
           </a:p>
@@ -11934,7 +11934,7 @@
         <p:txBody>
           <a:bodyPr/>
           <a:p>
-            <a:fld id="{0027878D-9CCC-4430-8836-812DE1B1D0EA}" type="slidenum">
+            <a:fld id="{A9C4924C-32D3-48B6-ADC6-EEE9B49C531D}" type="slidenum">
               <a:t>&lt;#&gt;</a:t>
             </a:fld>
           </a:p>
@@ -12079,7 +12079,7 @@
         <p:txBody>
           <a:bodyPr/>
           <a:p>
-            <a:fld id="{DE66765D-1649-44D1-B776-74D48780F56D}" type="slidenum">
+            <a:fld id="{6FAFFE66-5762-4925-B653-C81EC4D340D8}" type="slidenum">
               <a:t>&lt;#&gt;</a:t>
             </a:fld>
           </a:p>
@@ -12156,7 +12156,7 @@
         <p:txBody>
           <a:bodyPr/>
           <a:p>
-            <a:fld id="{5591B8D8-E6A6-4390-8CE1-517629838AF1}" type="slidenum">
+            <a:fld id="{CA7A918F-70B1-4292-993B-8157039E0809}" type="slidenum">
               <a:t>&lt;#&gt;</a:t>
             </a:fld>
           </a:p>
@@ -12233,7 +12233,7 @@
         <p:txBody>
           <a:bodyPr/>
           <a:p>
-            <a:fld id="{C4FAA9E4-490F-4FA4-B4D3-8E65466ADBB2}" type="slidenum">
+            <a:fld id="{61A241F9-BE3D-4507-93EA-6A1796C281AF}" type="slidenum">
               <a:t>&lt;#&gt;</a:t>
             </a:fld>
           </a:p>
@@ -12412,7 +12412,7 @@
         <p:txBody>
           <a:bodyPr/>
           <a:p>
-            <a:fld id="{49DFD11D-42D6-4B13-AF74-6CBC7274ADC5}" type="slidenum">
+            <a:fld id="{E3971D43-59F0-4661-9F6F-F516312D1F1C}" type="slidenum">
               <a:t>&lt;#&gt;</a:t>
             </a:fld>
           </a:p>
@@ -12591,7 +12591,7 @@
         <p:txBody>
           <a:bodyPr/>
           <a:p>
-            <a:fld id="{1595683B-7A98-4FF4-B4E4-FA86DAF795C6}" type="slidenum">
+            <a:fld id="{C0CF3B8D-D880-438F-865F-729165545480}" type="slidenum">
               <a:t>&lt;#&gt;</a:t>
             </a:fld>
           </a:p>
@@ -12770,7 +12770,7 @@
         <p:txBody>
           <a:bodyPr/>
           <a:p>
-            <a:fld id="{D3E0F4DD-CA3F-4CBC-B5C8-BA18742DA0CA}" type="slidenum">
+            <a:fld id="{5D9547EC-0C28-4DAA-BC32-D23FDD33FDCC}" type="slidenum">
               <a:t>&lt;#&gt;</a:t>
             </a:fld>
           </a:p>
@@ -12915,7 +12915,7 @@
         <p:txBody>
           <a:bodyPr/>
           <a:p>
-            <a:fld id="{E093BE9F-E66F-40F5-8304-7446C9F7F80C}" type="slidenum">
+            <a:fld id="{ABBCC912-5C84-48E5-98B2-3B889CB12570}" type="slidenum">
               <a:t>&lt;#&gt;</a:t>
             </a:fld>
           </a:p>
@@ -13128,7 +13128,7 @@
         <p:txBody>
           <a:bodyPr/>
           <a:p>
-            <a:fld id="{B5580498-08B5-48A1-AC3E-3A045692DD67}" type="slidenum">
+            <a:fld id="{11602460-AC6D-4A08-9D0A-B7FB989E91CB}" type="slidenum">
               <a:t>&lt;#&gt;</a:t>
             </a:fld>
           </a:p>
@@ -13205,7 +13205,7 @@
         <p:txBody>
           <a:bodyPr/>
           <a:p>
-            <a:fld id="{51AE54F6-5438-4E8C-A58F-27C03626999B}" type="slidenum">
+            <a:fld id="{A5BFD841-AF0A-47B1-B3BE-67017C6F8933}" type="slidenum">
               <a:t>&lt;#&gt;</a:t>
             </a:fld>
           </a:p>
@@ -13486,7 +13486,7 @@
         <p:txBody>
           <a:bodyPr/>
           <a:p>
-            <a:fld id="{49D9B2D4-59A2-4681-89FA-74CA6F894D12}" type="slidenum">
+            <a:fld id="{2032B794-A510-4A2C-967C-E36B0421551D}" type="slidenum">
               <a:t>&lt;#&gt;</a:t>
             </a:fld>
           </a:p>
@@ -13528,7 +13528,7 @@
         <p:txBody>
           <a:bodyPr/>
           <a:p>
-            <a:fld id="{D9C25FAC-F000-40B0-832F-92E6053EF370}" type="slidenum">
+            <a:fld id="{A915AC5C-47D9-46DC-BCC7-61799E278298}" type="slidenum">
               <a:t>&lt;#&gt;</a:t>
             </a:fld>
           </a:p>
@@ -13640,7 +13640,7 @@
         <p:txBody>
           <a:bodyPr/>
           <a:p>
-            <a:fld id="{5FB32E9D-DA53-431E-9E91-A8996475F761}" type="slidenum">
+            <a:fld id="{EB4D3841-6CF7-458C-BF37-FD1801D9290A}" type="slidenum">
               <a:t>&lt;#&gt;</a:t>
             </a:fld>
           </a:p>
@@ -13751,7 +13751,7 @@
         <p:txBody>
           <a:bodyPr/>
           <a:p>
-            <a:fld id="{2B811881-2A2C-479F-8EF0-B0F8CACF82CE}" type="slidenum">
+            <a:fld id="{7859F7EF-0650-409B-9C38-ED2796D10DAC}" type="slidenum">
               <a:t>&lt;#&gt;</a:t>
             </a:fld>
           </a:p>
@@ -13896,7 +13896,7 @@
         <p:txBody>
           <a:bodyPr/>
           <a:p>
-            <a:fld id="{A067B639-F687-420E-9415-C23F862286ED}" type="slidenum">
+            <a:fld id="{46970E3F-052F-4FAA-A3FC-53D28552388A}" type="slidenum">
               <a:t>&lt;#&gt;</a:t>
             </a:fld>
           </a:p>
@@ -13973,7 +13973,7 @@
         <p:txBody>
           <a:bodyPr/>
           <a:p>
-            <a:fld id="{5AA8EDCB-C741-443B-BFFE-666ECDBFEF7A}" type="slidenum">
+            <a:fld id="{0E340DFF-73F4-40E8-9C96-F971CB5FBA79}" type="slidenum">
               <a:t>&lt;#&gt;</a:t>
             </a:fld>
           </a:p>
@@ -14050,7 +14050,7 @@
         <p:txBody>
           <a:bodyPr/>
           <a:p>
-            <a:fld id="{E5AE19A1-D42B-4F89-8D8B-7645F1408EF4}" type="slidenum">
+            <a:fld id="{05049F7E-32A4-426A-A055-57287BA2CAD1}" type="slidenum">
               <a:t>&lt;#&gt;</a:t>
             </a:fld>
           </a:p>
@@ -14229,7 +14229,7 @@
         <p:txBody>
           <a:bodyPr/>
           <a:p>
-            <a:fld id="{E0778F1B-2A47-4B58-8A97-09FB56ED894E}" type="slidenum">
+            <a:fld id="{785D742A-7DE9-40BD-B18E-6C0FEA63F5A0}" type="slidenum">
               <a:t>&lt;#&gt;</a:t>
             </a:fld>
           </a:p>
@@ -14408,7 +14408,7 @@
         <p:txBody>
           <a:bodyPr/>
           <a:p>
-            <a:fld id="{4157ADED-C501-4195-8F08-AAA69DBA9C6A}" type="slidenum">
+            <a:fld id="{20297989-9DE2-417A-8814-C62C4D20C8DA}" type="slidenum">
               <a:t>&lt;#&gt;</a:t>
             </a:fld>
           </a:p>
@@ -14587,7 +14587,7 @@
         <p:txBody>
           <a:bodyPr/>
           <a:p>
-            <a:fld id="{859FAA3B-08D3-4822-853D-A1EDBA3294C1}" type="slidenum">
+            <a:fld id="{CA214B0E-19C1-4C01-9ED1-A004E381CF94}" type="slidenum">
               <a:t>&lt;#&gt;</a:t>
             </a:fld>
           </a:p>
@@ -14766,7 +14766,7 @@
         <p:txBody>
           <a:bodyPr/>
           <a:p>
-            <a:fld id="{09711C9B-8A64-46D2-9655-72318F18B63D}" type="slidenum">
+            <a:fld id="{3F8FEE8D-5A2F-46AE-9CED-BAD4766ED98A}" type="slidenum">
               <a:t>&lt;#&gt;</a:t>
             </a:fld>
           </a:p>
@@ -14911,7 +14911,7 @@
         <p:txBody>
           <a:bodyPr/>
           <a:p>
-            <a:fld id="{16F64300-2BF9-4A00-852A-E6E5E0202933}" type="slidenum">
+            <a:fld id="{337339F2-820A-4136-8CE1-C87090F8C340}" type="slidenum">
               <a:t>&lt;#&gt;</a:t>
             </a:fld>
           </a:p>
@@ -15124,7 +15124,7 @@
         <p:txBody>
           <a:bodyPr/>
           <a:p>
-            <a:fld id="{B5802F4B-0447-4B8F-87F8-761FA49D4BC6}" type="slidenum">
+            <a:fld id="{DC1C7060-2A7A-40AD-BF27-6943093CCE96}" type="slidenum">
               <a:t>&lt;#&gt;</a:t>
             </a:fld>
           </a:p>
@@ -15405,7 +15405,7 @@
         <p:txBody>
           <a:bodyPr/>
           <a:p>
-            <a:fld id="{36820706-0527-4125-B7A9-6F4C24C09BCE}" type="slidenum">
+            <a:fld id="{5E715821-AF7F-4608-BCA7-62D760405570}" type="slidenum">
               <a:t>&lt;#&gt;</a:t>
             </a:fld>
           </a:p>
@@ -15447,7 +15447,7 @@
         <p:txBody>
           <a:bodyPr/>
           <a:p>
-            <a:fld id="{6FB3D14B-E4CD-4B14-A4A5-286F60CAD1ED}" type="slidenum">
+            <a:fld id="{7A5D9F28-EBE6-4574-919B-D2B1ACA7617E}" type="slidenum">
               <a:t>&lt;#&gt;</a:t>
             </a:fld>
           </a:p>
@@ -15559,7 +15559,7 @@
         <p:txBody>
           <a:bodyPr/>
           <a:p>
-            <a:fld id="{F5C285BC-6A32-4C8A-A9AC-FC7AD07996D9}" type="slidenum">
+            <a:fld id="{718B9427-0849-4B31-9BDF-7C13528F94EC}" type="slidenum">
               <a:t>&lt;#&gt;</a:t>
             </a:fld>
           </a:p>
@@ -15670,7 +15670,7 @@
         <p:txBody>
           <a:bodyPr/>
           <a:p>
-            <a:fld id="{F5111B49-941F-4122-84D1-7F989F34028B}" type="slidenum">
+            <a:fld id="{6A3A9C89-E04F-493D-B3B0-6C21BAAABB2C}" type="slidenum">
               <a:t>&lt;#&gt;</a:t>
             </a:fld>
           </a:p>
@@ -15815,7 +15815,7 @@
         <p:txBody>
           <a:bodyPr/>
           <a:p>
-            <a:fld id="{97926FF5-ACF4-49A9-A4A0-9B08FAF08A51}" type="slidenum">
+            <a:fld id="{34CE3D2B-8611-4358-89F2-9FCA6BF9827B}" type="slidenum">
               <a:t>&lt;#&gt;</a:t>
             </a:fld>
           </a:p>
@@ -15892,7 +15892,7 @@
         <p:txBody>
           <a:bodyPr/>
           <a:p>
-            <a:fld id="{D6C6F76A-58B6-41A5-8C49-710F36D3C453}" type="slidenum">
+            <a:fld id="{18B6614D-7600-4F73-A54C-44BDC70102FA}" type="slidenum">
               <a:t>&lt;#&gt;</a:t>
             </a:fld>
           </a:p>
@@ -15969,7 +15969,7 @@
         <p:txBody>
           <a:bodyPr/>
           <a:p>
-            <a:fld id="{17964567-954A-4E7C-8140-1747A3C75581}" type="slidenum">
+            <a:fld id="{20B909A5-F376-4D2E-9717-625F5E0E43B8}" type="slidenum">
               <a:t>&lt;#&gt;</a:t>
             </a:fld>
           </a:p>
@@ -16148,7 +16148,7 @@
         <p:txBody>
           <a:bodyPr/>
           <a:p>
-            <a:fld id="{85F65F82-581E-46D2-B27A-5EE428929571}" type="slidenum">
+            <a:fld id="{DAC32B9F-6D7D-440C-8A5E-900B39C3313C}" type="slidenum">
               <a:t>&lt;#&gt;</a:t>
             </a:fld>
           </a:p>
@@ -16419,7 +16419,7 @@
         <p:txBody>
           <a:bodyPr/>
           <a:p>
-            <a:fld id="{DB453E20-8964-48E0-AF21-D6D3E8DBA46D}" type="slidenum">
+            <a:fld id="{09DEF4CC-5572-481B-8913-17E95877B8A2}" type="slidenum">
               <a:t>&lt;#&gt;</a:t>
             </a:fld>
           </a:p>
@@ -16598,7 +16598,7 @@
         <p:txBody>
           <a:bodyPr/>
           <a:p>
-            <a:fld id="{AB2377D0-DD5C-4270-9A7F-B2E8DA9DDBFC}" type="slidenum">
+            <a:fld id="{70A79DAC-486D-4E2E-998D-0772BBB87E33}" type="slidenum">
               <a:t>&lt;#&gt;</a:t>
             </a:fld>
           </a:p>
@@ -16777,7 +16777,7 @@
         <p:txBody>
           <a:bodyPr/>
           <a:p>
-            <a:fld id="{B9658F80-E723-461E-A8F2-F1F3865B103E}" type="slidenum">
+            <a:fld id="{31A2ACFE-DE42-48E9-8D49-34B657A10C57}" type="slidenum">
               <a:t>&lt;#&gt;</a:t>
             </a:fld>
           </a:p>
@@ -16922,7 +16922,7 @@
         <p:txBody>
           <a:bodyPr/>
           <a:p>
-            <a:fld id="{0F7759B6-075E-483B-9C18-91CF5D7E7856}" type="slidenum">
+            <a:fld id="{08DB194B-80DB-4365-A937-EADB840C6415}" type="slidenum">
               <a:t>&lt;#&gt;</a:t>
             </a:fld>
           </a:p>
@@ -17135,7 +17135,7 @@
         <p:txBody>
           <a:bodyPr/>
           <a:p>
-            <a:fld id="{8C930417-8D46-4C8A-A1F2-EFE76BF5F8A3}" type="slidenum">
+            <a:fld id="{67088A9D-E2D6-41ED-BE47-5DE9EE6AEA5D}" type="slidenum">
               <a:t>&lt;#&gt;</a:t>
             </a:fld>
           </a:p>
@@ -17416,7 +17416,7 @@
         <p:txBody>
           <a:bodyPr/>
           <a:p>
-            <a:fld id="{B9D4FFA9-2D4D-4D0A-B4DB-0ACC39601317}" type="slidenum">
+            <a:fld id="{F4BD0791-F8F4-4C57-82D0-40E42A0CBAF3}" type="slidenum">
               <a:t>&lt;#&gt;</a:t>
             </a:fld>
           </a:p>
@@ -17458,7 +17458,7 @@
         <p:txBody>
           <a:bodyPr/>
           <a:p>
-            <a:fld id="{3238B45B-6F76-4C80-8776-0E9DED8FD9FB}" type="slidenum">
+            <a:fld id="{AB8E2AB6-8998-43DE-A653-D37B271D0B05}" type="slidenum">
               <a:t>&lt;#&gt;</a:t>
             </a:fld>
           </a:p>
@@ -17570,7 +17570,7 @@
         <p:txBody>
           <a:bodyPr/>
           <a:p>
-            <a:fld id="{4EBD82F5-FE9D-4D00-9D4E-C78ACBAF4E6E}" type="slidenum">
+            <a:fld id="{C684EE1B-77E1-43A7-A774-A1C9C7DDE8B2}" type="slidenum">
               <a:t>&lt;#&gt;</a:t>
             </a:fld>
           </a:p>
@@ -17681,7 +17681,7 @@
         <p:txBody>
           <a:bodyPr/>
           <a:p>
-            <a:fld id="{541DFCB2-699A-4F0B-83FE-799C23D5734A}" type="slidenum">
+            <a:fld id="{37BEC083-6067-4830-92B7-9EAC1D7F5E4D}" type="slidenum">
               <a:t>&lt;#&gt;</a:t>
             </a:fld>
           </a:p>
@@ -17826,7 +17826,7 @@
         <p:txBody>
           <a:bodyPr/>
           <a:p>
-            <a:fld id="{50D03C15-D616-4218-99EB-6B9C7701DDF3}" type="slidenum">
+            <a:fld id="{63885978-2474-445E-A3A4-B66E8DB7CCE6}" type="slidenum">
               <a:t>&lt;#&gt;</a:t>
             </a:fld>
           </a:p>
@@ -17903,7 +17903,7 @@
         <p:txBody>
           <a:bodyPr/>
           <a:p>
-            <a:fld id="{82027987-783F-4263-B59B-66590B3CD15C}" type="slidenum">
+            <a:fld id="{3A87909B-6285-43BF-B6D6-FC59939A7A39}" type="slidenum">
               <a:t>&lt;#&gt;</a:t>
             </a:fld>
           </a:p>
@@ -18082,7 +18082,7 @@
         <p:txBody>
           <a:bodyPr/>
           <a:p>
-            <a:fld id="{EF0AD5FD-06FD-43BF-BA2C-876ED6D24039}" type="slidenum">
+            <a:fld id="{A8AFA968-C047-431F-B006-9E5E6F493737}" type="slidenum">
               <a:t>&lt;#&gt;</a:t>
             </a:fld>
           </a:p>
@@ -18159,7 +18159,7 @@
         <p:txBody>
           <a:bodyPr/>
           <a:p>
-            <a:fld id="{5DFD9085-2670-4A64-BAAA-D47C419E904A}" type="slidenum">
+            <a:fld id="{8E943AFD-86FC-4E13-B3CC-3180D103D059}" type="slidenum">
               <a:t>&lt;#&gt;</a:t>
             </a:fld>
           </a:p>
@@ -18338,7 +18338,7 @@
         <p:txBody>
           <a:bodyPr/>
           <a:p>
-            <a:fld id="{3EE4E334-112B-4CEA-8AC8-BAC7C3078D93}" type="slidenum">
+            <a:fld id="{89105961-F668-4BF5-8965-DEC21A7226B2}" type="slidenum">
               <a:t>&lt;#&gt;</a:t>
             </a:fld>
           </a:p>
@@ -18517,7 +18517,7 @@
         <p:txBody>
           <a:bodyPr/>
           <a:p>
-            <a:fld id="{ADFC2290-A6D1-4E2B-A964-BC0ECA5A5D69}" type="slidenum">
+            <a:fld id="{24FA2E12-D94D-406C-AE78-C02E30F0414A}" type="slidenum">
               <a:t>&lt;#&gt;</a:t>
             </a:fld>
           </a:p>
@@ -18696,7 +18696,7 @@
         <p:txBody>
           <a:bodyPr/>
           <a:p>
-            <a:fld id="{8057A4DB-3235-4A7E-BC25-7805EC34BBB3}" type="slidenum">
+            <a:fld id="{93257FC7-5900-4799-9EC9-922F319C84B5}" type="slidenum">
               <a:t>&lt;#&gt;</a:t>
             </a:fld>
           </a:p>
@@ -18841,7 +18841,7 @@
         <p:txBody>
           <a:bodyPr/>
           <a:p>
-            <a:fld id="{7DB6F785-53FA-4E4B-8962-0CB9F83BB763}" type="slidenum">
+            <a:fld id="{BC18E13A-61F6-4672-B135-55AF5D7031E1}" type="slidenum">
               <a:t>&lt;#&gt;</a:t>
             </a:fld>
           </a:p>
@@ -19054,7 +19054,7 @@
         <p:txBody>
           <a:bodyPr/>
           <a:p>
-            <a:fld id="{6D04E9B0-A76E-46C3-89FB-04E8E4B029D9}" type="slidenum">
+            <a:fld id="{F89A6FD7-7628-4BC8-BA89-602AA48B8FD4}" type="slidenum">
               <a:t>&lt;#&gt;</a:t>
             </a:fld>
           </a:p>
@@ -19335,7 +19335,7 @@
         <p:txBody>
           <a:bodyPr/>
           <a:p>
-            <a:fld id="{DE81722F-391C-48FF-8111-42D7C34EFB29}" type="slidenum">
+            <a:fld id="{ACD7E2D7-7DE5-4CB3-A4E9-8E6D047C0FC2}" type="slidenum">
               <a:t>&lt;#&gt;</a:t>
             </a:fld>
           </a:p>
@@ -19480,7 +19480,7 @@
         <p:txBody>
           <a:bodyPr/>
           <a:p>
-            <a:fld id="{67BB5F43-0F0F-4ED9-B721-080E652009C3}" type="slidenum">
+            <a:fld id="{A916FA81-FACE-4167-9267-C727C99D661C}" type="slidenum">
               <a:t>&lt;#&gt;</a:t>
             </a:fld>
           </a:p>
@@ -19693,7 +19693,7 @@
         <p:txBody>
           <a:bodyPr/>
           <a:p>
-            <a:fld id="{68271711-EA50-46B7-99D3-9BCBB995D170}" type="slidenum">
+            <a:fld id="{7FA7CBEF-3909-4FD8-BC80-D3B10A5DF3F4}" type="slidenum">
               <a:t>&lt;#&gt;</a:t>
             </a:fld>
           </a:p>
@@ -19974,7 +19974,7 @@
         <p:txBody>
           <a:bodyPr/>
           <a:p>
-            <a:fld id="{6CAE18E4-FA1D-4F12-A8FE-B4068D53CCB8}" type="slidenum">
+            <a:fld id="{DB3199CA-D461-4F89-8AC8-8EF2DAFADC67}" type="slidenum">
               <a:t>&lt;#&gt;</a:t>
             </a:fld>
           </a:p>
@@ -20016,7 +20016,7 @@
         <p:txBody>
           <a:bodyPr/>
           <a:p>
-            <a:fld id="{D1ECF31C-73F8-4F99-A06E-92F39246F3C2}" type="slidenum">
+            <a:fld id="{FF926452-5872-4D40-B5A6-BD377EC1762B}" type="slidenum">
               <a:t>&lt;#&gt;</a:t>
             </a:fld>
           </a:p>
@@ -20128,7 +20128,7 @@
         <p:txBody>
           <a:bodyPr/>
           <a:p>
-            <a:fld id="{57293334-6242-403A-AF20-1AA6168A77DE}" type="slidenum">
+            <a:fld id="{7BE6ED05-EA89-4C61-B3B1-3FDDF5094879}" type="slidenum">
               <a:t>&lt;#&gt;</a:t>
             </a:fld>
           </a:p>
@@ -20239,7 +20239,7 @@
         <p:txBody>
           <a:bodyPr/>
           <a:p>
-            <a:fld id="{DB764DED-29CA-45BF-A310-9EC847864EC2}" type="slidenum">
+            <a:fld id="{BA04F9F0-56AC-460B-A62A-21313681F5B1}" type="slidenum">
               <a:t>&lt;#&gt;</a:t>
             </a:fld>
           </a:p>
@@ -20384,7 +20384,7 @@
         <p:txBody>
           <a:bodyPr/>
           <a:p>
-            <a:fld id="{F3DF476D-66F8-4AFB-B69B-AA5C7D9C244B}" type="slidenum">
+            <a:fld id="{62CA7E9F-1409-4667-A97E-755C654DA016}" type="slidenum">
               <a:t>&lt;#&gt;</a:t>
             </a:fld>
           </a:p>
@@ -20461,7 +20461,7 @@
         <p:txBody>
           <a:bodyPr/>
           <a:p>
-            <a:fld id="{5D6B973E-426C-4056-9C4D-5CA325F7DC0F}" type="slidenum">
+            <a:fld id="{84A13631-7D0D-4AF0-83E3-6040754A2AF3}" type="slidenum">
               <a:t>&lt;#&gt;</a:t>
             </a:fld>
           </a:p>
@@ -20629,7 +20629,7 @@
         <p:txBody>
           <a:bodyPr/>
           <a:p>
-            <a:fld id="{CE151869-0A22-4A14-B408-E49A0D2A084D}" type="slidenum">
+            <a:fld id="{F9438DA3-DA64-4952-94A8-5D0D0C44A1C4}" type="slidenum">
               <a:t>&lt;#&gt;</a:t>
             </a:fld>
           </a:p>
@@ -20808,7 +20808,7 @@
         <p:txBody>
           <a:bodyPr/>
           <a:p>
-            <a:fld id="{DA82F316-04FB-4A13-80F9-9520B3C15B67}" type="slidenum">
+            <a:fld id="{179AA876-8ECF-46D1-BA43-805C6B6EE145}" type="slidenum">
               <a:t>&lt;#&gt;</a:t>
             </a:fld>
           </a:p>
@@ -20987,7 +20987,7 @@
         <p:txBody>
           <a:bodyPr/>
           <a:p>
-            <a:fld id="{11A8ABC1-D0BD-4BA9-B415-7E69756B34F6}" type="slidenum">
+            <a:fld id="{995CACB7-9A85-4815-81C6-1707F32987F7}" type="slidenum">
               <a:t>&lt;#&gt;</a:t>
             </a:fld>
           </a:p>
@@ -21166,7 +21166,7 @@
         <p:txBody>
           <a:bodyPr/>
           <a:p>
-            <a:fld id="{578E97D8-2A58-4492-95F9-066C9B82E0E4}" type="slidenum">
+            <a:fld id="{6C357410-87C8-48DB-98B3-0AF88F7C19B4}" type="slidenum">
               <a:t>&lt;#&gt;</a:t>
             </a:fld>
           </a:p>
@@ -21311,7 +21311,7 @@
         <p:txBody>
           <a:bodyPr/>
           <a:p>
-            <a:fld id="{346BD2C6-699F-4A07-86A5-817C6B27A15E}" type="slidenum">
+            <a:fld id="{C11822C6-6948-4F74-81CC-105C2E850DB4}" type="slidenum">
               <a:t>&lt;#&gt;</a:t>
             </a:fld>
           </a:p>
@@ -21524,7 +21524,7 @@
         <p:txBody>
           <a:bodyPr/>
           <a:p>
-            <a:fld id="{AE40423E-C01A-4346-A0FD-59EEFE7F46F7}" type="slidenum">
+            <a:fld id="{F1496D20-034C-4FD7-9BB1-1CC08A289BFB}" type="slidenum">
               <a:t>&lt;#&gt;</a:t>
             </a:fld>
           </a:p>
@@ -21805,7 +21805,7 @@
         <p:txBody>
           <a:bodyPr/>
           <a:p>
-            <a:fld id="{9D0197A6-7A02-4CE4-8148-AE7A927E602B}" type="slidenum">
+            <a:fld id="{556341D2-F6AC-40B5-81C8-B561BE0BAEF4}" type="slidenum">
               <a:t>&lt;#&gt;</a:t>
             </a:fld>
           </a:p>
@@ -21847,7 +21847,7 @@
         <p:txBody>
           <a:bodyPr/>
           <a:p>
-            <a:fld id="{0467DE55-6447-488B-99E0-2E84102D5C07}" type="slidenum">
+            <a:fld id="{A2EAA4FB-3354-4CDF-9899-C2FCE6D7B51F}" type="slidenum">
               <a:t>&lt;#&gt;</a:t>
             </a:fld>
           </a:p>
@@ -21959,7 +21959,7 @@
         <p:txBody>
           <a:bodyPr/>
           <a:p>
-            <a:fld id="{11C713FE-0E75-44E2-A7E5-26ED5F8EB6C6}" type="slidenum">
+            <a:fld id="{F8B6ECC2-B970-4FED-AA6E-600AC74EAECD}" type="slidenum">
               <a:t>&lt;#&gt;</a:t>
             </a:fld>
           </a:p>
@@ -22070,7 +22070,7 @@
         <p:txBody>
           <a:bodyPr/>
           <a:p>
-            <a:fld id="{1CCA1E42-B898-4DC9-B216-D143AB00047B}" type="slidenum">
+            <a:fld id="{6861084B-9626-47DE-8408-E029AA0DB082}" type="slidenum">
               <a:t>&lt;#&gt;</a:t>
             </a:fld>
           </a:p>
@@ -22340,7 +22340,7 @@
         <p:txBody>
           <a:bodyPr/>
           <a:p>
-            <a:fld id="{8D342FD5-D436-42C6-BD95-7C8FD686E9F6}" type="slidenum">
+            <a:fld id="{EF57D16B-8012-4D40-ABF5-FA09CC440388}" type="slidenum">
               <a:t>&lt;#&gt;</a:t>
             </a:fld>
           </a:p>
@@ -22417,7 +22417,7 @@
         <p:txBody>
           <a:bodyPr/>
           <a:p>
-            <a:fld id="{98D70947-86B1-47F7-A6E4-59CF46636FAB}" type="slidenum">
+            <a:fld id="{073B3CDC-55E4-4F9A-9AB5-7F00C895588B}" type="slidenum">
               <a:t>&lt;#&gt;</a:t>
             </a:fld>
           </a:p>
@@ -22494,7 +22494,7 @@
         <p:txBody>
           <a:bodyPr/>
           <a:p>
-            <a:fld id="{6F085784-AF2A-4C81-95A2-E549161266C0}" type="slidenum">
+            <a:fld id="{A8F47594-9ACE-4D47-8C50-920797D1E5AB}" type="slidenum">
               <a:t>&lt;#&gt;</a:t>
             </a:fld>
           </a:p>
@@ -22673,7 +22673,7 @@
         <p:txBody>
           <a:bodyPr/>
           <a:p>
-            <a:fld id="{30556A88-2FB8-4CAD-A55E-4F59DF6B044A}" type="slidenum">
+            <a:fld id="{CF45EFF9-A774-4C4A-97DD-A7D9902A7DC2}" type="slidenum">
               <a:t>&lt;#&gt;</a:t>
             </a:fld>
           </a:p>
@@ -22852,7 +22852,7 @@
         <p:txBody>
           <a:bodyPr/>
           <a:p>
-            <a:fld id="{CF19048C-11A5-4C04-A165-B092811D1883}" type="slidenum">
+            <a:fld id="{9358433E-8F7E-487A-9366-E0D0035EEB62}" type="slidenum">
               <a:t>&lt;#&gt;</a:t>
             </a:fld>
           </a:p>
@@ -23031,7 +23031,7 @@
         <p:txBody>
           <a:bodyPr/>
           <a:p>
-            <a:fld id="{D9F6D679-7D9E-44C8-90F0-B624402DD5FB}" type="slidenum">
+            <a:fld id="{E73B20B2-6D07-4AAB-B90B-97A7AA7C135B}" type="slidenum">
               <a:t>&lt;#&gt;</a:t>
             </a:fld>
           </a:p>
@@ -23176,7 +23176,7 @@
         <p:txBody>
           <a:bodyPr/>
           <a:p>
-            <a:fld id="{EC99FB34-0FA8-4107-A775-FA8049DD840E}" type="slidenum">
+            <a:fld id="{C21A6A81-7BA5-4D94-9C29-2240D2730FDE}" type="slidenum">
               <a:t>&lt;#&gt;</a:t>
             </a:fld>
           </a:p>
@@ -23389,7 +23389,7 @@
         <p:txBody>
           <a:bodyPr/>
           <a:p>
-            <a:fld id="{A9A603BB-4B91-4968-BC89-8F8E967385CA}" type="slidenum">
+            <a:fld id="{7D560EC9-8EC7-43DF-8068-AA6F512FCAA6}" type="slidenum">
               <a:t>&lt;#&gt;</a:t>
             </a:fld>
           </a:p>
@@ -23670,7 +23670,7 @@
         <p:txBody>
           <a:bodyPr/>
           <a:p>
-            <a:fld id="{6F5705A8-5B43-439C-8AE8-4791918A0477}" type="slidenum">
+            <a:fld id="{F1E29019-7BD9-44B5-853D-E2E931C80ECF}" type="slidenum">
               <a:t>&lt;#&gt;</a:t>
             </a:fld>
           </a:p>
@@ -23712,7 +23712,7 @@
         <p:txBody>
           <a:bodyPr/>
           <a:p>
-            <a:fld id="{183AE1CC-D95D-4069-9F37-7CB0DA8EEFEE}" type="slidenum">
+            <a:fld id="{474775F3-D6EC-4D72-B348-39742DD8652F}" type="slidenum">
               <a:t>&lt;#&gt;</a:t>
             </a:fld>
           </a:p>
@@ -23881,7 +23881,7 @@
         <p:txBody>
           <a:bodyPr/>
           <a:p>
-            <a:fld id="{AB630A14-19DB-46E3-B516-E12D01518931}" type="slidenum">
+            <a:fld id="{908B545E-F479-41F2-9B46-E3212F80A6CA}" type="slidenum">
               <a:t>&lt;#&gt;</a:t>
             </a:fld>
           </a:p>
@@ -23992,7 +23992,7 @@
         <p:txBody>
           <a:bodyPr/>
           <a:p>
-            <a:fld id="{165F0D93-A370-4DC8-8947-F6CBA39C6C53}" type="slidenum">
+            <a:fld id="{9AF2FBFE-DCD5-4A07-9395-42226DE70825}" type="slidenum">
               <a:t>&lt;#&gt;</a:t>
             </a:fld>
           </a:p>
@@ -24137,7 +24137,7 @@
         <p:txBody>
           <a:bodyPr/>
           <a:p>
-            <a:fld id="{6EB752E4-77B0-4E30-9493-DFF2F7A1A544}" type="slidenum">
+            <a:fld id="{9B9DFA60-742C-46E5-84CF-892DA53FF706}" type="slidenum">
               <a:t>&lt;#&gt;</a:t>
             </a:fld>
           </a:p>
@@ -24214,7 +24214,7 @@
         <p:txBody>
           <a:bodyPr/>
           <a:p>
-            <a:fld id="{819902CF-4289-4B9D-947F-55865F254CD1}" type="slidenum">
+            <a:fld id="{22921150-9C1E-4FEE-8D67-36B0BE940141}" type="slidenum">
               <a:t>&lt;#&gt;</a:t>
             </a:fld>
           </a:p>
@@ -24291,7 +24291,7 @@
         <p:txBody>
           <a:bodyPr/>
           <a:p>
-            <a:fld id="{AF24ED67-D564-41F0-8279-1056E9197BE7}" type="slidenum">
+            <a:fld id="{6E070242-EBAA-43DB-B1B0-3DE59350BFAA}" type="slidenum">
               <a:t>&lt;#&gt;</a:t>
             </a:fld>
           </a:p>
@@ -24470,7 +24470,7 @@
         <p:txBody>
           <a:bodyPr/>
           <a:p>
-            <a:fld id="{6D315A77-B984-4EEF-A03D-891DAA7F1132}" type="slidenum">
+            <a:fld id="{5733A25D-8E55-454C-835C-012C2CB73CBC}" type="slidenum">
               <a:t>&lt;#&gt;</a:t>
             </a:fld>
           </a:p>
@@ -24649,7 +24649,7 @@
         <p:txBody>
           <a:bodyPr/>
           <a:p>
-            <a:fld id="{C45D0161-8945-416A-98AE-256EB9FE37BA}" type="slidenum">
+            <a:fld id="{B958626B-29F3-4CFF-BCC2-01450F9B48C3}" type="slidenum">
               <a:t>&lt;#&gt;</a:t>
             </a:fld>
           </a:p>
@@ -24828,7 +24828,7 @@
         <p:txBody>
           <a:bodyPr/>
           <a:p>
-            <a:fld id="{D83B99A2-6939-4BA1-82C8-80B5400E7459}" type="slidenum">
+            <a:fld id="{D30C5652-EA90-4AF6-9492-549DFB180799}" type="slidenum">
               <a:t>&lt;#&gt;</a:t>
             </a:fld>
           </a:p>
@@ -24973,7 +24973,7 @@
         <p:txBody>
           <a:bodyPr/>
           <a:p>
-            <a:fld id="{13427591-29AC-4E3B-BEB4-97187AF9B545}" type="slidenum">
+            <a:fld id="{D373FEE4-891F-41A9-BB01-B6101B7D9A45}" type="slidenum">
               <a:t>&lt;#&gt;</a:t>
             </a:fld>
           </a:p>
@@ -25186,7 +25186,7 @@
         <p:txBody>
           <a:bodyPr/>
           <a:p>
-            <a:fld id="{F3F2FBBB-C818-4AB4-8A3E-6B9FD5C85932}" type="slidenum">
+            <a:fld id="{05D4F68B-BB69-4954-B7AD-70EDBB158B85}" type="slidenum">
               <a:t>&lt;#&gt;</a:t>
             </a:fld>
           </a:p>
@@ -25524,7 +25524,7 @@
         <p:txBody>
           <a:bodyPr/>
           <a:p>
-            <a:fld id="{8C4C9D6E-1BAA-47BC-99D0-01566C782CC8}" type="slidenum">
+            <a:fld id="{CDD1F5BC-261A-400A-AC43-A7965092ACC4}" type="slidenum">
               <a:t>&lt;#&gt;</a:t>
             </a:fld>
           </a:p>
@@ -25566,7 +25566,7 @@
         <p:txBody>
           <a:bodyPr/>
           <a:p>
-            <a:fld id="{F7CA2941-777F-440B-8F95-C2A002430063}" type="slidenum">
+            <a:fld id="{45BDDACC-9B85-459C-8D06-B57BBCA3823C}" type="slidenum">
               <a:t>&lt;#&gt;</a:t>
             </a:fld>
           </a:p>
@@ -25678,7 +25678,7 @@
         <p:txBody>
           <a:bodyPr/>
           <a:p>
-            <a:fld id="{3B092B4A-B679-4CE6-B2AE-AD748F8F3B4F}" type="slidenum">
+            <a:fld id="{75120000-C65A-444A-B73E-5B210B6C722C}" type="slidenum">
               <a:t>&lt;#&gt;</a:t>
             </a:fld>
           </a:p>
@@ -25789,7 +25789,7 @@
         <p:txBody>
           <a:bodyPr/>
           <a:p>
-            <a:fld id="{3F495217-1364-4D7C-AF27-063110ADCAC3}" type="slidenum">
+            <a:fld id="{687FB749-5B20-46F2-9D1D-D6F7DB2C7FF1}" type="slidenum">
               <a:t>&lt;#&gt;</a:t>
             </a:fld>
           </a:p>
@@ -25934,7 +25934,7 @@
         <p:txBody>
           <a:bodyPr/>
           <a:p>
-            <a:fld id="{200487BE-0A27-44C0-B94C-0A75922CC8D4}" type="slidenum">
+            <a:fld id="{1F6FFCD6-9CDA-4562-BED0-2C5E24F734A0}" type="slidenum">
               <a:t>&lt;#&gt;</a:t>
             </a:fld>
           </a:p>
@@ -26011,7 +26011,7 @@
         <p:txBody>
           <a:bodyPr/>
           <a:p>
-            <a:fld id="{910A5E65-80D2-47B2-9DE7-D7001A4F1262}" type="slidenum">
+            <a:fld id="{77A3ADBE-643B-458D-BBDA-F47D01CAE5FF}" type="slidenum">
               <a:t>&lt;#&gt;</a:t>
             </a:fld>
           </a:p>
@@ -26088,7 +26088,7 @@
         <p:txBody>
           <a:bodyPr/>
           <a:p>
-            <a:fld id="{8D2014C0-3874-4D24-9B3F-052EEDD78F30}" type="slidenum">
+            <a:fld id="{E294BEFC-77FD-4778-95CB-32934940B516}" type="slidenum">
               <a:t>&lt;#&gt;</a:t>
             </a:fld>
           </a:p>
@@ -26267,7 +26267,7 @@
         <p:txBody>
           <a:bodyPr/>
           <a:p>
-            <a:fld id="{F523C7B2-9C9C-47B8-89F2-E8F560C53DD1}" type="slidenum">
+            <a:fld id="{165AA927-3626-47F5-9684-44F2C398134D}" type="slidenum">
               <a:t>&lt;#&gt;</a:t>
             </a:fld>
           </a:p>
@@ -26446,7 +26446,7 @@
         <p:txBody>
           <a:bodyPr/>
           <a:p>
-            <a:fld id="{CF7F5728-2BB0-47CE-9F4B-5552DAD6DA5E}" type="slidenum">
+            <a:fld id="{8A5ACF07-53F9-40B0-8F3B-3D84225C25DA}" type="slidenum">
               <a:t>&lt;#&gt;</a:t>
             </a:fld>
           </a:p>
@@ -26625,7 +26625,7 @@
         <p:txBody>
           <a:bodyPr/>
           <a:p>
-            <a:fld id="{A534C436-249C-46D8-9E1D-B4458F26643F}" type="slidenum">
+            <a:fld id="{05D0D7AA-5C66-4F1B-80E4-74D69C90AC45}" type="slidenum">
               <a:t>&lt;#&gt;</a:t>
             </a:fld>
           </a:p>
@@ -26929,7 +26929,7 @@
         <p:txBody>
           <a:bodyPr/>
           <a:p>
-            <a:fld id="{3AEA7790-99B9-4B50-953C-D2F970B813D2}" type="slidenum">
+            <a:fld id="{ABC00308-414D-4B96-996C-7614A693B4E8}" type="slidenum">
               <a:t>&lt;#&gt;</a:t>
             </a:fld>
           </a:p>
@@ -27142,7 +27142,7 @@
         <p:txBody>
           <a:bodyPr/>
           <a:p>
-            <a:fld id="{3E4C0F2D-655D-4FF3-A7BF-BD459936B503}" type="slidenum">
+            <a:fld id="{E4DCE01B-36E6-49B0-AB1D-6A97A28A7851}" type="slidenum">
               <a:t>&lt;#&gt;</a:t>
             </a:fld>
           </a:p>
@@ -27423,7 +27423,7 @@
         <p:txBody>
           <a:bodyPr/>
           <a:p>
-            <a:fld id="{0E663714-2C84-427B-9914-E158DF51DF93}" type="slidenum">
+            <a:fld id="{B3F0D10E-570B-4EB1-8B38-EC26AC80E538}" type="slidenum">
               <a:t>&lt;#&gt;</a:t>
             </a:fld>
           </a:p>
@@ -27465,7 +27465,7 @@
         <p:txBody>
           <a:bodyPr/>
           <a:p>
-            <a:fld id="{D23B0298-DAF9-4304-AD2F-23A92B37E65B}" type="slidenum">
+            <a:fld id="{DC2B7FDB-0CC8-4C15-B5D7-0A39868638A7}" type="slidenum">
               <a:t>&lt;#&gt;</a:t>
             </a:fld>
           </a:p>
@@ -27577,7 +27577,7 @@
         <p:txBody>
           <a:bodyPr/>
           <a:p>
-            <a:fld id="{73293012-9150-4970-A3E9-34A5343BB992}" type="slidenum">
+            <a:fld id="{2906D18E-2059-457F-80D5-C91C55B93E82}" type="slidenum">
               <a:t>&lt;#&gt;</a:t>
             </a:fld>
           </a:p>
@@ -27688,7 +27688,7 @@
         <p:txBody>
           <a:bodyPr/>
           <a:p>
-            <a:fld id="{E2B77B28-688A-4DC1-88E2-ACC688695393}" type="slidenum">
+            <a:fld id="{1FCE1534-DD11-4CF7-BD9B-D91BB8B26AD2}" type="slidenum">
               <a:t>&lt;#&gt;</a:t>
             </a:fld>
           </a:p>
@@ -27833,7 +27833,7 @@
         <p:txBody>
           <a:bodyPr/>
           <a:p>
-            <a:fld id="{69FCC9B5-0836-402E-A8A0-B5FCCECDFB6D}" type="slidenum">
+            <a:fld id="{AAACAC3C-DCA6-4F0E-AC8D-08DB85E66B95}" type="slidenum">
               <a:t>&lt;#&gt;</a:t>
             </a:fld>
           </a:p>
@@ -27910,7 +27910,7 @@
         <p:txBody>
           <a:bodyPr/>
           <a:p>
-            <a:fld id="{7FADB8A5-9AD4-46FD-B3B1-821B3C58AA88}" type="slidenum">
+            <a:fld id="{A5A1E949-1998-467E-88A2-E148AA0460C0}" type="slidenum">
               <a:t>&lt;#&gt;</a:t>
             </a:fld>
           </a:p>
@@ -27987,7 +27987,7 @@
         <p:txBody>
           <a:bodyPr/>
           <a:p>
-            <a:fld id="{F13CAF2C-9ECA-444D-8DAE-CD6F226936A9}" type="slidenum">
+            <a:fld id="{0C0EB4BA-2C90-419C-ADA0-364B98726491}" type="slidenum">
               <a:t>&lt;#&gt;</a:t>
             </a:fld>
           </a:p>
@@ -28166,7 +28166,7 @@
         <p:txBody>
           <a:bodyPr/>
           <a:p>
-            <a:fld id="{7A770D76-845F-423B-B51E-E8409707D86D}" type="slidenum">
+            <a:fld id="{937473C6-726A-489A-9D6E-773AB0DAA300}" type="slidenum">
               <a:t>&lt;#&gt;</a:t>
             </a:fld>
           </a:p>
@@ -28504,7 +28504,7 @@
         <p:txBody>
           <a:bodyPr/>
           <a:p>
-            <a:fld id="{6CCFF99F-0389-4EA9-9ABA-D441EA5D4047}" type="slidenum">
+            <a:fld id="{7102776E-A5D8-466C-9D93-1E06D732C406}" type="slidenum">
               <a:t>&lt;#&gt;</a:t>
             </a:fld>
           </a:p>
@@ -28683,7 +28683,7 @@
         <p:txBody>
           <a:bodyPr/>
           <a:p>
-            <a:fld id="{CCB54519-0DEE-412D-87E8-4CB91D1ADDAF}" type="slidenum">
+            <a:fld id="{90031DC7-C161-4C13-9D9B-F82236F92356}" type="slidenum">
               <a:t>&lt;#&gt;</a:t>
             </a:fld>
           </a:p>
@@ -28828,7 +28828,7 @@
         <p:txBody>
           <a:bodyPr/>
           <a:p>
-            <a:fld id="{2F9299B1-6808-410E-B4E9-BF3B1116B179}" type="slidenum">
+            <a:fld id="{1307BC83-A510-4151-ACB6-90B025061D5D}" type="slidenum">
               <a:t>&lt;#&gt;</a:t>
             </a:fld>
           </a:p>
@@ -29041,7 +29041,7 @@
         <p:txBody>
           <a:bodyPr/>
           <a:p>
-            <a:fld id="{81B1E33B-E97F-4122-B4F2-645D0E17979E}" type="slidenum">
+            <a:fld id="{2C5F90E1-3671-4B11-B673-DC00A23E3C37}" type="slidenum">
               <a:t>&lt;#&gt;</a:t>
             </a:fld>
           </a:p>
@@ -29322,7 +29322,7 @@
         <p:txBody>
           <a:bodyPr/>
           <a:p>
-            <a:fld id="{4EE6F9ED-FFD7-41A8-B2E7-58A77B72E6C4}" type="slidenum">
+            <a:fld id="{06CEE1AC-01A9-4F84-A141-32BAC65CAF9F}" type="slidenum">
               <a:t>&lt;#&gt;</a:t>
             </a:fld>
           </a:p>
@@ -29364,7 +29364,7 @@
         <p:txBody>
           <a:bodyPr/>
           <a:p>
-            <a:fld id="{0340D309-7A15-4D7D-8917-CBFB6E4361D6}" type="slidenum">
+            <a:fld id="{A03087A8-425E-4AEE-94A4-B7C1E6A93CE4}" type="slidenum">
               <a:t>&lt;#&gt;</a:t>
             </a:fld>
           </a:p>
@@ -29476,7 +29476,7 @@
         <p:txBody>
           <a:bodyPr/>
           <a:p>
-            <a:fld id="{548C65CD-AE07-491F-8089-21E1B231F6D8}" type="slidenum">
+            <a:fld id="{6A6BC33B-770D-4B5A-B733-97FA42A84610}" type="slidenum">
               <a:t>&lt;#&gt;</a:t>
             </a:fld>
           </a:p>
@@ -29587,7 +29587,7 @@
         <p:txBody>
           <a:bodyPr/>
           <a:p>
-            <a:fld id="{ECB307DC-B926-424F-8D96-E6E987104DBB}" type="slidenum">
+            <a:fld id="{98E38E0D-BCB5-44FE-8622-5D004F5104C3}" type="slidenum">
               <a:t>&lt;#&gt;</a:t>
             </a:fld>
           </a:p>
@@ -29732,7 +29732,7 @@
         <p:txBody>
           <a:bodyPr/>
           <a:p>
-            <a:fld id="{D100418D-BDEF-46A2-AAB9-639474B93C9E}" type="slidenum">
+            <a:fld id="{E370634A-65C3-481D-86A2-6C72BC86E9A3}" type="slidenum">
               <a:t>&lt;#&gt;</a:t>
             </a:fld>
           </a:p>
@@ -29809,7 +29809,7 @@
         <p:txBody>
           <a:bodyPr/>
           <a:p>
-            <a:fld id="{1B461837-E3E8-426B-AA27-B2D345741F9E}" type="slidenum">
+            <a:fld id="{FB506A76-0192-452F-9D04-7476EC3E0EC6}" type="slidenum">
               <a:t>&lt;#&gt;</a:t>
             </a:fld>
           </a:p>
@@ -30045,7 +30045,7 @@
         <p:txBody>
           <a:bodyPr/>
           <a:p>
-            <a:fld id="{FF26869A-5778-40AD-912B-00475D2D559C}" type="slidenum">
+            <a:fld id="{5CDAB798-324A-43D0-91AB-8D73E268253D}" type="slidenum">
               <a:t>&lt;#&gt;</a:t>
             </a:fld>
           </a:p>
@@ -30224,7 +30224,7 @@
         <p:txBody>
           <a:bodyPr/>
           <a:p>
-            <a:fld id="{D68E0178-6F49-4DA2-8B7B-102F3F144CF3}" type="slidenum">
+            <a:fld id="{1E88CD36-52AA-48C4-BCDE-F3218F9DDEE4}" type="slidenum">
               <a:t>&lt;#&gt;</a:t>
             </a:fld>
           </a:p>
@@ -30403,7 +30403,7 @@
         <p:txBody>
           <a:bodyPr/>
           <a:p>
-            <a:fld id="{A448461E-3D94-4FAC-AA77-F9E968867365}" type="slidenum">
+            <a:fld id="{DDC07C86-1034-49F8-98A4-23A32F32BE5B}" type="slidenum">
               <a:t>&lt;#&gt;</a:t>
             </a:fld>
           </a:p>
@@ -30582,7 +30582,7 @@
         <p:txBody>
           <a:bodyPr/>
           <a:p>
-            <a:fld id="{22950582-5BF2-4C45-AF02-4702439CBF7C}" type="slidenum">
+            <a:fld id="{F3DF0A5C-3563-46F1-B33B-652BE48165BA}" type="slidenum">
               <a:t>&lt;#&gt;</a:t>
             </a:fld>
           </a:p>
@@ -30727,7 +30727,7 @@
         <p:txBody>
           <a:bodyPr/>
           <a:p>
-            <a:fld id="{5B149531-9E00-43CB-81E5-5DD9123CC5C4}" type="slidenum">
+            <a:fld id="{82D74B09-965B-4BAD-BF00-DCA87EFB99EB}" type="slidenum">
               <a:t>&lt;#&gt;</a:t>
             </a:fld>
           </a:p>
@@ -30940,7 +30940,7 @@
         <p:txBody>
           <a:bodyPr/>
           <a:p>
-            <a:fld id="{22AA15C7-FAB5-4BA7-B8B0-4306965DD83E}" type="slidenum">
+            <a:fld id="{2C398F8A-2BA1-4E60-B062-79A299CFC854}" type="slidenum">
               <a:t>&lt;#&gt;</a:t>
             </a:fld>
           </a:p>
@@ -31221,7 +31221,7 @@
         <p:txBody>
           <a:bodyPr/>
           <a:p>
-            <a:fld id="{3AAB8302-DC18-4C57-9F77-54EE21ED1D94}" type="slidenum">
+            <a:fld id="{29ED7349-1275-446A-974B-FE46F30E4181}" type="slidenum">
               <a:t>&lt;#&gt;</a:t>
             </a:fld>
           </a:p>
@@ -31263,7 +31263,7 @@
         <p:txBody>
           <a:bodyPr/>
           <a:p>
-            <a:fld id="{7FC78678-F39F-48B3-874F-3EDA985A12BD}" type="slidenum">
+            <a:fld id="{614A8A2E-8A1F-449A-917E-1F9F2C011EA8}" type="slidenum">
               <a:t>&lt;#&gt;</a:t>
             </a:fld>
           </a:p>
@@ -31375,7 +31375,7 @@
         <p:txBody>
           <a:bodyPr/>
           <a:p>
-            <a:fld id="{F41D7A60-6F69-411C-95B5-0AF7FDC31B77}" type="slidenum">
+            <a:fld id="{30B8B139-C950-4FBF-9755-39847F99E65D}" type="slidenum">
               <a:t>&lt;#&gt;</a:t>
             </a:fld>
           </a:p>
@@ -31486,7 +31486,7 @@
         <p:txBody>
           <a:bodyPr/>
           <a:p>
-            <a:fld id="{36669FDC-647D-4408-BD6B-D16A8A19AAF6}" type="slidenum">
+            <a:fld id="{79938FE2-8006-4685-BF24-30FC169B7AA4}" type="slidenum">
               <a:t>&lt;#&gt;</a:t>
             </a:fld>
           </a:p>
@@ -31530,7 +31530,7 @@
         <p:spPr>
           <a:xfrm flipH="1">
             <a:off x="2520" y="301680"/>
-            <a:ext cx="9147960" cy="4494600"/>
+            <a:ext cx="9147600" cy="4494240"/>
           </a:xfrm>
           <a:custGeom>
             <a:avLst/>
@@ -31586,7 +31586,7 @@
         <p:spPr>
           <a:xfrm>
             <a:off x="-5760" y="759960"/>
-            <a:ext cx="9141840" cy="3767760"/>
+            <a:ext cx="9141480" cy="3767400"/>
           </a:xfrm>
           <a:custGeom>
             <a:avLst/>
@@ -31642,7 +31642,7 @@
         <p:spPr>
           <a:xfrm>
             <a:off x="0" y="1351080"/>
-            <a:ext cx="9154080" cy="2886840"/>
+            <a:ext cx="9153720" cy="2886480"/>
           </a:xfrm>
           <a:custGeom>
             <a:avLst/>
@@ -31960,9 +31960,9 @@
         <p:grpSpPr>
           <a:xfrm>
             <a:off x="-6120" y="0"/>
-            <a:ext cx="9165960" cy="5160960"/>
+            <a:ext cx="9165600" cy="5160600"/>
             <a:chOff x="-6120" y="0"/>
-            <a:chExt cx="9165960" cy="5160960"/>
+            <a:chExt cx="9165600" cy="5160600"/>
           </a:xfrm>
         </p:grpSpPr>
         <p:sp>
@@ -31974,7 +31974,7 @@
           <p:spPr>
             <a:xfrm>
               <a:off x="0" y="0"/>
-              <a:ext cx="8550720" cy="1330920"/>
+              <a:ext cx="8550360" cy="1330560"/>
             </a:xfrm>
             <a:custGeom>
               <a:avLst/>
@@ -32019,7 +32019,7 @@
           <p:spPr>
             <a:xfrm>
               <a:off x="2563560" y="0"/>
-              <a:ext cx="6578280" cy="1270440"/>
+              <a:ext cx="6577920" cy="1270080"/>
             </a:xfrm>
             <a:custGeom>
               <a:avLst/>
@@ -32069,7 +32069,7 @@
           <p:spPr>
             <a:xfrm>
               <a:off x="-6120" y="0"/>
-              <a:ext cx="7296120" cy="1469520"/>
+              <a:ext cx="7295760" cy="1469160"/>
             </a:xfrm>
             <a:custGeom>
               <a:avLst/>
@@ -32119,7 +32119,7 @@
           <p:spPr>
             <a:xfrm>
               <a:off x="3596040" y="4667040"/>
-              <a:ext cx="5088600" cy="474480"/>
+              <a:ext cx="5088240" cy="474120"/>
             </a:xfrm>
             <a:custGeom>
               <a:avLst/>
@@ -32164,7 +32164,7 @@
           <p:spPr>
             <a:xfrm>
               <a:off x="5524920" y="4692600"/>
-              <a:ext cx="3634920" cy="468360"/>
+              <a:ext cx="3634560" cy="468000"/>
             </a:xfrm>
             <a:custGeom>
               <a:avLst/>
@@ -32211,7 +32211,7 @@
           <p:spPr>
             <a:xfrm>
               <a:off x="7521480" y="4023000"/>
-              <a:ext cx="1632600" cy="1137960"/>
+              <a:ext cx="1632240" cy="1137600"/>
             </a:xfrm>
             <a:custGeom>
               <a:avLst/>
@@ -32263,7 +32263,7 @@
         <p:spPr>
           <a:xfrm>
             <a:off x="27000" y="4749840"/>
-            <a:ext cx="546480" cy="391320"/>
+            <a:ext cx="546120" cy="390960"/>
           </a:xfrm>
           <a:prstGeom prst="rect">
             <a:avLst/>
@@ -32303,7 +32303,7 @@
                 <a:tab algn="l" pos="0"/>
               </a:tabLst>
             </a:pPr>
-            <a:fld id="{51F577CD-EF71-46B4-94FB-DC0BFA587465}" type="slidenum">
+            <a:fld id="{4F6B7CDD-9A46-4ECE-A2B5-89FEF0369DC0}" type="slidenum">
               <a:rPr b="0" lang="en" sz="1200" spc="-1" strike="noStrike">
                 <a:solidFill>
                   <a:srgbClr val="00ae9d"/>
@@ -32596,9 +32596,9 @@
         <p:grpSpPr>
           <a:xfrm>
             <a:off x="-6120" y="0"/>
-            <a:ext cx="9165960" cy="5160960"/>
+            <a:ext cx="9165600" cy="5160600"/>
             <a:chOff x="-6120" y="0"/>
-            <a:chExt cx="9165960" cy="5160960"/>
+            <a:chExt cx="9165600" cy="5160600"/>
           </a:xfrm>
         </p:grpSpPr>
         <p:sp>
@@ -32610,7 +32610,7 @@
           <p:spPr>
             <a:xfrm>
               <a:off x="0" y="0"/>
-              <a:ext cx="8550720" cy="1330920"/>
+              <a:ext cx="8550360" cy="1330560"/>
             </a:xfrm>
             <a:custGeom>
               <a:avLst/>
@@ -32655,7 +32655,7 @@
           <p:spPr>
             <a:xfrm>
               <a:off x="2563560" y="0"/>
-              <a:ext cx="6578280" cy="1270440"/>
+              <a:ext cx="6577920" cy="1270080"/>
             </a:xfrm>
             <a:custGeom>
               <a:avLst/>
@@ -32705,7 +32705,7 @@
           <p:spPr>
             <a:xfrm>
               <a:off x="-6120" y="0"/>
-              <a:ext cx="7296120" cy="1469520"/>
+              <a:ext cx="7295760" cy="1469160"/>
             </a:xfrm>
             <a:custGeom>
               <a:avLst/>
@@ -32755,7 +32755,7 @@
           <p:spPr>
             <a:xfrm>
               <a:off x="3596040" y="4667040"/>
-              <a:ext cx="5088600" cy="474480"/>
+              <a:ext cx="5088240" cy="474120"/>
             </a:xfrm>
             <a:custGeom>
               <a:avLst/>
@@ -32800,7 +32800,7 @@
           <p:spPr>
             <a:xfrm>
               <a:off x="5524920" y="4692600"/>
-              <a:ext cx="3634920" cy="468360"/>
+              <a:ext cx="3634560" cy="468000"/>
             </a:xfrm>
             <a:custGeom>
               <a:avLst/>
@@ -32847,7 +32847,7 @@
           <p:spPr>
             <a:xfrm>
               <a:off x="7521480" y="4023000"/>
-              <a:ext cx="1632600" cy="1137960"/>
+              <a:ext cx="1632240" cy="1137600"/>
             </a:xfrm>
             <a:custGeom>
               <a:avLst/>
@@ -32899,7 +32899,7 @@
         <p:spPr>
           <a:xfrm>
             <a:off x="27000" y="4749840"/>
-            <a:ext cx="546480" cy="391320"/>
+            <a:ext cx="546120" cy="390960"/>
           </a:xfrm>
           <a:prstGeom prst="rect">
             <a:avLst/>
@@ -32939,7 +32939,7 @@
                 <a:tab algn="l" pos="0"/>
               </a:tabLst>
             </a:pPr>
-            <a:fld id="{948D8B7A-4A2F-42F5-A3EE-148CCCFBA330}" type="slidenum">
+            <a:fld id="{7101AD3F-F569-4FAA-984B-5B2FE839CDB2}" type="slidenum">
               <a:rPr b="0" lang="en" sz="1200" spc="-1" strike="noStrike">
                 <a:solidFill>
                   <a:srgbClr val="00ae9d"/>
@@ -33232,9 +33232,9 @@
         <p:grpSpPr>
           <a:xfrm>
             <a:off x="-6120" y="0"/>
-            <a:ext cx="9165960" cy="5160960"/>
+            <a:ext cx="9165600" cy="5160600"/>
             <a:chOff x="-6120" y="0"/>
-            <a:chExt cx="9165960" cy="5160960"/>
+            <a:chExt cx="9165600" cy="5160600"/>
           </a:xfrm>
         </p:grpSpPr>
         <p:sp>
@@ -33246,7 +33246,7 @@
           <p:spPr>
             <a:xfrm>
               <a:off x="0" y="0"/>
-              <a:ext cx="8550720" cy="1330920"/>
+              <a:ext cx="8550360" cy="1330560"/>
             </a:xfrm>
             <a:custGeom>
               <a:avLst/>
@@ -33291,7 +33291,7 @@
           <p:spPr>
             <a:xfrm>
               <a:off x="2563560" y="0"/>
-              <a:ext cx="6578280" cy="1270440"/>
+              <a:ext cx="6577920" cy="1270080"/>
             </a:xfrm>
             <a:custGeom>
               <a:avLst/>
@@ -33341,7 +33341,7 @@
           <p:spPr>
             <a:xfrm>
               <a:off x="-6120" y="0"/>
-              <a:ext cx="7296120" cy="1469520"/>
+              <a:ext cx="7295760" cy="1469160"/>
             </a:xfrm>
             <a:custGeom>
               <a:avLst/>
@@ -33391,7 +33391,7 @@
           <p:spPr>
             <a:xfrm>
               <a:off x="3596040" y="4667040"/>
-              <a:ext cx="5088600" cy="474480"/>
+              <a:ext cx="5088240" cy="474120"/>
             </a:xfrm>
             <a:custGeom>
               <a:avLst/>
@@ -33436,7 +33436,7 @@
           <p:spPr>
             <a:xfrm>
               <a:off x="5524920" y="4692600"/>
-              <a:ext cx="3634920" cy="468360"/>
+              <a:ext cx="3634560" cy="468000"/>
             </a:xfrm>
             <a:custGeom>
               <a:avLst/>
@@ -33483,7 +33483,7 @@
           <p:spPr>
             <a:xfrm>
               <a:off x="7521480" y="4023000"/>
-              <a:ext cx="1632600" cy="1137960"/>
+              <a:ext cx="1632240" cy="1137600"/>
             </a:xfrm>
             <a:custGeom>
               <a:avLst/>
@@ -33535,7 +33535,7 @@
         <p:spPr>
           <a:xfrm>
             <a:off x="27000" y="4749840"/>
-            <a:ext cx="546480" cy="391320"/>
+            <a:ext cx="546120" cy="390960"/>
           </a:xfrm>
           <a:prstGeom prst="rect">
             <a:avLst/>
@@ -33575,7 +33575,7 @@
                 <a:tab algn="l" pos="0"/>
               </a:tabLst>
             </a:pPr>
-            <a:fld id="{1C2FEEE9-024F-4C50-81F5-EF43E86EC931}" type="slidenum">
+            <a:fld id="{0B6F445A-A8BD-4210-A0B2-79508FF5F094}" type="slidenum">
               <a:rPr b="0" lang="en" sz="1200" spc="-1" strike="noStrike">
                 <a:solidFill>
                   <a:srgbClr val="00ae9d"/>
@@ -33868,9 +33868,9 @@
         <p:grpSpPr>
           <a:xfrm>
             <a:off x="-6120" y="0"/>
-            <a:ext cx="9165960" cy="5160960"/>
+            <a:ext cx="9165600" cy="5160600"/>
             <a:chOff x="-6120" y="0"/>
-            <a:chExt cx="9165960" cy="5160960"/>
+            <a:chExt cx="9165600" cy="5160600"/>
           </a:xfrm>
         </p:grpSpPr>
         <p:sp>
@@ -33882,7 +33882,7 @@
           <p:spPr>
             <a:xfrm>
               <a:off x="0" y="0"/>
-              <a:ext cx="8550720" cy="1330920"/>
+              <a:ext cx="8550360" cy="1330560"/>
             </a:xfrm>
             <a:custGeom>
               <a:avLst/>
@@ -33927,7 +33927,7 @@
           <p:spPr>
             <a:xfrm>
               <a:off x="2563560" y="0"/>
-              <a:ext cx="6578280" cy="1270440"/>
+              <a:ext cx="6577920" cy="1270080"/>
             </a:xfrm>
             <a:custGeom>
               <a:avLst/>
@@ -33977,7 +33977,7 @@
           <p:spPr>
             <a:xfrm>
               <a:off x="-6120" y="0"/>
-              <a:ext cx="7296120" cy="1469520"/>
+              <a:ext cx="7295760" cy="1469160"/>
             </a:xfrm>
             <a:custGeom>
               <a:avLst/>
@@ -34027,7 +34027,7 @@
           <p:spPr>
             <a:xfrm>
               <a:off x="3596040" y="4667040"/>
-              <a:ext cx="5088600" cy="474480"/>
+              <a:ext cx="5088240" cy="474120"/>
             </a:xfrm>
             <a:custGeom>
               <a:avLst/>
@@ -34072,7 +34072,7 @@
           <p:spPr>
             <a:xfrm>
               <a:off x="5524920" y="4692600"/>
-              <a:ext cx="3634920" cy="468360"/>
+              <a:ext cx="3634560" cy="468000"/>
             </a:xfrm>
             <a:custGeom>
               <a:avLst/>
@@ -34119,7 +34119,7 @@
           <p:spPr>
             <a:xfrm>
               <a:off x="7521480" y="4023000"/>
-              <a:ext cx="1632600" cy="1137960"/>
+              <a:ext cx="1632240" cy="1137600"/>
             </a:xfrm>
             <a:custGeom>
               <a:avLst/>
@@ -34171,7 +34171,7 @@
         <p:spPr>
           <a:xfrm>
             <a:off x="27000" y="4749840"/>
-            <a:ext cx="546480" cy="391320"/>
+            <a:ext cx="546120" cy="390960"/>
           </a:xfrm>
           <a:prstGeom prst="rect">
             <a:avLst/>
@@ -34211,7 +34211,7 @@
                 <a:tab algn="l" pos="0"/>
               </a:tabLst>
             </a:pPr>
-            <a:fld id="{31812B7A-EA03-498A-B7AB-487AB7AC2117}" type="slidenum">
+            <a:fld id="{656760B2-9A81-4030-B785-2314A88270DD}" type="slidenum">
               <a:rPr b="0" lang="en" sz="1200" spc="-1" strike="noStrike">
                 <a:solidFill>
                   <a:srgbClr val="00ae9d"/>
@@ -34504,9 +34504,9 @@
         <p:grpSpPr>
           <a:xfrm>
             <a:off x="-6120" y="0"/>
-            <a:ext cx="9165960" cy="5160960"/>
+            <a:ext cx="9165600" cy="5160600"/>
             <a:chOff x="-6120" y="0"/>
-            <a:chExt cx="9165960" cy="5160960"/>
+            <a:chExt cx="9165600" cy="5160600"/>
           </a:xfrm>
         </p:grpSpPr>
         <p:sp>
@@ -34518,7 +34518,7 @@
           <p:spPr>
             <a:xfrm>
               <a:off x="0" y="0"/>
-              <a:ext cx="8550720" cy="1330920"/>
+              <a:ext cx="8550360" cy="1330560"/>
             </a:xfrm>
             <a:custGeom>
               <a:avLst/>
@@ -34563,7 +34563,7 @@
           <p:spPr>
             <a:xfrm>
               <a:off x="2563560" y="0"/>
-              <a:ext cx="6578280" cy="1270440"/>
+              <a:ext cx="6577920" cy="1270080"/>
             </a:xfrm>
             <a:custGeom>
               <a:avLst/>
@@ -34613,7 +34613,7 @@
           <p:spPr>
             <a:xfrm>
               <a:off x="-6120" y="0"/>
-              <a:ext cx="7296120" cy="1469520"/>
+              <a:ext cx="7295760" cy="1469160"/>
             </a:xfrm>
             <a:custGeom>
               <a:avLst/>
@@ -34663,7 +34663,7 @@
           <p:spPr>
             <a:xfrm>
               <a:off x="3596040" y="4667040"/>
-              <a:ext cx="5088600" cy="474480"/>
+              <a:ext cx="5088240" cy="474120"/>
             </a:xfrm>
             <a:custGeom>
               <a:avLst/>
@@ -34708,7 +34708,7 @@
           <p:spPr>
             <a:xfrm>
               <a:off x="5524920" y="4692600"/>
-              <a:ext cx="3634920" cy="468360"/>
+              <a:ext cx="3634560" cy="468000"/>
             </a:xfrm>
             <a:custGeom>
               <a:avLst/>
@@ -34755,7 +34755,7 @@
           <p:spPr>
             <a:xfrm>
               <a:off x="7521480" y="4023000"/>
-              <a:ext cx="1632600" cy="1137960"/>
+              <a:ext cx="1632240" cy="1137600"/>
             </a:xfrm>
             <a:custGeom>
               <a:avLst/>
@@ -34807,7 +34807,7 @@
         <p:spPr>
           <a:xfrm>
             <a:off x="27000" y="4749840"/>
-            <a:ext cx="546480" cy="391320"/>
+            <a:ext cx="546120" cy="390960"/>
           </a:xfrm>
           <a:prstGeom prst="rect">
             <a:avLst/>
@@ -34847,7 +34847,7 @@
                 <a:tab algn="l" pos="0"/>
               </a:tabLst>
             </a:pPr>
-            <a:fld id="{D58663B3-402F-4997-B63B-1488634185A3}" type="slidenum">
+            <a:fld id="{7CB35587-FA93-472E-9285-93B5816ED24D}" type="slidenum">
               <a:rPr b="0" lang="en" sz="1200" spc="-1" strike="noStrike">
                 <a:solidFill>
                   <a:srgbClr val="00ae9d"/>
@@ -35140,9 +35140,9 @@
         <p:grpSpPr>
           <a:xfrm>
             <a:off x="-6120" y="0"/>
-            <a:ext cx="9165960" cy="5160960"/>
+            <a:ext cx="9165600" cy="5160600"/>
             <a:chOff x="-6120" y="0"/>
-            <a:chExt cx="9165960" cy="5160960"/>
+            <a:chExt cx="9165600" cy="5160600"/>
           </a:xfrm>
         </p:grpSpPr>
         <p:sp>
@@ -35154,7 +35154,7 @@
           <p:spPr>
             <a:xfrm>
               <a:off x="0" y="0"/>
-              <a:ext cx="8550720" cy="1330920"/>
+              <a:ext cx="8550360" cy="1330560"/>
             </a:xfrm>
             <a:custGeom>
               <a:avLst/>
@@ -35199,7 +35199,7 @@
           <p:spPr>
             <a:xfrm>
               <a:off x="2563560" y="0"/>
-              <a:ext cx="6578280" cy="1270440"/>
+              <a:ext cx="6577920" cy="1270080"/>
             </a:xfrm>
             <a:custGeom>
               <a:avLst/>
@@ -35249,7 +35249,7 @@
           <p:spPr>
             <a:xfrm>
               <a:off x="-6120" y="0"/>
-              <a:ext cx="7296120" cy="1469520"/>
+              <a:ext cx="7295760" cy="1469160"/>
             </a:xfrm>
             <a:custGeom>
               <a:avLst/>
@@ -35299,7 +35299,7 @@
           <p:spPr>
             <a:xfrm>
               <a:off x="3596040" y="4667040"/>
-              <a:ext cx="5088600" cy="474480"/>
+              <a:ext cx="5088240" cy="474120"/>
             </a:xfrm>
             <a:custGeom>
               <a:avLst/>
@@ -35344,7 +35344,7 @@
           <p:spPr>
             <a:xfrm>
               <a:off x="5524920" y="4692600"/>
-              <a:ext cx="3634920" cy="468360"/>
+              <a:ext cx="3634560" cy="468000"/>
             </a:xfrm>
             <a:custGeom>
               <a:avLst/>
@@ -35391,7 +35391,7 @@
           <p:spPr>
             <a:xfrm>
               <a:off x="7521480" y="4023000"/>
-              <a:ext cx="1632600" cy="1137960"/>
+              <a:ext cx="1632240" cy="1137600"/>
             </a:xfrm>
             <a:custGeom>
               <a:avLst/>
@@ -35443,7 +35443,7 @@
         <p:spPr>
           <a:xfrm>
             <a:off x="27000" y="4749840"/>
-            <a:ext cx="546480" cy="391320"/>
+            <a:ext cx="546120" cy="390960"/>
           </a:xfrm>
           <a:prstGeom prst="rect">
             <a:avLst/>
@@ -35483,7 +35483,7 @@
                 <a:tab algn="l" pos="0"/>
               </a:tabLst>
             </a:pPr>
-            <a:fld id="{66E63604-A2B9-4756-B234-E788FC61C0E2}" type="slidenum">
+            <a:fld id="{B7F3124B-9461-452E-B655-65D38EF5B1C3}" type="slidenum">
               <a:rPr b="0" lang="en" sz="1200" spc="-1" strike="noStrike">
                 <a:solidFill>
                   <a:srgbClr val="00ae9d"/>
@@ -35776,9 +35776,9 @@
         <p:grpSpPr>
           <a:xfrm>
             <a:off x="-6120" y="0"/>
-            <a:ext cx="9165960" cy="5160960"/>
+            <a:ext cx="9165600" cy="5160600"/>
             <a:chOff x="-6120" y="0"/>
-            <a:chExt cx="9165960" cy="5160960"/>
+            <a:chExt cx="9165600" cy="5160600"/>
           </a:xfrm>
         </p:grpSpPr>
         <p:sp>
@@ -35790,7 +35790,7 @@
           <p:spPr>
             <a:xfrm>
               <a:off x="0" y="0"/>
-              <a:ext cx="8550720" cy="1330920"/>
+              <a:ext cx="8550360" cy="1330560"/>
             </a:xfrm>
             <a:custGeom>
               <a:avLst/>
@@ -35835,7 +35835,7 @@
           <p:spPr>
             <a:xfrm>
               <a:off x="2563560" y="0"/>
-              <a:ext cx="6578280" cy="1270440"/>
+              <a:ext cx="6577920" cy="1270080"/>
             </a:xfrm>
             <a:custGeom>
               <a:avLst/>
@@ -35885,7 +35885,7 @@
           <p:spPr>
             <a:xfrm>
               <a:off x="-6120" y="0"/>
-              <a:ext cx="7296120" cy="1469520"/>
+              <a:ext cx="7295760" cy="1469160"/>
             </a:xfrm>
             <a:custGeom>
               <a:avLst/>
@@ -35935,7 +35935,7 @@
           <p:spPr>
             <a:xfrm>
               <a:off x="3596040" y="4667040"/>
-              <a:ext cx="5088600" cy="474480"/>
+              <a:ext cx="5088240" cy="474120"/>
             </a:xfrm>
             <a:custGeom>
               <a:avLst/>
@@ -35980,7 +35980,7 @@
           <p:spPr>
             <a:xfrm>
               <a:off x="5524920" y="4692600"/>
-              <a:ext cx="3634920" cy="468360"/>
+              <a:ext cx="3634560" cy="468000"/>
             </a:xfrm>
             <a:custGeom>
               <a:avLst/>
@@ -36027,7 +36027,7 @@
           <p:spPr>
             <a:xfrm>
               <a:off x="7521480" y="4023000"/>
-              <a:ext cx="1632600" cy="1137960"/>
+              <a:ext cx="1632240" cy="1137600"/>
             </a:xfrm>
             <a:custGeom>
               <a:avLst/>
@@ -36079,7 +36079,7 @@
         <p:spPr>
           <a:xfrm>
             <a:off x="27000" y="4749840"/>
-            <a:ext cx="546480" cy="391320"/>
+            <a:ext cx="546120" cy="390960"/>
           </a:xfrm>
           <a:prstGeom prst="rect">
             <a:avLst/>
@@ -36119,7 +36119,7 @@
                 <a:tab algn="l" pos="0"/>
               </a:tabLst>
             </a:pPr>
-            <a:fld id="{E2D7346F-96D2-4F97-9CEF-C078EF72D7D6}" type="slidenum">
+            <a:fld id="{CEED5A2C-C1F6-471D-B2F8-9D9AABEC7B1E}" type="slidenum">
               <a:rPr b="0" lang="en" sz="1200" spc="-1" strike="noStrike">
                 <a:solidFill>
                   <a:srgbClr val="00ae9d"/>
@@ -36412,9 +36412,9 @@
         <p:grpSpPr>
           <a:xfrm>
             <a:off x="-6120" y="0"/>
-            <a:ext cx="9165960" cy="5160960"/>
+            <a:ext cx="9165600" cy="5160600"/>
             <a:chOff x="-6120" y="0"/>
-            <a:chExt cx="9165960" cy="5160960"/>
+            <a:chExt cx="9165600" cy="5160600"/>
           </a:xfrm>
         </p:grpSpPr>
         <p:sp>
@@ -36426,7 +36426,7 @@
           <p:spPr>
             <a:xfrm>
               <a:off x="0" y="0"/>
-              <a:ext cx="8550720" cy="1330920"/>
+              <a:ext cx="8550360" cy="1330560"/>
             </a:xfrm>
             <a:custGeom>
               <a:avLst/>
@@ -36471,7 +36471,7 @@
           <p:spPr>
             <a:xfrm>
               <a:off x="2563560" y="0"/>
-              <a:ext cx="6578280" cy="1270440"/>
+              <a:ext cx="6577920" cy="1270080"/>
             </a:xfrm>
             <a:custGeom>
               <a:avLst/>
@@ -36521,7 +36521,7 @@
           <p:spPr>
             <a:xfrm>
               <a:off x="-6120" y="0"/>
-              <a:ext cx="7296120" cy="1469520"/>
+              <a:ext cx="7295760" cy="1469160"/>
             </a:xfrm>
             <a:custGeom>
               <a:avLst/>
@@ -36571,7 +36571,7 @@
           <p:spPr>
             <a:xfrm>
               <a:off x="3596040" y="4667040"/>
-              <a:ext cx="5088600" cy="474480"/>
+              <a:ext cx="5088240" cy="474120"/>
             </a:xfrm>
             <a:custGeom>
               <a:avLst/>
@@ -36616,7 +36616,7 @@
           <p:spPr>
             <a:xfrm>
               <a:off x="5524920" y="4692600"/>
-              <a:ext cx="3634920" cy="468360"/>
+              <a:ext cx="3634560" cy="468000"/>
             </a:xfrm>
             <a:custGeom>
               <a:avLst/>
@@ -36663,7 +36663,7 @@
           <p:spPr>
             <a:xfrm>
               <a:off x="7521480" y="4023000"/>
-              <a:ext cx="1632600" cy="1137960"/>
+              <a:ext cx="1632240" cy="1137600"/>
             </a:xfrm>
             <a:custGeom>
               <a:avLst/>
@@ -36715,7 +36715,7 @@
         <p:spPr>
           <a:xfrm>
             <a:off x="27000" y="4749840"/>
-            <a:ext cx="546480" cy="391320"/>
+            <a:ext cx="546120" cy="390960"/>
           </a:xfrm>
           <a:prstGeom prst="rect">
             <a:avLst/>
@@ -36755,7 +36755,7 @@
                 <a:tab algn="l" pos="0"/>
               </a:tabLst>
             </a:pPr>
-            <a:fld id="{0C18550F-4D54-4487-B102-85751EA6C136}" type="slidenum">
+            <a:fld id="{B6C1FCA8-ACC0-49BD-9A5F-9CA6CC741289}" type="slidenum">
               <a:rPr b="0" lang="en" sz="1200" spc="-1" strike="noStrike">
                 <a:solidFill>
                   <a:srgbClr val="00ae9d"/>
@@ -37048,9 +37048,9 @@
         <p:grpSpPr>
           <a:xfrm>
             <a:off x="-6120" y="0"/>
-            <a:ext cx="9165960" cy="5160960"/>
+            <a:ext cx="9165600" cy="5160600"/>
             <a:chOff x="-6120" y="0"/>
-            <a:chExt cx="9165960" cy="5160960"/>
+            <a:chExt cx="9165600" cy="5160600"/>
           </a:xfrm>
         </p:grpSpPr>
         <p:sp>
@@ -37062,7 +37062,7 @@
           <p:spPr>
             <a:xfrm>
               <a:off x="0" y="0"/>
-              <a:ext cx="8550720" cy="1330920"/>
+              <a:ext cx="8550360" cy="1330560"/>
             </a:xfrm>
             <a:custGeom>
               <a:avLst/>
@@ -37107,7 +37107,7 @@
           <p:spPr>
             <a:xfrm>
               <a:off x="2563560" y="0"/>
-              <a:ext cx="6578280" cy="1270440"/>
+              <a:ext cx="6577920" cy="1270080"/>
             </a:xfrm>
             <a:custGeom>
               <a:avLst/>
@@ -37157,7 +37157,7 @@
           <p:spPr>
             <a:xfrm>
               <a:off x="-6120" y="0"/>
-              <a:ext cx="7296120" cy="1469520"/>
+              <a:ext cx="7295760" cy="1469160"/>
             </a:xfrm>
             <a:custGeom>
               <a:avLst/>
@@ -37207,7 +37207,7 @@
           <p:spPr>
             <a:xfrm>
               <a:off x="3596040" y="4667040"/>
-              <a:ext cx="5088600" cy="474480"/>
+              <a:ext cx="5088240" cy="474120"/>
             </a:xfrm>
             <a:custGeom>
               <a:avLst/>
@@ -37252,7 +37252,7 @@
           <p:spPr>
             <a:xfrm>
               <a:off x="5524920" y="4692600"/>
-              <a:ext cx="3634920" cy="468360"/>
+              <a:ext cx="3634560" cy="468000"/>
             </a:xfrm>
             <a:custGeom>
               <a:avLst/>
@@ -37299,7 +37299,7 @@
           <p:spPr>
             <a:xfrm>
               <a:off x="7521480" y="4023000"/>
-              <a:ext cx="1632600" cy="1137960"/>
+              <a:ext cx="1632240" cy="1137600"/>
             </a:xfrm>
             <a:custGeom>
               <a:avLst/>
@@ -37351,7 +37351,7 @@
         <p:spPr>
           <a:xfrm>
             <a:off x="27000" y="4749840"/>
-            <a:ext cx="546480" cy="391320"/>
+            <a:ext cx="546120" cy="390960"/>
           </a:xfrm>
           <a:prstGeom prst="rect">
             <a:avLst/>
@@ -37391,7 +37391,7 @@
                 <a:tab algn="l" pos="0"/>
               </a:tabLst>
             </a:pPr>
-            <a:fld id="{0F5E3B6D-10BE-4DC7-BF8B-6A0F26637D94}" type="slidenum">
+            <a:fld id="{D6ECC3CD-0686-4A48-856E-2D505C750F52}" type="slidenum">
               <a:rPr b="0" lang="en" sz="1200" spc="-1" strike="noStrike">
                 <a:solidFill>
                   <a:srgbClr val="00ae9d"/>
@@ -37684,9 +37684,9 @@
         <p:grpSpPr>
           <a:xfrm>
             <a:off x="-6120" y="0"/>
-            <a:ext cx="9165960" cy="5160960"/>
+            <a:ext cx="9165600" cy="5160600"/>
             <a:chOff x="-6120" y="0"/>
-            <a:chExt cx="9165960" cy="5160960"/>
+            <a:chExt cx="9165600" cy="5160600"/>
           </a:xfrm>
         </p:grpSpPr>
         <p:sp>
@@ -37698,7 +37698,7 @@
           <p:spPr>
             <a:xfrm>
               <a:off x="0" y="0"/>
-              <a:ext cx="8550720" cy="1330920"/>
+              <a:ext cx="8550360" cy="1330560"/>
             </a:xfrm>
             <a:custGeom>
               <a:avLst/>
@@ -37743,7 +37743,7 @@
           <p:spPr>
             <a:xfrm>
               <a:off x="2563560" y="0"/>
-              <a:ext cx="6578280" cy="1270440"/>
+              <a:ext cx="6577920" cy="1270080"/>
             </a:xfrm>
             <a:custGeom>
               <a:avLst/>
@@ -37793,7 +37793,7 @@
           <p:spPr>
             <a:xfrm>
               <a:off x="-6120" y="0"/>
-              <a:ext cx="7296120" cy="1469520"/>
+              <a:ext cx="7295760" cy="1469160"/>
             </a:xfrm>
             <a:custGeom>
               <a:avLst/>
@@ -37843,7 +37843,7 @@
           <p:spPr>
             <a:xfrm>
               <a:off x="3596040" y="4667040"/>
-              <a:ext cx="5088600" cy="474480"/>
+              <a:ext cx="5088240" cy="474120"/>
             </a:xfrm>
             <a:custGeom>
               <a:avLst/>
@@ -37888,7 +37888,7 @@
           <p:spPr>
             <a:xfrm>
               <a:off x="5524920" y="4692600"/>
-              <a:ext cx="3634920" cy="468360"/>
+              <a:ext cx="3634560" cy="468000"/>
             </a:xfrm>
             <a:custGeom>
               <a:avLst/>
@@ -37935,7 +37935,7 @@
           <p:spPr>
             <a:xfrm>
               <a:off x="7521480" y="4023000"/>
-              <a:ext cx="1632600" cy="1137960"/>
+              <a:ext cx="1632240" cy="1137600"/>
             </a:xfrm>
             <a:custGeom>
               <a:avLst/>
@@ -37987,7 +37987,7 @@
         <p:spPr>
           <a:xfrm>
             <a:off x="27000" y="4749840"/>
-            <a:ext cx="546480" cy="391320"/>
+            <a:ext cx="546120" cy="390960"/>
           </a:xfrm>
           <a:prstGeom prst="rect">
             <a:avLst/>
@@ -38027,7 +38027,7 @@
                 <a:tab algn="l" pos="0"/>
               </a:tabLst>
             </a:pPr>
-            <a:fld id="{81EE4853-563E-41EE-AE22-D6724516B4AD}" type="slidenum">
+            <a:fld id="{6AEBDAFF-B560-48CA-AA49-37584CDC74DE}" type="slidenum">
               <a:rPr b="0" lang="en" sz="1200" spc="-1" strike="noStrike">
                 <a:solidFill>
                   <a:srgbClr val="00ae9d"/>
@@ -38320,9 +38320,9 @@
         <p:grpSpPr>
           <a:xfrm>
             <a:off x="-6120" y="0"/>
-            <a:ext cx="9165960" cy="5160960"/>
+            <a:ext cx="9165600" cy="5160600"/>
             <a:chOff x="-6120" y="0"/>
-            <a:chExt cx="9165960" cy="5160960"/>
+            <a:chExt cx="9165600" cy="5160600"/>
           </a:xfrm>
         </p:grpSpPr>
         <p:sp>
@@ -38334,7 +38334,7 @@
           <p:spPr>
             <a:xfrm>
               <a:off x="0" y="0"/>
-              <a:ext cx="8550720" cy="1330920"/>
+              <a:ext cx="8550360" cy="1330560"/>
             </a:xfrm>
             <a:custGeom>
               <a:avLst/>
@@ -38379,7 +38379,7 @@
           <p:spPr>
             <a:xfrm>
               <a:off x="2563560" y="0"/>
-              <a:ext cx="6578280" cy="1270440"/>
+              <a:ext cx="6577920" cy="1270080"/>
             </a:xfrm>
             <a:custGeom>
               <a:avLst/>
@@ -38429,7 +38429,7 @@
           <p:spPr>
             <a:xfrm>
               <a:off x="-6120" y="0"/>
-              <a:ext cx="7296120" cy="1469520"/>
+              <a:ext cx="7295760" cy="1469160"/>
             </a:xfrm>
             <a:custGeom>
               <a:avLst/>
@@ -38479,7 +38479,7 @@
           <p:spPr>
             <a:xfrm>
               <a:off x="3596040" y="4667040"/>
-              <a:ext cx="5088600" cy="474480"/>
+              <a:ext cx="5088240" cy="474120"/>
             </a:xfrm>
             <a:custGeom>
               <a:avLst/>
@@ -38524,7 +38524,7 @@
           <p:spPr>
             <a:xfrm>
               <a:off x="5524920" y="4692600"/>
-              <a:ext cx="3634920" cy="468360"/>
+              <a:ext cx="3634560" cy="468000"/>
             </a:xfrm>
             <a:custGeom>
               <a:avLst/>
@@ -38571,7 +38571,7 @@
           <p:spPr>
             <a:xfrm>
               <a:off x="7521480" y="4023000"/>
-              <a:ext cx="1632600" cy="1137960"/>
+              <a:ext cx="1632240" cy="1137600"/>
             </a:xfrm>
             <a:custGeom>
               <a:avLst/>
@@ -38619,7 +38619,7 @@
         <p:spPr>
           <a:xfrm>
             <a:off x="886680" y="398520"/>
-            <a:ext cx="7368480" cy="855360"/>
+            <a:ext cx="7368120" cy="855000"/>
           </a:xfrm>
           <a:prstGeom prst="rect">
             <a:avLst/>
@@ -38645,7 +38645,7 @@
         <p:spPr>
           <a:xfrm>
             <a:off x="886680" y="1598400"/>
-            <a:ext cx="7368480" cy="3325320"/>
+            <a:ext cx="7368120" cy="3324960"/>
           </a:xfrm>
           <a:prstGeom prst="rect">
             <a:avLst/>
@@ -38675,7 +38675,7 @@
         <p:spPr>
           <a:xfrm>
             <a:off x="27000" y="4749840"/>
-            <a:ext cx="546480" cy="391320"/>
+            <a:ext cx="546120" cy="390960"/>
           </a:xfrm>
           <a:prstGeom prst="rect">
             <a:avLst/>
@@ -38715,7 +38715,7 @@
                 <a:tab algn="l" pos="0"/>
               </a:tabLst>
             </a:pPr>
-            <a:fld id="{E9CFF34F-FECD-4DED-A7FD-C6B24A16010B}" type="slidenum">
+            <a:fld id="{5FE5FC96-62DA-4535-B043-EDFCFBE4D25C}" type="slidenum">
               <a:rPr b="0" lang="en" sz="1200" spc="-1" strike="noStrike">
                 <a:solidFill>
                   <a:srgbClr val="00ae9d"/>
@@ -39008,9 +39008,9 @@
         <p:grpSpPr>
           <a:xfrm>
             <a:off x="-6120" y="0"/>
-            <a:ext cx="9165960" cy="5160960"/>
+            <a:ext cx="9165600" cy="5160600"/>
             <a:chOff x="-6120" y="0"/>
-            <a:chExt cx="9165960" cy="5160960"/>
+            <a:chExt cx="9165600" cy="5160600"/>
           </a:xfrm>
         </p:grpSpPr>
         <p:sp>
@@ -39022,7 +39022,7 @@
           <p:spPr>
             <a:xfrm>
               <a:off x="0" y="0"/>
-              <a:ext cx="8550720" cy="1330920"/>
+              <a:ext cx="8550360" cy="1330560"/>
             </a:xfrm>
             <a:custGeom>
               <a:avLst/>
@@ -39067,7 +39067,7 @@
           <p:spPr>
             <a:xfrm>
               <a:off x="2563560" y="0"/>
-              <a:ext cx="6578280" cy="1270440"/>
+              <a:ext cx="6577920" cy="1270080"/>
             </a:xfrm>
             <a:custGeom>
               <a:avLst/>
@@ -39117,7 +39117,7 @@
           <p:spPr>
             <a:xfrm>
               <a:off x="-6120" y="0"/>
-              <a:ext cx="7296120" cy="1469520"/>
+              <a:ext cx="7295760" cy="1469160"/>
             </a:xfrm>
             <a:custGeom>
               <a:avLst/>
@@ -39167,7 +39167,7 @@
           <p:spPr>
             <a:xfrm>
               <a:off x="3596040" y="4667040"/>
-              <a:ext cx="5088600" cy="474480"/>
+              <a:ext cx="5088240" cy="474120"/>
             </a:xfrm>
             <a:custGeom>
               <a:avLst/>
@@ -39212,7 +39212,7 @@
           <p:spPr>
             <a:xfrm>
               <a:off x="5524920" y="4692600"/>
-              <a:ext cx="3634920" cy="468360"/>
+              <a:ext cx="3634560" cy="468000"/>
             </a:xfrm>
             <a:custGeom>
               <a:avLst/>
@@ -39259,7 +39259,7 @@
           <p:spPr>
             <a:xfrm>
               <a:off x="7521480" y="4023000"/>
-              <a:ext cx="1632600" cy="1137960"/>
+              <a:ext cx="1632240" cy="1137600"/>
             </a:xfrm>
             <a:custGeom>
               <a:avLst/>
@@ -39311,7 +39311,7 @@
         <p:spPr>
           <a:xfrm>
             <a:off x="27000" y="4749840"/>
-            <a:ext cx="546480" cy="391320"/>
+            <a:ext cx="546120" cy="390960"/>
           </a:xfrm>
           <a:prstGeom prst="rect">
             <a:avLst/>
@@ -39351,7 +39351,7 @@
                 <a:tab algn="l" pos="0"/>
               </a:tabLst>
             </a:pPr>
-            <a:fld id="{5E032829-B4A7-4141-8AE5-6FB30733D4DB}" type="slidenum">
+            <a:fld id="{A51AB378-650E-4495-9DB2-5E4400645B53}" type="slidenum">
               <a:rPr b="0" lang="en" sz="1200" spc="-1" strike="noStrike">
                 <a:solidFill>
                   <a:srgbClr val="00ae9d"/>
@@ -39644,9 +39644,9 @@
         <p:grpSpPr>
           <a:xfrm>
             <a:off x="-6120" y="0"/>
-            <a:ext cx="9165960" cy="5160960"/>
+            <a:ext cx="9165600" cy="5160600"/>
             <a:chOff x="-6120" y="0"/>
-            <a:chExt cx="9165960" cy="5160960"/>
+            <a:chExt cx="9165600" cy="5160600"/>
           </a:xfrm>
         </p:grpSpPr>
         <p:sp>
@@ -39658,7 +39658,7 @@
           <p:spPr>
             <a:xfrm>
               <a:off x="0" y="0"/>
-              <a:ext cx="8550720" cy="1330920"/>
+              <a:ext cx="8550360" cy="1330560"/>
             </a:xfrm>
             <a:custGeom>
               <a:avLst/>
@@ -39703,7 +39703,7 @@
           <p:spPr>
             <a:xfrm>
               <a:off x="2563560" y="0"/>
-              <a:ext cx="6578280" cy="1270440"/>
+              <a:ext cx="6577920" cy="1270080"/>
             </a:xfrm>
             <a:custGeom>
               <a:avLst/>
@@ -39753,7 +39753,7 @@
           <p:spPr>
             <a:xfrm>
               <a:off x="-6120" y="0"/>
-              <a:ext cx="7296120" cy="1469520"/>
+              <a:ext cx="7295760" cy="1469160"/>
             </a:xfrm>
             <a:custGeom>
               <a:avLst/>
@@ -39803,7 +39803,7 @@
           <p:spPr>
             <a:xfrm>
               <a:off x="3596040" y="4667040"/>
-              <a:ext cx="5088600" cy="474480"/>
+              <a:ext cx="5088240" cy="474120"/>
             </a:xfrm>
             <a:custGeom>
               <a:avLst/>
@@ -39848,7 +39848,7 @@
           <p:spPr>
             <a:xfrm>
               <a:off x="5524920" y="4692600"/>
-              <a:ext cx="3634920" cy="468360"/>
+              <a:ext cx="3634560" cy="468000"/>
             </a:xfrm>
             <a:custGeom>
               <a:avLst/>
@@ -39895,7 +39895,7 @@
           <p:spPr>
             <a:xfrm>
               <a:off x="7521480" y="4023000"/>
-              <a:ext cx="1632600" cy="1137960"/>
+              <a:ext cx="1632240" cy="1137600"/>
             </a:xfrm>
             <a:custGeom>
               <a:avLst/>
@@ -39943,7 +39943,7 @@
         <p:spPr>
           <a:xfrm>
             <a:off x="886680" y="398520"/>
-            <a:ext cx="7368480" cy="855360"/>
+            <a:ext cx="7368120" cy="855000"/>
           </a:xfrm>
           <a:prstGeom prst="rect">
             <a:avLst/>
@@ -39969,7 +39969,7 @@
         <p:spPr>
           <a:xfrm>
             <a:off x="886680" y="1598400"/>
-            <a:ext cx="7368480" cy="3325320"/>
+            <a:ext cx="7368120" cy="3324960"/>
           </a:xfrm>
           <a:prstGeom prst="rect">
             <a:avLst/>
@@ -39999,7 +39999,7 @@
         <p:spPr>
           <a:xfrm>
             <a:off x="27000" y="4749840"/>
-            <a:ext cx="546480" cy="391320"/>
+            <a:ext cx="546120" cy="390960"/>
           </a:xfrm>
           <a:prstGeom prst="rect">
             <a:avLst/>
@@ -40039,7 +40039,7 @@
                 <a:tab algn="l" pos="0"/>
               </a:tabLst>
             </a:pPr>
-            <a:fld id="{47ADAD68-0B65-404C-AEF4-0AFEF3630CD7}" type="slidenum">
+            <a:fld id="{97BC309B-3A93-4AB4-8AF0-C8F4D5905C4F}" type="slidenum">
               <a:rPr b="0" lang="en" sz="1200" spc="-1" strike="noStrike">
                 <a:solidFill>
                   <a:srgbClr val="00ae9d"/>
@@ -40332,7 +40332,7 @@
         <p:spPr>
           <a:xfrm>
             <a:off x="-2520" y="0"/>
-            <a:ext cx="5207400" cy="981360"/>
+            <a:ext cx="5207040" cy="981000"/>
           </a:xfrm>
           <a:custGeom>
             <a:avLst/>
@@ -40377,7 +40377,7 @@
         <p:spPr>
           <a:xfrm>
             <a:off x="-6120" y="0"/>
-            <a:ext cx="4443120" cy="1083600"/>
+            <a:ext cx="4442760" cy="1083240"/>
           </a:xfrm>
           <a:custGeom>
             <a:avLst/>
@@ -40427,7 +40427,7 @@
         <p:spPr>
           <a:xfrm>
             <a:off x="6375600" y="4745880"/>
-            <a:ext cx="2546640" cy="398880"/>
+            <a:ext cx="2546280" cy="398520"/>
           </a:xfrm>
           <a:custGeom>
             <a:avLst/>
@@ -40472,7 +40472,7 @@
         <p:spPr>
           <a:xfrm>
             <a:off x="7341120" y="4767480"/>
-            <a:ext cx="1819080" cy="393480"/>
+            <a:ext cx="1818720" cy="393120"/>
           </a:xfrm>
           <a:custGeom>
             <a:avLst/>
@@ -40519,7 +40519,7 @@
         <p:spPr>
           <a:xfrm>
             <a:off x="8340840" y="4204080"/>
-            <a:ext cx="816120" cy="956880"/>
+            <a:ext cx="815760" cy="956520"/>
           </a:xfrm>
           <a:custGeom>
             <a:avLst/>
@@ -40566,7 +40566,7 @@
         <p:spPr>
           <a:xfrm>
             <a:off x="1559160" y="-6120"/>
-            <a:ext cx="4114440" cy="942840"/>
+            <a:ext cx="4114080" cy="942480"/>
           </a:xfrm>
           <a:custGeom>
             <a:avLst/>
@@ -40620,7 +40620,7 @@
         <p:spPr>
           <a:xfrm>
             <a:off x="27000" y="4749840"/>
-            <a:ext cx="546480" cy="391320"/>
+            <a:ext cx="546120" cy="390960"/>
           </a:xfrm>
           <a:prstGeom prst="rect">
             <a:avLst/>
@@ -40660,7 +40660,7 @@
                 <a:tab algn="l" pos="0"/>
               </a:tabLst>
             </a:pPr>
-            <a:fld id="{8CA58109-4C6A-4AE4-8F0B-D87553E010FD}" type="slidenum">
+            <a:fld id="{AB720640-B540-4DBD-9964-6302DD99C0D4}" type="slidenum">
               <a:rPr b="0" lang="en" sz="1200" spc="-1" strike="noStrike">
                 <a:solidFill>
                   <a:srgbClr val="00ae9d"/>
@@ -40953,9 +40953,9 @@
         <p:grpSpPr>
           <a:xfrm>
             <a:off x="-6120" y="0"/>
-            <a:ext cx="9165960" cy="5160960"/>
+            <a:ext cx="9165600" cy="5160600"/>
             <a:chOff x="-6120" y="0"/>
-            <a:chExt cx="9165960" cy="5160960"/>
+            <a:chExt cx="9165600" cy="5160600"/>
           </a:xfrm>
         </p:grpSpPr>
         <p:sp>
@@ -40967,7 +40967,7 @@
           <p:spPr>
             <a:xfrm>
               <a:off x="0" y="0"/>
-              <a:ext cx="8550720" cy="1330920"/>
+              <a:ext cx="8550360" cy="1330560"/>
             </a:xfrm>
             <a:custGeom>
               <a:avLst/>
@@ -41012,7 +41012,7 @@
           <p:spPr>
             <a:xfrm>
               <a:off x="2563560" y="0"/>
-              <a:ext cx="6578280" cy="1270440"/>
+              <a:ext cx="6577920" cy="1270080"/>
             </a:xfrm>
             <a:custGeom>
               <a:avLst/>
@@ -41062,7 +41062,7 @@
           <p:spPr>
             <a:xfrm>
               <a:off x="-6120" y="0"/>
-              <a:ext cx="7296120" cy="1469520"/>
+              <a:ext cx="7295760" cy="1469160"/>
             </a:xfrm>
             <a:custGeom>
               <a:avLst/>
@@ -41112,7 +41112,7 @@
           <p:spPr>
             <a:xfrm>
               <a:off x="3596040" y="4667040"/>
-              <a:ext cx="5088600" cy="474480"/>
+              <a:ext cx="5088240" cy="474120"/>
             </a:xfrm>
             <a:custGeom>
               <a:avLst/>
@@ -41157,7 +41157,7 @@
           <p:spPr>
             <a:xfrm>
               <a:off x="5524920" y="4692600"/>
-              <a:ext cx="3634920" cy="468360"/>
+              <a:ext cx="3634560" cy="468000"/>
             </a:xfrm>
             <a:custGeom>
               <a:avLst/>
@@ -41204,7 +41204,7 @@
           <p:spPr>
             <a:xfrm>
               <a:off x="7521480" y="4023000"/>
-              <a:ext cx="1632600" cy="1137960"/>
+              <a:ext cx="1632240" cy="1137600"/>
             </a:xfrm>
             <a:custGeom>
               <a:avLst/>
@@ -41256,7 +41256,7 @@
         <p:spPr>
           <a:xfrm>
             <a:off x="27000" y="4749840"/>
-            <a:ext cx="546480" cy="391320"/>
+            <a:ext cx="546120" cy="390960"/>
           </a:xfrm>
           <a:prstGeom prst="rect">
             <a:avLst/>
@@ -41296,7 +41296,7 @@
                 <a:tab algn="l" pos="0"/>
               </a:tabLst>
             </a:pPr>
-            <a:fld id="{A53E2DCC-2C5E-43BD-B4FE-EE39DAFF05DF}" type="slidenum">
+            <a:fld id="{E4DC77BE-88E8-404B-A8FB-6BB8F7817C25}" type="slidenum">
               <a:rPr b="0" lang="en" sz="1200" spc="-1" strike="noStrike">
                 <a:solidFill>
                   <a:srgbClr val="00ae9d"/>
@@ -41589,9 +41589,9 @@
         <p:grpSpPr>
           <a:xfrm>
             <a:off x="-6120" y="0"/>
-            <a:ext cx="9165960" cy="5160960"/>
+            <a:ext cx="9165600" cy="5160600"/>
             <a:chOff x="-6120" y="0"/>
-            <a:chExt cx="9165960" cy="5160960"/>
+            <a:chExt cx="9165600" cy="5160600"/>
           </a:xfrm>
         </p:grpSpPr>
         <p:sp>
@@ -41603,7 +41603,7 @@
           <p:spPr>
             <a:xfrm>
               <a:off x="0" y="0"/>
-              <a:ext cx="8550720" cy="1330920"/>
+              <a:ext cx="8550360" cy="1330560"/>
             </a:xfrm>
             <a:custGeom>
               <a:avLst/>
@@ -41648,7 +41648,7 @@
           <p:spPr>
             <a:xfrm>
               <a:off x="2563560" y="0"/>
-              <a:ext cx="6578280" cy="1270440"/>
+              <a:ext cx="6577920" cy="1270080"/>
             </a:xfrm>
             <a:custGeom>
               <a:avLst/>
@@ -41698,7 +41698,7 @@
           <p:spPr>
             <a:xfrm>
               <a:off x="-6120" y="0"/>
-              <a:ext cx="7296120" cy="1469520"/>
+              <a:ext cx="7295760" cy="1469160"/>
             </a:xfrm>
             <a:custGeom>
               <a:avLst/>
@@ -41748,7 +41748,7 @@
           <p:spPr>
             <a:xfrm>
               <a:off x="3596040" y="4667040"/>
-              <a:ext cx="5088600" cy="474480"/>
+              <a:ext cx="5088240" cy="474120"/>
             </a:xfrm>
             <a:custGeom>
               <a:avLst/>
@@ -41793,7 +41793,7 @@
           <p:spPr>
             <a:xfrm>
               <a:off x="5524920" y="4692600"/>
-              <a:ext cx="3634920" cy="468360"/>
+              <a:ext cx="3634560" cy="468000"/>
             </a:xfrm>
             <a:custGeom>
               <a:avLst/>
@@ -41840,7 +41840,7 @@
           <p:spPr>
             <a:xfrm>
               <a:off x="7521480" y="4023000"/>
-              <a:ext cx="1632600" cy="1137960"/>
+              <a:ext cx="1632240" cy="1137600"/>
             </a:xfrm>
             <a:custGeom>
               <a:avLst/>
@@ -41892,7 +41892,7 @@
         <p:spPr>
           <a:xfrm>
             <a:off x="27000" y="4749840"/>
-            <a:ext cx="546480" cy="391320"/>
+            <a:ext cx="546120" cy="390960"/>
           </a:xfrm>
           <a:prstGeom prst="rect">
             <a:avLst/>
@@ -41932,7 +41932,7 @@
                 <a:tab algn="l" pos="0"/>
               </a:tabLst>
             </a:pPr>
-            <a:fld id="{E9465745-1FEA-41AC-8352-9B0FBB462E48}" type="slidenum">
+            <a:fld id="{1704735B-E891-4C26-89FF-36FF6CD67298}" type="slidenum">
               <a:rPr b="0" lang="en" sz="1200" spc="-1" strike="noStrike">
                 <a:solidFill>
                   <a:srgbClr val="00ae9d"/>
@@ -42225,9 +42225,9 @@
         <p:grpSpPr>
           <a:xfrm>
             <a:off x="-6120" y="0"/>
-            <a:ext cx="9165960" cy="5160960"/>
+            <a:ext cx="9165600" cy="5160600"/>
             <a:chOff x="-6120" y="0"/>
-            <a:chExt cx="9165960" cy="5160960"/>
+            <a:chExt cx="9165600" cy="5160600"/>
           </a:xfrm>
         </p:grpSpPr>
         <p:sp>
@@ -42239,7 +42239,7 @@
           <p:spPr>
             <a:xfrm>
               <a:off x="0" y="0"/>
-              <a:ext cx="8550720" cy="1330920"/>
+              <a:ext cx="8550360" cy="1330560"/>
             </a:xfrm>
             <a:custGeom>
               <a:avLst/>
@@ -42284,7 +42284,7 @@
           <p:spPr>
             <a:xfrm>
               <a:off x="2563560" y="0"/>
-              <a:ext cx="6578280" cy="1270440"/>
+              <a:ext cx="6577920" cy="1270080"/>
             </a:xfrm>
             <a:custGeom>
               <a:avLst/>
@@ -42334,7 +42334,7 @@
           <p:spPr>
             <a:xfrm>
               <a:off x="-6120" y="0"/>
-              <a:ext cx="7296120" cy="1469520"/>
+              <a:ext cx="7295760" cy="1469160"/>
             </a:xfrm>
             <a:custGeom>
               <a:avLst/>
@@ -42384,7 +42384,7 @@
           <p:spPr>
             <a:xfrm>
               <a:off x="3596040" y="4667040"/>
-              <a:ext cx="5088600" cy="474480"/>
+              <a:ext cx="5088240" cy="474120"/>
             </a:xfrm>
             <a:custGeom>
               <a:avLst/>
@@ -42429,7 +42429,7 @@
           <p:spPr>
             <a:xfrm>
               <a:off x="5524920" y="4692600"/>
-              <a:ext cx="3634920" cy="468360"/>
+              <a:ext cx="3634560" cy="468000"/>
             </a:xfrm>
             <a:custGeom>
               <a:avLst/>
@@ -42476,7 +42476,7 @@
           <p:spPr>
             <a:xfrm>
               <a:off x="7521480" y="4023000"/>
-              <a:ext cx="1632600" cy="1137960"/>
+              <a:ext cx="1632240" cy="1137600"/>
             </a:xfrm>
             <a:custGeom>
               <a:avLst/>
@@ -42528,7 +42528,7 @@
         <p:spPr>
           <a:xfrm>
             <a:off x="27000" y="4749840"/>
-            <a:ext cx="546480" cy="391320"/>
+            <a:ext cx="546120" cy="390960"/>
           </a:xfrm>
           <a:prstGeom prst="rect">
             <a:avLst/>
@@ -42568,7 +42568,7 @@
                 <a:tab algn="l" pos="0"/>
               </a:tabLst>
             </a:pPr>
-            <a:fld id="{07BC83AA-9242-4685-91F8-76742F4CC9AD}" type="slidenum">
+            <a:fld id="{85B849B0-4B1F-4DBA-8BFC-9A4F06851309}" type="slidenum">
               <a:rPr b="0" lang="en" sz="1200" spc="-1" strike="noStrike">
                 <a:solidFill>
                   <a:srgbClr val="00ae9d"/>
@@ -42854,7 +42854,7 @@
         <p:spPr>
           <a:xfrm>
             <a:off x="7149240" y="4774320"/>
-            <a:ext cx="3135960" cy="363960"/>
+            <a:ext cx="3135600" cy="363960"/>
           </a:xfrm>
           <a:prstGeom prst="rect">
             <a:avLst/>
@@ -42909,7 +42909,7 @@
         <p:spPr>
           <a:xfrm>
             <a:off x="-7560" y="-13680"/>
-            <a:ext cx="9150840" cy="5141880"/>
+            <a:ext cx="9150480" cy="5141520"/>
           </a:xfrm>
           <a:prstGeom prst="rect">
             <a:avLst/>
@@ -42962,7 +42962,7 @@
         <p:spPr>
           <a:xfrm>
             <a:off x="0" y="0"/>
-            <a:ext cx="9142200" cy="5141880"/>
+            <a:ext cx="9141840" cy="5141520"/>
           </a:xfrm>
           <a:prstGeom prst="rect">
             <a:avLst/>
@@ -43015,7 +43015,7 @@
         <p:spPr>
           <a:xfrm>
             <a:off x="886680" y="398520"/>
-            <a:ext cx="7368480" cy="855360"/>
+            <a:ext cx="7368120" cy="855000"/>
           </a:xfrm>
           <a:prstGeom prst="rect">
             <a:avLst/>
@@ -43064,7 +43064,7 @@
         <p:spPr>
           <a:xfrm>
             <a:off x="886680" y="1669680"/>
-            <a:ext cx="7368480" cy="3080160"/>
+            <a:ext cx="7368120" cy="3079800"/>
           </a:xfrm>
           <a:prstGeom prst="rect">
             <a:avLst/>
@@ -43148,7 +43148,7 @@
         <p:spPr>
           <a:xfrm>
             <a:off x="27000" y="4749840"/>
-            <a:ext cx="546480" cy="391320"/>
+            <a:ext cx="546120" cy="390960"/>
           </a:xfrm>
           <a:prstGeom prst="rect">
             <a:avLst/>
@@ -43188,7 +43188,7 @@
                 <a:tab algn="l" pos="0"/>
               </a:tabLst>
             </a:pPr>
-            <a:fld id="{8EB4C366-5485-4798-B4E9-DC893E4EF367}" type="slidenum">
+            <a:fld id="{C2C551C2-4031-48F3-86E4-6A1B920476E8}" type="slidenum">
               <a:rPr b="0" lang="en" sz="1200" spc="-1" strike="noStrike">
                 <a:solidFill>
                   <a:srgbClr val="00ae9d"/>
@@ -43196,7 +43196,7 @@
                 <a:latin typeface="Karla"/>
                 <a:ea typeface="Karla"/>
               </a:rPr>
-              <a:t>&lt;number&gt;</a:t>
+              <a:t>8</a:t>
             </a:fld>
             <a:endParaRPr b="0" lang="en-US" sz="1200" spc="-1" strike="noStrike">
               <a:latin typeface="Times New Roman"/>
@@ -43213,7 +43213,7 @@
         <p:spPr>
           <a:xfrm>
             <a:off x="6400800" y="4779000"/>
-            <a:ext cx="2284200" cy="363960"/>
+            <a:ext cx="2283840" cy="363960"/>
           </a:xfrm>
           <a:prstGeom prst="rect">
             <a:avLst/>
@@ -43278,7 +43278,7 @@
         <p:spPr>
           <a:xfrm>
             <a:off x="686160" y="1702080"/>
-            <a:ext cx="7368480" cy="2639520"/>
+            <a:ext cx="7368120" cy="2639160"/>
           </a:xfrm>
           <a:prstGeom prst="rect">
             <a:avLst/>
@@ -43405,7 +43405,7 @@
         <p:spPr>
           <a:xfrm>
             <a:off x="886680" y="398520"/>
-            <a:ext cx="7368480" cy="855360"/>
+            <a:ext cx="7368120" cy="855000"/>
           </a:xfrm>
           <a:prstGeom prst="rect">
             <a:avLst/>
@@ -43454,7 +43454,7 @@
         <p:spPr>
           <a:xfrm>
             <a:off x="886680" y="1669680"/>
-            <a:ext cx="7368480" cy="3080160"/>
+            <a:ext cx="7368120" cy="3079800"/>
           </a:xfrm>
           <a:prstGeom prst="rect">
             <a:avLst/>
@@ -43538,7 +43538,7 @@
         <p:spPr>
           <a:xfrm>
             <a:off x="27000" y="4749840"/>
-            <a:ext cx="546480" cy="391320"/>
+            <a:ext cx="546120" cy="390960"/>
           </a:xfrm>
           <a:prstGeom prst="rect">
             <a:avLst/>
@@ -43578,7 +43578,7 @@
                 <a:tab algn="l" pos="0"/>
               </a:tabLst>
             </a:pPr>
-            <a:fld id="{E9672374-046E-4975-883C-94CC4B85F9C0}" type="slidenum">
+            <a:fld id="{CFF266A4-8483-4A7B-AE29-7EEE362A5734}" type="slidenum">
               <a:rPr b="0" lang="en" sz="1200" spc="-1" strike="noStrike">
                 <a:solidFill>
                   <a:srgbClr val="00ae9d"/>
@@ -43586,7 +43586,7 @@
                 <a:latin typeface="Karla"/>
                 <a:ea typeface="Karla"/>
               </a:rPr>
-              <a:t>&lt;number&gt;</a:t>
+              <a:t>8</a:t>
             </a:fld>
             <a:endParaRPr b="0" lang="en-US" sz="1200" spc="-1" strike="noStrike">
               <a:latin typeface="Times New Roman"/>
@@ -43603,7 +43603,7 @@
         <p:spPr>
           <a:xfrm>
             <a:off x="6400800" y="4779000"/>
-            <a:ext cx="2284200" cy="363960"/>
+            <a:ext cx="2283840" cy="363960"/>
           </a:xfrm>
           <a:prstGeom prst="rect">
             <a:avLst/>
@@ -43668,7 +43668,7 @@
         <p:spPr>
           <a:xfrm>
             <a:off x="686160" y="1702080"/>
-            <a:ext cx="7368480" cy="2639520"/>
+            <a:ext cx="7368120" cy="2639160"/>
           </a:xfrm>
           <a:prstGeom prst="rect">
             <a:avLst/>
@@ -43811,7 +43811,7 @@
         <p:spPr>
           <a:xfrm>
             <a:off x="886680" y="398520"/>
-            <a:ext cx="7368480" cy="855360"/>
+            <a:ext cx="7368120" cy="855000"/>
           </a:xfrm>
           <a:prstGeom prst="rect">
             <a:avLst/>
@@ -43860,7 +43860,7 @@
         <p:spPr>
           <a:xfrm>
             <a:off x="1053720" y="1694880"/>
-            <a:ext cx="6655680" cy="3080160"/>
+            <a:ext cx="6655320" cy="3079800"/>
           </a:xfrm>
           <a:prstGeom prst="rect">
             <a:avLst/>
@@ -43944,7 +43944,7 @@
         <p:spPr>
           <a:xfrm>
             <a:off x="27000" y="4749840"/>
-            <a:ext cx="546480" cy="391320"/>
+            <a:ext cx="546120" cy="390960"/>
           </a:xfrm>
           <a:prstGeom prst="rect">
             <a:avLst/>
@@ -43984,7 +43984,7 @@
                 <a:tab algn="l" pos="0"/>
               </a:tabLst>
             </a:pPr>
-            <a:fld id="{7AF86A5A-15D0-469E-83B8-58B439BC7288}" type="slidenum">
+            <a:fld id="{F08FC84E-38D4-40A6-86F5-07ACDE7116DA}" type="slidenum">
               <a:rPr b="0" lang="en" sz="1200" spc="-1" strike="noStrike">
                 <a:solidFill>
                   <a:srgbClr val="00ae9d"/>
@@ -43992,7 +43992,7 @@
                 <a:latin typeface="Karla"/>
                 <a:ea typeface="Karla"/>
               </a:rPr>
-              <a:t>&lt;number&gt;</a:t>
+              <a:t>8</a:t>
             </a:fld>
             <a:endParaRPr b="0" lang="en-US" sz="1200" spc="-1" strike="noStrike">
               <a:latin typeface="Times New Roman"/>
@@ -44009,7 +44009,7 @@
         <p:spPr>
           <a:xfrm>
             <a:off x="6400800" y="4779000"/>
-            <a:ext cx="2284200" cy="363960"/>
+            <a:ext cx="2283840" cy="363960"/>
           </a:xfrm>
           <a:prstGeom prst="rect">
             <a:avLst/>
@@ -44074,7 +44074,7 @@
         <p:spPr>
           <a:xfrm>
             <a:off x="686160" y="1702080"/>
-            <a:ext cx="7368480" cy="2639520"/>
+            <a:ext cx="7368120" cy="2639160"/>
           </a:xfrm>
           <a:prstGeom prst="rect">
             <a:avLst/>
@@ -44243,7 +44243,7 @@
         <p:spPr>
           <a:xfrm>
             <a:off x="886680" y="398520"/>
-            <a:ext cx="7368480" cy="855360"/>
+            <a:ext cx="7368120" cy="855000"/>
           </a:xfrm>
           <a:prstGeom prst="rect">
             <a:avLst/>
@@ -44292,7 +44292,7 @@
         <p:spPr>
           <a:xfrm>
             <a:off x="1053720" y="1694880"/>
-            <a:ext cx="6655680" cy="3080160"/>
+            <a:ext cx="6655320" cy="3079800"/>
           </a:xfrm>
           <a:prstGeom prst="rect">
             <a:avLst/>
@@ -44376,7 +44376,7 @@
         <p:spPr>
           <a:xfrm>
             <a:off x="27000" y="4749840"/>
-            <a:ext cx="546480" cy="391320"/>
+            <a:ext cx="546120" cy="390960"/>
           </a:xfrm>
           <a:prstGeom prst="rect">
             <a:avLst/>
@@ -44416,7 +44416,7 @@
                 <a:tab algn="l" pos="0"/>
               </a:tabLst>
             </a:pPr>
-            <a:fld id="{3B3C3391-2505-48AE-B801-2776C94B81F2}" type="slidenum">
+            <a:fld id="{E398C812-53FF-40E4-95BA-AA9D482F10EE}" type="slidenum">
               <a:rPr b="0" lang="en" sz="1200" spc="-1" strike="noStrike">
                 <a:solidFill>
                   <a:srgbClr val="00ae9d"/>
@@ -44424,7 +44424,7 @@
                 <a:latin typeface="Karla"/>
                 <a:ea typeface="Karla"/>
               </a:rPr>
-              <a:t>&lt;number&gt;</a:t>
+              <a:t>8</a:t>
             </a:fld>
             <a:endParaRPr b="0" lang="en-US" sz="1200" spc="-1" strike="noStrike">
               <a:latin typeface="Times New Roman"/>
@@ -44441,7 +44441,7 @@
         <p:spPr>
           <a:xfrm>
             <a:off x="6400800" y="4779000"/>
-            <a:ext cx="2284200" cy="363960"/>
+            <a:ext cx="2283840" cy="363960"/>
           </a:xfrm>
           <a:prstGeom prst="rect">
             <a:avLst/>
@@ -44506,7 +44506,7 @@
         <p:spPr>
           <a:xfrm>
             <a:off x="686160" y="1702080"/>
-            <a:ext cx="7368480" cy="2639520"/>
+            <a:ext cx="7368120" cy="2639160"/>
           </a:xfrm>
           <a:prstGeom prst="rect">
             <a:avLst/>
@@ -44691,7 +44691,7 @@
         <p:spPr>
           <a:xfrm>
             <a:off x="886680" y="398520"/>
-            <a:ext cx="7368480" cy="855360"/>
+            <a:ext cx="7368120" cy="855000"/>
           </a:xfrm>
           <a:prstGeom prst="rect">
             <a:avLst/>
@@ -44740,7 +44740,7 @@
         <p:spPr>
           <a:xfrm>
             <a:off x="886680" y="1669680"/>
-            <a:ext cx="7368480" cy="3080160"/>
+            <a:ext cx="7368120" cy="3079800"/>
           </a:xfrm>
           <a:prstGeom prst="rect">
             <a:avLst/>
@@ -44824,7 +44824,7 @@
         <p:spPr>
           <a:xfrm>
             <a:off x="27000" y="4749840"/>
-            <a:ext cx="546480" cy="391320"/>
+            <a:ext cx="546120" cy="390960"/>
           </a:xfrm>
           <a:prstGeom prst="rect">
             <a:avLst/>
@@ -44864,7 +44864,7 @@
                 <a:tab algn="l" pos="0"/>
               </a:tabLst>
             </a:pPr>
-            <a:fld id="{324CBA6F-3685-438B-B012-F52D5DDAB1FC}" type="slidenum">
+            <a:fld id="{06B021D6-4AE8-41B8-9D5D-42D39A8ED2B0}" type="slidenum">
               <a:rPr b="0" lang="en" sz="1200" spc="-1" strike="noStrike">
                 <a:solidFill>
                   <a:srgbClr val="00ae9d"/>
@@ -44872,7 +44872,7 @@
                 <a:latin typeface="Karla"/>
                 <a:ea typeface="Karla"/>
               </a:rPr>
-              <a:t>&lt;number&gt;</a:t>
+              <a:t>8</a:t>
             </a:fld>
             <a:endParaRPr b="0" lang="en-US" sz="1200" spc="-1" strike="noStrike">
               <a:latin typeface="Times New Roman"/>
@@ -44889,7 +44889,7 @@
         <p:spPr>
           <a:xfrm>
             <a:off x="6400800" y="4779000"/>
-            <a:ext cx="2284200" cy="363960"/>
+            <a:ext cx="2283840" cy="363960"/>
           </a:xfrm>
           <a:prstGeom prst="rect">
             <a:avLst/>
@@ -44954,7 +44954,7 @@
         <p:spPr>
           <a:xfrm>
             <a:off x="686160" y="1702080"/>
-            <a:ext cx="7368480" cy="2639520"/>
+            <a:ext cx="7368120" cy="2639160"/>
           </a:xfrm>
           <a:prstGeom prst="rect">
             <a:avLst/>
@@ -45129,7 +45129,7 @@
         <p:spPr>
           <a:xfrm>
             <a:off x="886680" y="398520"/>
-            <a:ext cx="7368480" cy="855360"/>
+            <a:ext cx="7368120" cy="855000"/>
           </a:xfrm>
           <a:prstGeom prst="rect">
             <a:avLst/>
@@ -45178,7 +45178,7 @@
         <p:spPr>
           <a:xfrm>
             <a:off x="886680" y="1669680"/>
-            <a:ext cx="7368480" cy="3080160"/>
+            <a:ext cx="7368120" cy="3079800"/>
           </a:xfrm>
           <a:prstGeom prst="rect">
             <a:avLst/>
@@ -45262,7 +45262,7 @@
         <p:spPr>
           <a:xfrm>
             <a:off x="27000" y="4749840"/>
-            <a:ext cx="546480" cy="391320"/>
+            <a:ext cx="546120" cy="390960"/>
           </a:xfrm>
           <a:prstGeom prst="rect">
             <a:avLst/>
@@ -45302,7 +45302,7 @@
                 <a:tab algn="l" pos="0"/>
               </a:tabLst>
             </a:pPr>
-            <a:fld id="{311AAD1B-810D-47B4-AF77-3E9E8055721A}" type="slidenum">
+            <a:fld id="{F26C347F-193F-47FF-9066-074932576BEA}" type="slidenum">
               <a:rPr b="0" lang="en" sz="1200" spc="-1" strike="noStrike">
                 <a:solidFill>
                   <a:srgbClr val="00ae9d"/>
@@ -45310,7 +45310,7 @@
                 <a:latin typeface="Karla"/>
                 <a:ea typeface="Karla"/>
               </a:rPr>
-              <a:t>&lt;number&gt;</a:t>
+              <a:t>8</a:t>
             </a:fld>
             <a:endParaRPr b="0" lang="en-US" sz="1200" spc="-1" strike="noStrike">
               <a:latin typeface="Times New Roman"/>
@@ -45327,7 +45327,7 @@
         <p:spPr>
           <a:xfrm>
             <a:off x="6400800" y="4779000"/>
-            <a:ext cx="2284200" cy="363960"/>
+            <a:ext cx="2283840" cy="363960"/>
           </a:xfrm>
           <a:prstGeom prst="rect">
             <a:avLst/>
@@ -45392,7 +45392,7 @@
         <p:spPr>
           <a:xfrm>
             <a:off x="686160" y="1702080"/>
-            <a:ext cx="7368480" cy="2639520"/>
+            <a:ext cx="7368120" cy="2639160"/>
           </a:xfrm>
           <a:prstGeom prst="rect">
             <a:avLst/>
@@ -45567,7 +45567,7 @@
         <p:spPr>
           <a:xfrm>
             <a:off x="886680" y="398520"/>
-            <a:ext cx="7368480" cy="855360"/>
+            <a:ext cx="7368120" cy="855000"/>
           </a:xfrm>
           <a:prstGeom prst="rect">
             <a:avLst/>
@@ -45616,7 +45616,7 @@
         <p:spPr>
           <a:xfrm>
             <a:off x="886680" y="1669680"/>
-            <a:ext cx="7368480" cy="3080160"/>
+            <a:ext cx="7368120" cy="3079800"/>
           </a:xfrm>
           <a:prstGeom prst="rect">
             <a:avLst/>
@@ -45700,7 +45700,7 @@
         <p:spPr>
           <a:xfrm>
             <a:off x="27000" y="4749840"/>
-            <a:ext cx="546480" cy="391320"/>
+            <a:ext cx="546120" cy="390960"/>
           </a:xfrm>
           <a:prstGeom prst="rect">
             <a:avLst/>
@@ -45740,7 +45740,7 @@
                 <a:tab algn="l" pos="0"/>
               </a:tabLst>
             </a:pPr>
-            <a:fld id="{A62D6310-96D4-4CBB-83CD-C2DA4A00E09B}" type="slidenum">
+            <a:fld id="{E1CEC85A-67F8-4C8C-A31F-BD0CF906A0A1}" type="slidenum">
               <a:rPr b="0" lang="en" sz="1200" spc="-1" strike="noStrike">
                 <a:solidFill>
                   <a:srgbClr val="00ae9d"/>
@@ -45748,7 +45748,7 @@
                 <a:latin typeface="Karla"/>
                 <a:ea typeface="Karla"/>
               </a:rPr>
-              <a:t>&lt;number&gt;</a:t>
+              <a:t>8</a:t>
             </a:fld>
             <a:endParaRPr b="0" lang="en-US" sz="1200" spc="-1" strike="noStrike">
               <a:latin typeface="Times New Roman"/>
@@ -45765,7 +45765,7 @@
         <p:spPr>
           <a:xfrm>
             <a:off x="6400800" y="4779000"/>
-            <a:ext cx="2284200" cy="363960"/>
+            <a:ext cx="2283840" cy="363960"/>
           </a:xfrm>
           <a:prstGeom prst="rect">
             <a:avLst/>
@@ -45830,7 +45830,7 @@
         <p:spPr>
           <a:xfrm>
             <a:off x="686160" y="1702080"/>
-            <a:ext cx="7368480" cy="2639520"/>
+            <a:ext cx="7368120" cy="2639160"/>
           </a:xfrm>
           <a:prstGeom prst="rect">
             <a:avLst/>
@@ -45995,7 +45995,7 @@
         <p:spPr>
           <a:xfrm>
             <a:off x="886680" y="398520"/>
-            <a:ext cx="7368480" cy="855360"/>
+            <a:ext cx="7368120" cy="855000"/>
           </a:xfrm>
           <a:prstGeom prst="rect">
             <a:avLst/>
@@ -46044,7 +46044,7 @@
         <p:spPr>
           <a:xfrm>
             <a:off x="886680" y="1669680"/>
-            <a:ext cx="7368480" cy="3080160"/>
+            <a:ext cx="7368120" cy="3079800"/>
           </a:xfrm>
           <a:prstGeom prst="rect">
             <a:avLst/>
@@ -46128,7 +46128,7 @@
         <p:spPr>
           <a:xfrm>
             <a:off x="27000" y="4749840"/>
-            <a:ext cx="546480" cy="391320"/>
+            <a:ext cx="546120" cy="390960"/>
           </a:xfrm>
           <a:prstGeom prst="rect">
             <a:avLst/>
@@ -46168,7 +46168,7 @@
                 <a:tab algn="l" pos="0"/>
               </a:tabLst>
             </a:pPr>
-            <a:fld id="{64F28E5B-56AC-41B0-97D9-C44B4DA0D651}" type="slidenum">
+            <a:fld id="{8C8BC563-A45B-4F70-B029-B9DC31C97ECF}" type="slidenum">
               <a:rPr b="0" lang="en" sz="1200" spc="-1" strike="noStrike">
                 <a:solidFill>
                   <a:srgbClr val="00ae9d"/>
@@ -46176,7 +46176,7 @@
                 <a:latin typeface="Karla"/>
                 <a:ea typeface="Karla"/>
               </a:rPr>
-              <a:t>&lt;number&gt;</a:t>
+              <a:t>8</a:t>
             </a:fld>
             <a:endParaRPr b="0" lang="en-US" sz="1200" spc="-1" strike="noStrike">
               <a:latin typeface="Times New Roman"/>
@@ -46193,7 +46193,7 @@
         <p:spPr>
           <a:xfrm>
             <a:off x="6400800" y="4779000"/>
-            <a:ext cx="2284200" cy="363960"/>
+            <a:ext cx="2283840" cy="363960"/>
           </a:xfrm>
           <a:prstGeom prst="rect">
             <a:avLst/>
@@ -46258,7 +46258,7 @@
         <p:spPr>
           <a:xfrm>
             <a:off x="686160" y="1702080"/>
-            <a:ext cx="7368480" cy="2639520"/>
+            <a:ext cx="7368120" cy="2639160"/>
           </a:xfrm>
           <a:prstGeom prst="rect">
             <a:avLst/>
@@ -46491,7 +46491,7 @@
         <p:spPr>
           <a:xfrm>
             <a:off x="886680" y="398520"/>
-            <a:ext cx="7368480" cy="855360"/>
+            <a:ext cx="7368120" cy="855000"/>
           </a:xfrm>
           <a:prstGeom prst="rect">
             <a:avLst/>
@@ -46540,7 +46540,7 @@
         <p:spPr>
           <a:xfrm>
             <a:off x="886680" y="1669680"/>
-            <a:ext cx="7368480" cy="3080160"/>
+            <a:ext cx="7368120" cy="3079800"/>
           </a:xfrm>
           <a:prstGeom prst="rect">
             <a:avLst/>
@@ -46624,7 +46624,7 @@
         <p:spPr>
           <a:xfrm>
             <a:off x="27000" y="4749840"/>
-            <a:ext cx="546480" cy="391320"/>
+            <a:ext cx="546120" cy="390960"/>
           </a:xfrm>
           <a:prstGeom prst="rect">
             <a:avLst/>
@@ -46664,7 +46664,7 @@
                 <a:tab algn="l" pos="0"/>
               </a:tabLst>
             </a:pPr>
-            <a:fld id="{3F288D91-A6CD-4FD6-90A2-346307602A3E}" type="slidenum">
+            <a:fld id="{B83FE549-8397-4336-8440-7D453A72A95B}" type="slidenum">
               <a:rPr b="0" lang="en" sz="1200" spc="-1" strike="noStrike">
                 <a:solidFill>
                   <a:srgbClr val="00ae9d"/>
@@ -46672,7 +46672,7 @@
                 <a:latin typeface="Karla"/>
                 <a:ea typeface="Karla"/>
               </a:rPr>
-              <a:t>&lt;number&gt;</a:t>
+              <a:t>8</a:t>
             </a:fld>
             <a:endParaRPr b="0" lang="en-US" sz="1200" spc="-1" strike="noStrike">
               <a:latin typeface="Times New Roman"/>
@@ -46689,7 +46689,7 @@
         <p:spPr>
           <a:xfrm>
             <a:off x="6400800" y="4779000"/>
-            <a:ext cx="2284200" cy="363960"/>
+            <a:ext cx="2283840" cy="363960"/>
           </a:xfrm>
           <a:prstGeom prst="rect">
             <a:avLst/>
@@ -46754,7 +46754,7 @@
         <p:spPr>
           <a:xfrm>
             <a:off x="686160" y="1702080"/>
-            <a:ext cx="7368480" cy="2639520"/>
+            <a:ext cx="7368120" cy="2639160"/>
           </a:xfrm>
           <a:prstGeom prst="rect">
             <a:avLst/>
@@ -46957,7 +46957,7 @@
         <p:spPr>
           <a:xfrm>
             <a:off x="1143000" y="1600200"/>
-            <a:ext cx="5942880" cy="2513880"/>
+            <a:ext cx="5942520" cy="2513520"/>
           </a:xfrm>
           <a:prstGeom prst="rect">
             <a:avLst/>
@@ -46980,7 +46980,7 @@
         <p:spPr>
           <a:xfrm>
             <a:off x="0" y="0"/>
-            <a:ext cx="9143280" cy="5142960"/>
+            <a:ext cx="9142920" cy="5142600"/>
           </a:xfrm>
           <a:prstGeom prst="rect">
             <a:avLst/>
@@ -46999,7 +46999,7 @@
         <p:spPr>
           <a:xfrm>
             <a:off x="2286000" y="58320"/>
-            <a:ext cx="7368480" cy="855360"/>
+            <a:ext cx="7368120" cy="855000"/>
           </a:xfrm>
           <a:prstGeom prst="rect">
             <a:avLst/>
@@ -47084,7 +47084,7 @@
         <p:spPr>
           <a:xfrm>
             <a:off x="27000" y="4749840"/>
-            <a:ext cx="546480" cy="391320"/>
+            <a:ext cx="546120" cy="390960"/>
           </a:xfrm>
           <a:prstGeom prst="rect">
             <a:avLst/>
@@ -47124,7 +47124,7 @@
                 <a:tab algn="l" pos="0"/>
               </a:tabLst>
             </a:pPr>
-            <a:fld id="{4DFC666E-7AF3-488C-AA63-79F0D18CA863}" type="slidenum">
+            <a:fld id="{CFCB6C06-3D55-4C8F-B2EE-8C7EED33BAED}" type="slidenum">
               <a:rPr b="0" lang="en" sz="1200" spc="-1" strike="noStrike">
                 <a:solidFill>
                   <a:srgbClr val="00ae9d"/>
@@ -47149,7 +47149,7 @@
         <p:spPr>
           <a:xfrm>
             <a:off x="6005880" y="4774320"/>
-            <a:ext cx="3135960" cy="363960"/>
+            <a:ext cx="3135600" cy="363960"/>
           </a:xfrm>
           <a:prstGeom prst="rect">
             <a:avLst/>
@@ -47204,7 +47204,7 @@
         <p:spPr>
           <a:xfrm>
             <a:off x="0" y="0"/>
-            <a:ext cx="9142200" cy="5141880"/>
+            <a:ext cx="9141840" cy="5141520"/>
           </a:xfrm>
           <a:prstGeom prst="rect">
             <a:avLst/>
@@ -47227,7 +47227,7 @@
         <p:spPr>
           <a:xfrm>
             <a:off x="2688120" y="4286520"/>
-            <a:ext cx="7368480" cy="855360"/>
+            <a:ext cx="7368120" cy="855000"/>
           </a:xfrm>
           <a:prstGeom prst="rect">
             <a:avLst/>
@@ -47306,7 +47306,7 @@
         <p:spPr>
           <a:xfrm>
             <a:off x="886680" y="398520"/>
-            <a:ext cx="7368480" cy="855360"/>
+            <a:ext cx="7368120" cy="855000"/>
           </a:xfrm>
           <a:prstGeom prst="rect">
             <a:avLst/>
@@ -47355,7 +47355,7 @@
         <p:spPr>
           <a:xfrm>
             <a:off x="886680" y="1669680"/>
-            <a:ext cx="7368480" cy="3080160"/>
+            <a:ext cx="7368120" cy="3079800"/>
           </a:xfrm>
           <a:prstGeom prst="rect">
             <a:avLst/>
@@ -47439,7 +47439,7 @@
         <p:spPr>
           <a:xfrm>
             <a:off x="27000" y="4749840"/>
-            <a:ext cx="546480" cy="391320"/>
+            <a:ext cx="546120" cy="390960"/>
           </a:xfrm>
           <a:prstGeom prst="rect">
             <a:avLst/>
@@ -47479,7 +47479,7 @@
                 <a:tab algn="l" pos="0"/>
               </a:tabLst>
             </a:pPr>
-            <a:fld id="{5B15911F-AB3D-491B-928C-E5A3947AD140}" type="slidenum">
+            <a:fld id="{7F81CC58-6AA8-4831-B8EF-C6AF6192B070}" type="slidenum">
               <a:rPr b="0" lang="en" sz="1200" spc="-1" strike="noStrike">
                 <a:solidFill>
                   <a:srgbClr val="00ae9d"/>
@@ -47504,7 +47504,7 @@
         <p:spPr>
           <a:xfrm>
             <a:off x="6400800" y="4779000"/>
-            <a:ext cx="2284200" cy="363960"/>
+            <a:ext cx="2283840" cy="363960"/>
           </a:xfrm>
           <a:prstGeom prst="rect">
             <a:avLst/>
@@ -47569,7 +47569,7 @@
         <p:spPr>
           <a:xfrm>
             <a:off x="686160" y="1702080"/>
-            <a:ext cx="7368480" cy="2639520"/>
+            <a:ext cx="7368120" cy="2639160"/>
           </a:xfrm>
           <a:prstGeom prst="rect">
             <a:avLst/>
@@ -47792,7 +47792,7 @@
         <p:spPr>
           <a:xfrm>
             <a:off x="886680" y="398520"/>
-            <a:ext cx="7368480" cy="855360"/>
+            <a:ext cx="7368120" cy="855000"/>
           </a:xfrm>
           <a:prstGeom prst="rect">
             <a:avLst/>
@@ -47841,7 +47841,7 @@
         <p:spPr>
           <a:xfrm>
             <a:off x="886680" y="1669680"/>
-            <a:ext cx="7368480" cy="3080160"/>
+            <a:ext cx="7368120" cy="3079800"/>
           </a:xfrm>
           <a:prstGeom prst="rect">
             <a:avLst/>
@@ -47925,7 +47925,7 @@
         <p:spPr>
           <a:xfrm>
             <a:off x="27000" y="4749840"/>
-            <a:ext cx="546480" cy="391320"/>
+            <a:ext cx="546120" cy="390960"/>
           </a:xfrm>
           <a:prstGeom prst="rect">
             <a:avLst/>
@@ -47965,7 +47965,7 @@
                 <a:tab algn="l" pos="0"/>
               </a:tabLst>
             </a:pPr>
-            <a:fld id="{2729D5EA-0F08-44F4-8B7D-C9388393E282}" type="slidenum">
+            <a:fld id="{2834AA18-E2FD-41DA-9073-91C150BD0629}" type="slidenum">
               <a:rPr b="0" lang="en" sz="1200" spc="-1" strike="noStrike">
                 <a:solidFill>
                   <a:srgbClr val="00ae9d"/>
@@ -47990,7 +47990,7 @@
         <p:spPr>
           <a:xfrm>
             <a:off x="6400800" y="4779000"/>
-            <a:ext cx="2284200" cy="363960"/>
+            <a:ext cx="2283840" cy="363960"/>
           </a:xfrm>
           <a:prstGeom prst="rect">
             <a:avLst/>
@@ -48055,7 +48055,7 @@
         <p:spPr>
           <a:xfrm>
             <a:off x="686160" y="1702080"/>
-            <a:ext cx="7368480" cy="2639520"/>
+            <a:ext cx="7368120" cy="2639160"/>
           </a:xfrm>
           <a:prstGeom prst="rect">
             <a:avLst/>
@@ -48310,7 +48310,7 @@
         <p:spPr>
           <a:xfrm>
             <a:off x="886680" y="398520"/>
-            <a:ext cx="7368480" cy="855360"/>
+            <a:ext cx="7368120" cy="855000"/>
           </a:xfrm>
           <a:prstGeom prst="rect">
             <a:avLst/>
@@ -48359,7 +48359,7 @@
         <p:spPr>
           <a:xfrm>
             <a:off x="886680" y="1669680"/>
-            <a:ext cx="7368480" cy="3080160"/>
+            <a:ext cx="7368120" cy="3079800"/>
           </a:xfrm>
           <a:prstGeom prst="rect">
             <a:avLst/>
@@ -48443,7 +48443,7 @@
         <p:spPr>
           <a:xfrm>
             <a:off x="27000" y="4749840"/>
-            <a:ext cx="546480" cy="391320"/>
+            <a:ext cx="546120" cy="390960"/>
           </a:xfrm>
           <a:prstGeom prst="rect">
             <a:avLst/>
@@ -48483,7 +48483,7 @@
                 <a:tab algn="l" pos="0"/>
               </a:tabLst>
             </a:pPr>
-            <a:fld id="{BC4E88C4-94E8-4C32-9C02-B7D79D28BDF5}" type="slidenum">
+            <a:fld id="{6EE444B7-221A-4D3B-9522-A4865BEC4700}" type="slidenum">
               <a:rPr b="0" lang="en" sz="1200" spc="-1" strike="noStrike">
                 <a:solidFill>
                   <a:srgbClr val="00ae9d"/>
@@ -48508,7 +48508,7 @@
         <p:spPr>
           <a:xfrm>
             <a:off x="6400800" y="4779000"/>
-            <a:ext cx="2284200" cy="363960"/>
+            <a:ext cx="2283840" cy="363960"/>
           </a:xfrm>
           <a:prstGeom prst="rect">
             <a:avLst/>
@@ -48573,7 +48573,7 @@
         <p:spPr>
           <a:xfrm>
             <a:off x="685800" y="1600200"/>
-            <a:ext cx="7368480" cy="2639520"/>
+            <a:ext cx="7368120" cy="2639160"/>
           </a:xfrm>
           <a:prstGeom prst="rect">
             <a:avLst/>
@@ -48896,7 +48896,7 @@
         <p:spPr>
           <a:xfrm>
             <a:off x="886680" y="398520"/>
-            <a:ext cx="7368480" cy="855360"/>
+            <a:ext cx="7368120" cy="855000"/>
           </a:xfrm>
           <a:prstGeom prst="rect">
             <a:avLst/>
@@ -48945,7 +48945,7 @@
         <p:spPr>
           <a:xfrm>
             <a:off x="886680" y="1669680"/>
-            <a:ext cx="7368480" cy="3080160"/>
+            <a:ext cx="7368120" cy="3079800"/>
           </a:xfrm>
           <a:prstGeom prst="rect">
             <a:avLst/>
@@ -49029,7 +49029,7 @@
         <p:spPr>
           <a:xfrm>
             <a:off x="27000" y="4749840"/>
-            <a:ext cx="546480" cy="391320"/>
+            <a:ext cx="546120" cy="390960"/>
           </a:xfrm>
           <a:prstGeom prst="rect">
             <a:avLst/>
@@ -49069,7 +49069,7 @@
                 <a:tab algn="l" pos="0"/>
               </a:tabLst>
             </a:pPr>
-            <a:fld id="{24E90EB5-8A9A-4FFF-A4DD-82E037206087}" type="slidenum">
+            <a:fld id="{D2CEAE31-687C-4EFB-9422-D957D6BC10F9}" type="slidenum">
               <a:rPr b="0" lang="en" sz="1200" spc="-1" strike="noStrike">
                 <a:solidFill>
                   <a:srgbClr val="00ae9d"/>
@@ -49094,7 +49094,7 @@
         <p:spPr>
           <a:xfrm>
             <a:off x="6400800" y="4779000"/>
-            <a:ext cx="2284200" cy="363960"/>
+            <a:ext cx="2283840" cy="363960"/>
           </a:xfrm>
           <a:prstGeom prst="rect">
             <a:avLst/>
@@ -49159,7 +49159,7 @@
         <p:spPr>
           <a:xfrm>
             <a:off x="685800" y="1600200"/>
-            <a:ext cx="7368480" cy="2639520"/>
+            <a:ext cx="7368120" cy="2639160"/>
           </a:xfrm>
           <a:prstGeom prst="rect">
             <a:avLst/>
@@ -49414,7 +49414,7 @@
         <p:spPr>
           <a:xfrm>
             <a:off x="926280" y="398520"/>
-            <a:ext cx="7368480" cy="855360"/>
+            <a:ext cx="7368120" cy="855000"/>
           </a:xfrm>
           <a:prstGeom prst="rect">
             <a:avLst/>
@@ -49463,7 +49463,7 @@
         <p:spPr>
           <a:xfrm>
             <a:off x="926280" y="1669680"/>
-            <a:ext cx="7368480" cy="3080160"/>
+            <a:ext cx="7368120" cy="3079800"/>
           </a:xfrm>
           <a:prstGeom prst="rect">
             <a:avLst/>
@@ -49547,7 +49547,7 @@
         <p:spPr>
           <a:xfrm>
             <a:off x="66600" y="4749840"/>
-            <a:ext cx="546480" cy="391320"/>
+            <a:ext cx="546120" cy="390960"/>
           </a:xfrm>
           <a:prstGeom prst="rect">
             <a:avLst/>
@@ -49587,7 +49587,7 @@
                 <a:tab algn="l" pos="0"/>
               </a:tabLst>
             </a:pPr>
-            <a:fld id="{F7B4240C-C329-4D41-8FA8-A47FCCF64D8A}" type="slidenum">
+            <a:fld id="{758CD630-02BD-4773-8DAF-248433A335ED}" type="slidenum">
               <a:rPr b="0" lang="en" sz="1200" spc="-1" strike="noStrike">
                 <a:solidFill>
                   <a:srgbClr val="00ae9d"/>
@@ -49612,7 +49612,7 @@
         <p:spPr>
           <a:xfrm>
             <a:off x="6440400" y="4779000"/>
-            <a:ext cx="2284200" cy="363960"/>
+            <a:ext cx="2283840" cy="363960"/>
           </a:xfrm>
           <a:prstGeom prst="rect">
             <a:avLst/>
@@ -49677,7 +49677,7 @@
         <p:spPr>
           <a:xfrm>
             <a:off x="725400" y="1600200"/>
-            <a:ext cx="7368480" cy="2639520"/>
+            <a:ext cx="7368120" cy="2639160"/>
           </a:xfrm>
           <a:prstGeom prst="rect">
             <a:avLst/>
@@ -49922,7 +49922,7 @@
         <p:spPr>
           <a:xfrm>
             <a:off x="926280" y="398520"/>
-            <a:ext cx="7368480" cy="855360"/>
+            <a:ext cx="7368120" cy="855000"/>
           </a:xfrm>
           <a:prstGeom prst="rect">
             <a:avLst/>
@@ -49971,7 +49971,7 @@
         <p:spPr>
           <a:xfrm>
             <a:off x="926280" y="1669680"/>
-            <a:ext cx="7368480" cy="3080160"/>
+            <a:ext cx="7368120" cy="3079800"/>
           </a:xfrm>
           <a:prstGeom prst="rect">
             <a:avLst/>
@@ -50055,7 +50055,7 @@
         <p:spPr>
           <a:xfrm>
             <a:off x="66600" y="4749840"/>
-            <a:ext cx="546480" cy="391320"/>
+            <a:ext cx="546120" cy="390960"/>
           </a:xfrm>
           <a:prstGeom prst="rect">
             <a:avLst/>
@@ -50095,7 +50095,7 @@
                 <a:tab algn="l" pos="0"/>
               </a:tabLst>
             </a:pPr>
-            <a:fld id="{E0B8A44B-614C-4BFD-A920-121D8EF39789}" type="slidenum">
+            <a:fld id="{AE2E022C-4B8C-46F6-9F86-DE24010B85C1}" type="slidenum">
               <a:rPr b="0" lang="en" sz="1200" spc="-1" strike="noStrike">
                 <a:solidFill>
                   <a:srgbClr val="00ae9d"/>
@@ -50120,7 +50120,7 @@
         <p:spPr>
           <a:xfrm>
             <a:off x="6440400" y="4779000"/>
-            <a:ext cx="2284200" cy="363960"/>
+            <a:ext cx="2283840" cy="363960"/>
           </a:xfrm>
           <a:prstGeom prst="rect">
             <a:avLst/>
@@ -50185,7 +50185,7 @@
         <p:spPr>
           <a:xfrm>
             <a:off x="725400" y="1600200"/>
-            <a:ext cx="7368480" cy="2639520"/>
+            <a:ext cx="7368120" cy="2639160"/>
           </a:xfrm>
           <a:prstGeom prst="rect">
             <a:avLst/>
@@ -50472,7 +50472,7 @@
         <p:spPr>
           <a:xfrm>
             <a:off x="926280" y="398520"/>
-            <a:ext cx="7368480" cy="855360"/>
+            <a:ext cx="7368120" cy="855000"/>
           </a:xfrm>
           <a:prstGeom prst="rect">
             <a:avLst/>
@@ -50521,7 +50521,7 @@
         <p:spPr>
           <a:xfrm>
             <a:off x="926280" y="1669680"/>
-            <a:ext cx="7368480" cy="3080160"/>
+            <a:ext cx="7368120" cy="3079800"/>
           </a:xfrm>
           <a:prstGeom prst="rect">
             <a:avLst/>
@@ -50605,7 +50605,7 @@
         <p:spPr>
           <a:xfrm>
             <a:off x="66600" y="4749840"/>
-            <a:ext cx="546480" cy="391320"/>
+            <a:ext cx="546120" cy="390960"/>
           </a:xfrm>
           <a:prstGeom prst="rect">
             <a:avLst/>
@@ -50645,7 +50645,7 @@
                 <a:tab algn="l" pos="0"/>
               </a:tabLst>
             </a:pPr>
-            <a:fld id="{EF524A86-C077-4117-8C43-B21A8F5FF58B}" type="slidenum">
+            <a:fld id="{687D5FF7-31B7-4BE1-993D-62EAB65FED06}" type="slidenum">
               <a:rPr b="0" lang="en" sz="1200" spc="-1" strike="noStrike">
                 <a:solidFill>
                   <a:srgbClr val="00ae9d"/>
@@ -50670,7 +50670,7 @@
         <p:spPr>
           <a:xfrm>
             <a:off x="6440400" y="4779000"/>
-            <a:ext cx="2284200" cy="363960"/>
+            <a:ext cx="2283840" cy="363960"/>
           </a:xfrm>
           <a:prstGeom prst="rect">
             <a:avLst/>
@@ -50735,7 +50735,7 @@
         <p:spPr>
           <a:xfrm>
             <a:off x="725400" y="1600200"/>
-            <a:ext cx="7368480" cy="2639520"/>
+            <a:ext cx="7368120" cy="2639160"/>
           </a:xfrm>
           <a:prstGeom prst="rect">
             <a:avLst/>
@@ -51016,7 +51016,7 @@
         <p:spPr>
           <a:xfrm>
             <a:off x="926280" y="398520"/>
-            <a:ext cx="7368480" cy="855360"/>
+            <a:ext cx="7368120" cy="855000"/>
           </a:xfrm>
           <a:prstGeom prst="rect">
             <a:avLst/>
@@ -51065,7 +51065,7 @@
         <p:spPr>
           <a:xfrm>
             <a:off x="926280" y="1669680"/>
-            <a:ext cx="7368480" cy="3080160"/>
+            <a:ext cx="7368120" cy="3079800"/>
           </a:xfrm>
           <a:prstGeom prst="rect">
             <a:avLst/>
@@ -51149,7 +51149,7 @@
         <p:spPr>
           <a:xfrm>
             <a:off x="66600" y="4749840"/>
-            <a:ext cx="546480" cy="391320"/>
+            <a:ext cx="546120" cy="390960"/>
           </a:xfrm>
           <a:prstGeom prst="rect">
             <a:avLst/>
@@ -51189,7 +51189,7 @@
                 <a:tab algn="l" pos="0"/>
               </a:tabLst>
             </a:pPr>
-            <a:fld id="{849D8D8E-DE64-4DF1-8B35-D1A78A2888DF}" type="slidenum">
+            <a:fld id="{141F0A42-600D-40C2-943C-68CA2E6DE1C5}" type="slidenum">
               <a:rPr b="0" lang="en" sz="1200" spc="-1" strike="noStrike">
                 <a:solidFill>
                   <a:srgbClr val="00ae9d"/>
@@ -51214,7 +51214,7 @@
         <p:spPr>
           <a:xfrm>
             <a:off x="6440400" y="4779000"/>
-            <a:ext cx="2284200" cy="363960"/>
+            <a:ext cx="2283840" cy="363960"/>
           </a:xfrm>
           <a:prstGeom prst="rect">
             <a:avLst/>
@@ -51279,7 +51279,7 @@
         <p:spPr>
           <a:xfrm>
             <a:off x="860760" y="1246680"/>
-            <a:ext cx="7368480" cy="2639520"/>
+            <a:ext cx="7368120" cy="2639160"/>
           </a:xfrm>
           <a:prstGeom prst="rect">
             <a:avLst/>
@@ -51839,7 +51839,7 @@
         <p:spPr>
           <a:xfrm>
             <a:off x="3064680" y="1513080"/>
-            <a:ext cx="5531760" cy="1157760"/>
+            <a:ext cx="5531400" cy="1157400"/>
           </a:xfrm>
           <a:prstGeom prst="rect">
             <a:avLst/>
@@ -51891,7 +51891,7 @@
         <p:spPr>
           <a:xfrm>
             <a:off x="3064680" y="2636280"/>
-            <a:ext cx="5531760" cy="2195640"/>
+            <a:ext cx="5531400" cy="2195280"/>
           </a:xfrm>
           <a:prstGeom prst="rect">
             <a:avLst/>
@@ -51942,9 +51942,9 @@
         <p:grpSpPr>
           <a:xfrm>
             <a:off x="685800" y="1814400"/>
-            <a:ext cx="1679760" cy="1177560"/>
+            <a:ext cx="1679400" cy="1177200"/>
             <a:chOff x="685800" y="1814400"/>
-            <a:chExt cx="1679760" cy="1177560"/>
+            <a:chExt cx="1679400" cy="1177200"/>
           </a:xfrm>
         </p:grpSpPr>
         <p:sp>
@@ -51956,7 +51956,7 @@
           <p:spPr>
             <a:xfrm>
               <a:off x="685800" y="1814400"/>
-              <a:ext cx="1679760" cy="711000"/>
+              <a:ext cx="1679400" cy="710640"/>
             </a:xfrm>
             <a:custGeom>
               <a:avLst/>
@@ -52051,7 +52051,7 @@
           <p:spPr>
             <a:xfrm>
               <a:off x="685800" y="1972800"/>
-              <a:ext cx="1679760" cy="1019160"/>
+              <a:ext cx="1679400" cy="1018800"/>
             </a:xfrm>
             <a:custGeom>
               <a:avLst/>
@@ -52189,7 +52189,7 @@
         <p:spPr>
           <a:xfrm>
             <a:off x="1681920" y="2683080"/>
-            <a:ext cx="1272600" cy="1157760"/>
+            <a:ext cx="1272240" cy="1157400"/>
           </a:xfrm>
           <a:custGeom>
             <a:avLst/>
@@ -52654,7 +52654,7 @@
         <p:spPr>
           <a:xfrm>
             <a:off x="27000" y="4749840"/>
-            <a:ext cx="546480" cy="391320"/>
+            <a:ext cx="546120" cy="390960"/>
           </a:xfrm>
           <a:prstGeom prst="rect">
             <a:avLst/>
@@ -52694,7 +52694,7 @@
                 <a:tab algn="l" pos="0"/>
               </a:tabLst>
             </a:pPr>
-            <a:fld id="{35159202-3CF6-4F14-A4C9-8A34E235FE33}" type="slidenum">
+            <a:fld id="{7256954D-0E5E-466E-91ED-0E9C46DD520E}" type="slidenum">
               <a:rPr b="0" lang="en" sz="1200" spc="-1" strike="noStrike">
                 <a:solidFill>
                   <a:srgbClr val="00ae9d"/>
@@ -52719,7 +52719,7 @@
         <p:spPr>
           <a:xfrm>
             <a:off x="6005880" y="0"/>
-            <a:ext cx="3135960" cy="363960"/>
+            <a:ext cx="3135600" cy="363960"/>
           </a:xfrm>
           <a:prstGeom prst="rect">
             <a:avLst/>
@@ -52753,7 +52753,7 @@
                 <a:latin typeface="Century Gothic"/>
                 <a:ea typeface="ＭＳ Ｐゴシック"/>
               </a:rPr>
-              <a:t>Muhammad Umar Ahmad</a:t>
+              <a:t>Ahmad Jajja</a:t>
             </a:r>
             <a:endParaRPr b="0" lang="en-US" sz="1800" spc="-1" strike="noStrike">
               <a:latin typeface="Arial"/>
@@ -52804,7 +52804,7 @@
         <p:spPr>
           <a:xfrm>
             <a:off x="27000" y="4749840"/>
-            <a:ext cx="546480" cy="391320"/>
+            <a:ext cx="546120" cy="390960"/>
           </a:xfrm>
           <a:prstGeom prst="rect">
             <a:avLst/>
@@ -52844,7 +52844,7 @@
                 <a:tab algn="l" pos="0"/>
               </a:tabLst>
             </a:pPr>
-            <a:fld id="{1C9373E8-5508-4FB2-8A90-4ADD6B022A4D}" type="slidenum">
+            <a:fld id="{E064CE7E-040D-4069-A7C9-4C240EDDA70A}" type="slidenum">
               <a:rPr b="0" lang="en" sz="1200" spc="-1" strike="noStrike">
                 <a:solidFill>
                   <a:srgbClr val="00ae9d"/>
@@ -52869,7 +52869,7 @@
         <p:spPr>
           <a:xfrm>
             <a:off x="7086960" y="4779000"/>
-            <a:ext cx="1826640" cy="363960"/>
+            <a:ext cx="1826280" cy="363960"/>
           </a:xfrm>
           <a:prstGeom prst="rect">
             <a:avLst/>
@@ -52924,7 +52924,7 @@
         <p:spPr>
           <a:xfrm>
             <a:off x="3085560" y="1561320"/>
-            <a:ext cx="3072960" cy="3072960"/>
+            <a:ext cx="3072600" cy="3072600"/>
           </a:xfrm>
           <a:prstGeom prst="rect">
             <a:avLst/>
@@ -52977,7 +52977,7 @@
         <p:spPr>
           <a:xfrm>
             <a:off x="886680" y="398520"/>
-            <a:ext cx="7368480" cy="855360"/>
+            <a:ext cx="7368120" cy="855000"/>
           </a:xfrm>
           <a:prstGeom prst="rect">
             <a:avLst/>
@@ -53026,7 +53026,7 @@
         <p:spPr>
           <a:xfrm>
             <a:off x="457200" y="1753920"/>
-            <a:ext cx="7368480" cy="3502080"/>
+            <a:ext cx="7368120" cy="3501720"/>
           </a:xfrm>
           <a:prstGeom prst="rect">
             <a:avLst/>
@@ -53215,7 +53215,7 @@
         <p:spPr>
           <a:xfrm>
             <a:off x="7086600" y="4774320"/>
-            <a:ext cx="2055240" cy="363960"/>
+            <a:ext cx="2054880" cy="363960"/>
           </a:xfrm>
           <a:prstGeom prst="rect">
             <a:avLst/>
@@ -53304,7 +53304,7 @@
         <p:spPr>
           <a:xfrm>
             <a:off x="886680" y="398520"/>
-            <a:ext cx="7368480" cy="855360"/>
+            <a:ext cx="7368120" cy="855000"/>
           </a:xfrm>
           <a:prstGeom prst="rect">
             <a:avLst/>
@@ -53349,7 +53349,7 @@
         <p:spPr>
           <a:xfrm>
             <a:off x="914400" y="1600200"/>
-            <a:ext cx="7368480" cy="3502080"/>
+            <a:ext cx="7368120" cy="3501720"/>
           </a:xfrm>
           <a:prstGeom prst="rect">
             <a:avLst/>
@@ -53508,7 +53508,7 @@
         <p:spPr>
           <a:xfrm>
             <a:off x="7086600" y="4774320"/>
-            <a:ext cx="2055240" cy="363960"/>
+            <a:ext cx="2054880" cy="363960"/>
           </a:xfrm>
           <a:prstGeom prst="rect">
             <a:avLst/>
@@ -53563,7 +53563,7 @@
         <p:spPr>
           <a:xfrm>
             <a:off x="859320" y="1447200"/>
-            <a:ext cx="7368480" cy="3325320"/>
+            <a:ext cx="7368120" cy="3324960"/>
           </a:xfrm>
           <a:prstGeom prst="rect">
             <a:avLst/>
@@ -53752,7 +53752,7 @@
         <p:spPr>
           <a:xfrm>
             <a:off x="886680" y="398520"/>
-            <a:ext cx="7368480" cy="855360"/>
+            <a:ext cx="7368120" cy="855000"/>
           </a:xfrm>
           <a:prstGeom prst="rect">
             <a:avLst/>
@@ -53801,7 +53801,7 @@
         <p:spPr>
           <a:xfrm>
             <a:off x="457200" y="2057400"/>
-            <a:ext cx="7368480" cy="3502080"/>
+            <a:ext cx="7368120" cy="3501720"/>
           </a:xfrm>
           <a:prstGeom prst="rect">
             <a:avLst/>
@@ -53938,7 +53938,7 @@
         <p:spPr>
           <a:xfrm>
             <a:off x="7086600" y="4774320"/>
-            <a:ext cx="2055240" cy="363960"/>
+            <a:ext cx="2054880" cy="363960"/>
           </a:xfrm>
           <a:prstGeom prst="rect">
             <a:avLst/>
@@ -53993,7 +53993,7 @@
         <p:spPr>
           <a:xfrm>
             <a:off x="859320" y="1598400"/>
-            <a:ext cx="7368480" cy="3325320"/>
+            <a:ext cx="7368120" cy="3324960"/>
           </a:xfrm>
           <a:prstGeom prst="rect">
             <a:avLst/>
@@ -54238,7 +54238,7 @@
         <p:spPr>
           <a:xfrm>
             <a:off x="914400" y="398520"/>
-            <a:ext cx="7313400" cy="855360"/>
+            <a:ext cx="7313040" cy="855000"/>
           </a:xfrm>
           <a:prstGeom prst="rect">
             <a:avLst/>
@@ -54287,7 +54287,7 @@
         <p:spPr>
           <a:xfrm>
             <a:off x="457200" y="2057400"/>
-            <a:ext cx="7368480" cy="3502080"/>
+            <a:ext cx="7368120" cy="3501720"/>
           </a:xfrm>
           <a:prstGeom prst="rect">
             <a:avLst/>
@@ -54424,7 +54424,7 @@
         <p:spPr>
           <a:xfrm>
             <a:off x="7086600" y="4774320"/>
-            <a:ext cx="2055240" cy="363960"/>
+            <a:ext cx="2054880" cy="363960"/>
           </a:xfrm>
           <a:prstGeom prst="rect">
             <a:avLst/>
@@ -54479,7 +54479,7 @@
         <p:spPr>
           <a:xfrm>
             <a:off x="859320" y="1255680"/>
-            <a:ext cx="7368480" cy="3325320"/>
+            <a:ext cx="7368120" cy="3324960"/>
           </a:xfrm>
           <a:prstGeom prst="rect">
             <a:avLst/>
@@ -54652,7 +54652,7 @@
         <p:spPr>
           <a:xfrm>
             <a:off x="886680" y="398520"/>
-            <a:ext cx="7368480" cy="855360"/>
+            <a:ext cx="7368120" cy="855000"/>
           </a:xfrm>
           <a:prstGeom prst="rect">
             <a:avLst/>
@@ -54701,7 +54701,7 @@
         <p:spPr>
           <a:xfrm>
             <a:off x="457200" y="5561280"/>
-            <a:ext cx="7368480" cy="380520"/>
+            <a:ext cx="7368120" cy="380160"/>
           </a:xfrm>
           <a:prstGeom prst="rect">
             <a:avLst/>
@@ -54838,7 +54838,7 @@
         <p:spPr>
           <a:xfrm>
             <a:off x="7086600" y="4774320"/>
-            <a:ext cx="2055240" cy="363960"/>
+            <a:ext cx="2054880" cy="363960"/>
           </a:xfrm>
           <a:prstGeom prst="rect">
             <a:avLst/>
@@ -54893,7 +54893,7 @@
         <p:spPr>
           <a:xfrm>
             <a:off x="859320" y="1255680"/>
-            <a:ext cx="7368480" cy="1714320"/>
+            <a:ext cx="7368120" cy="1713960"/>
           </a:xfrm>
           <a:prstGeom prst="rect">
             <a:avLst/>
@@ -55054,7 +55054,7 @@
         <p:spPr>
           <a:xfrm>
             <a:off x="859680" y="3200400"/>
-            <a:ext cx="7368480" cy="1379520"/>
+            <a:ext cx="7368120" cy="1379160"/>
           </a:xfrm>
           <a:prstGeom prst="rect">
             <a:avLst/>
@@ -55111,7 +55111,7 @@
         <p:spPr>
           <a:xfrm>
             <a:off x="27000" y="4749840"/>
-            <a:ext cx="546480" cy="391320"/>
+            <a:ext cx="546120" cy="390960"/>
           </a:xfrm>
           <a:prstGeom prst="rect">
             <a:avLst/>
@@ -55151,7 +55151,7 @@
                 <a:tab algn="l" pos="0"/>
               </a:tabLst>
             </a:pPr>
-            <a:fld id="{18CEA4B9-2B73-4107-8DD8-34A39398E02B}" type="slidenum">
+            <a:fld id="{BF8175FE-6776-4430-9A32-2BA133180B3A}" type="slidenum">
               <a:rPr b="0" lang="en" sz="1200" spc="-1" strike="noStrike">
                 <a:solidFill>
                   <a:srgbClr val="00ae9d"/>
@@ -55159,7 +55159,7 @@
                 <a:latin typeface="Karla"/>
                 <a:ea typeface="Karla"/>
               </a:rPr>
-              <a:t>&lt;number&gt;</a:t>
+              <a:t>8</a:t>
             </a:fld>
             <a:endParaRPr b="0" lang="en-US" sz="1200" spc="-1" strike="noStrike">
               <a:latin typeface="Times New Roman"/>
@@ -55176,7 +55176,7 @@
         <p:spPr>
           <a:xfrm>
             <a:off x="7086600" y="4774320"/>
-            <a:ext cx="2283840" cy="363960"/>
+            <a:ext cx="2283480" cy="363960"/>
           </a:xfrm>
           <a:prstGeom prst="rect">
             <a:avLst/>
@@ -55231,7 +55231,7 @@
         <p:spPr>
           <a:xfrm>
             <a:off x="886680" y="2512440"/>
-            <a:ext cx="7368480" cy="855360"/>
+            <a:ext cx="7368120" cy="855000"/>
           </a:xfrm>
           <a:prstGeom prst="rect">
             <a:avLst/>

</xml_diff>